<commit_message>
Edited collider constraints section Ch1
</commit_message>
<xml_diff>
--- a/Research_Project/LHCb Starterkit/MSc Research Project Progress 31 Aug 2022 [Autosaved].pptx
+++ b/Research_Project/LHCb Starterkit/MSc Research Project Progress 31 Aug 2022 [Autosaved].pptx
@@ -5,7 +5,7 @@
     <p:sldMasterId id="2147483648" r:id="rId1"/>
   </p:sldMasterIdLst>
   <p:notesMasterIdLst>
-    <p:notesMasterId r:id="rId12"/>
+    <p:notesMasterId r:id="rId13"/>
   </p:notesMasterIdLst>
   <p:sldIdLst>
     <p:sldId id="256" r:id="rId2"/>
@@ -18,6 +18,7 @@
     <p:sldId id="260" r:id="rId9"/>
     <p:sldId id="264" r:id="rId10"/>
     <p:sldId id="265" r:id="rId11"/>
+    <p:sldId id="266" r:id="rId12"/>
   </p:sldIdLst>
   <p:sldSz cx="12192000" cy="6858000"/>
   <p:notesSz cx="6858000" cy="9144000"/>
@@ -206,7 +207,7 @@
           <a:p>
             <a:fld id="{FC50BE67-3C8E-4570-A99E-8EC5CD30FB7F}" type="datetimeFigureOut">
               <a:rPr lang="en-AU" smtClean="0"/>
-              <a:t>8/10/2022</a:t>
+              <a:t>9/11/2022</a:t>
             </a:fld>
             <a:endParaRPr lang="en-AU"/>
           </a:p>
@@ -707,7 +708,7 @@
           <a:p>
             <a:fld id="{6D79F432-8B29-4E94-9828-C190BA0C460D}" type="datetimeFigureOut">
               <a:rPr lang="en-AU" smtClean="0"/>
-              <a:t>8/10/2022</a:t>
+              <a:t>9/11/2022</a:t>
             </a:fld>
             <a:endParaRPr lang="en-AU"/>
           </a:p>
@@ -907,7 +908,7 @@
           <a:p>
             <a:fld id="{6D79F432-8B29-4E94-9828-C190BA0C460D}" type="datetimeFigureOut">
               <a:rPr lang="en-AU" smtClean="0"/>
-              <a:t>8/10/2022</a:t>
+              <a:t>9/11/2022</a:t>
             </a:fld>
             <a:endParaRPr lang="en-AU"/>
           </a:p>
@@ -1117,7 +1118,7 @@
           <a:p>
             <a:fld id="{6D79F432-8B29-4E94-9828-C190BA0C460D}" type="datetimeFigureOut">
               <a:rPr lang="en-AU" smtClean="0"/>
-              <a:t>8/10/2022</a:t>
+              <a:t>9/11/2022</a:t>
             </a:fld>
             <a:endParaRPr lang="en-AU"/>
           </a:p>
@@ -1317,7 +1318,7 @@
           <a:p>
             <a:fld id="{6D79F432-8B29-4E94-9828-C190BA0C460D}" type="datetimeFigureOut">
               <a:rPr lang="en-AU" smtClean="0"/>
-              <a:t>8/10/2022</a:t>
+              <a:t>9/11/2022</a:t>
             </a:fld>
             <a:endParaRPr lang="en-AU"/>
           </a:p>
@@ -1593,7 +1594,7 @@
           <a:p>
             <a:fld id="{6D79F432-8B29-4E94-9828-C190BA0C460D}" type="datetimeFigureOut">
               <a:rPr lang="en-AU" smtClean="0"/>
-              <a:t>8/10/2022</a:t>
+              <a:t>9/11/2022</a:t>
             </a:fld>
             <a:endParaRPr lang="en-AU"/>
           </a:p>
@@ -1861,7 +1862,7 @@
           <a:p>
             <a:fld id="{6D79F432-8B29-4E94-9828-C190BA0C460D}" type="datetimeFigureOut">
               <a:rPr lang="en-AU" smtClean="0"/>
-              <a:t>8/10/2022</a:t>
+              <a:t>9/11/2022</a:t>
             </a:fld>
             <a:endParaRPr lang="en-AU"/>
           </a:p>
@@ -2276,7 +2277,7 @@
           <a:p>
             <a:fld id="{6D79F432-8B29-4E94-9828-C190BA0C460D}" type="datetimeFigureOut">
               <a:rPr lang="en-AU" smtClean="0"/>
-              <a:t>8/10/2022</a:t>
+              <a:t>9/11/2022</a:t>
             </a:fld>
             <a:endParaRPr lang="en-AU"/>
           </a:p>
@@ -2418,7 +2419,7 @@
           <a:p>
             <a:fld id="{6D79F432-8B29-4E94-9828-C190BA0C460D}" type="datetimeFigureOut">
               <a:rPr lang="en-AU" smtClean="0"/>
-              <a:t>8/10/2022</a:t>
+              <a:t>9/11/2022</a:t>
             </a:fld>
             <a:endParaRPr lang="en-AU"/>
           </a:p>
@@ -2531,7 +2532,7 @@
           <a:p>
             <a:fld id="{6D79F432-8B29-4E94-9828-C190BA0C460D}" type="datetimeFigureOut">
               <a:rPr lang="en-AU" smtClean="0"/>
-              <a:t>8/10/2022</a:t>
+              <a:t>9/11/2022</a:t>
             </a:fld>
             <a:endParaRPr lang="en-AU"/>
           </a:p>
@@ -2844,7 +2845,7 @@
           <a:p>
             <a:fld id="{6D79F432-8B29-4E94-9828-C190BA0C460D}" type="datetimeFigureOut">
               <a:rPr lang="en-AU" smtClean="0"/>
-              <a:t>8/10/2022</a:t>
+              <a:t>9/11/2022</a:t>
             </a:fld>
             <a:endParaRPr lang="en-AU"/>
           </a:p>
@@ -3133,7 +3134,7 @@
           <a:p>
             <a:fld id="{6D79F432-8B29-4E94-9828-C190BA0C460D}" type="datetimeFigureOut">
               <a:rPr lang="en-AU" smtClean="0"/>
-              <a:t>8/10/2022</a:t>
+              <a:t>9/11/2022</a:t>
             </a:fld>
             <a:endParaRPr lang="en-AU"/>
           </a:p>
@@ -3376,7 +3377,7 @@
           <a:p>
             <a:fld id="{6D79F432-8B29-4E94-9828-C190BA0C460D}" type="datetimeFigureOut">
               <a:rPr lang="en-AU" smtClean="0"/>
-              <a:t>8/10/2022</a:t>
+              <a:t>9/11/2022</a:t>
             </a:fld>
             <a:endParaRPr lang="en-AU"/>
           </a:p>
@@ -4583,8 +4584,8 @@
           <a:chExt cx="0" cy="0"/>
         </a:xfrm>
       </p:grpSpPr>
-      <mc:AlternateContent xmlns:mc="http://schemas.openxmlformats.org/markup-compatibility/2006">
-        <mc:Choice xmlns:a14="http://schemas.microsoft.com/office/drawing/2010/main" Requires="a14">
+      <mc:AlternateContent xmlns:mc="http://schemas.openxmlformats.org/markup-compatibility/2006" xmlns:a14="http://schemas.microsoft.com/office/drawing/2010/main">
+        <mc:Choice Requires="a14">
           <p:sp>
             <p:nvSpPr>
               <p:cNvPr id="2" name="Title 1">
@@ -4747,7 +4748,7 @@
             </p:txBody>
           </p:sp>
         </mc:Choice>
-        <mc:Fallback>
+        <mc:Fallback xmlns="">
           <p:sp>
             <p:nvSpPr>
               <p:cNvPr id="2" name="Title 1">
@@ -4816,8 +4817,8 @@
           </a:xfrm>
         </p:spPr>
       </p:pic>
-      <mc:AlternateContent xmlns:mc="http://schemas.openxmlformats.org/markup-compatibility/2006">
-        <mc:Choice xmlns:a14="http://schemas.microsoft.com/office/drawing/2010/main" Requires="a14">
+      <mc:AlternateContent xmlns:mc="http://schemas.openxmlformats.org/markup-compatibility/2006" xmlns:a14="http://schemas.microsoft.com/office/drawing/2010/main">
+        <mc:Choice Requires="a14">
           <p:sp>
             <p:nvSpPr>
               <p:cNvPr id="6" name="TextBox 5">
@@ -4846,6 +4847,7 @@
               </a:bodyPr>
               <a:lstStyle/>
               <a:p>
+                <a:pPr/>
                 <a14:m>
                   <m:oMathPara xmlns:m="http://schemas.openxmlformats.org/officeDocument/2006/math">
                     <m:oMathParaPr>
@@ -5525,7 +5527,7 @@
             </p:txBody>
           </p:sp>
         </mc:Choice>
-        <mc:Fallback>
+        <mc:Fallback xmlns="">
           <p:sp>
             <p:nvSpPr>
               <p:cNvPr id="6" name="TextBox 5">
@@ -5630,6 +5632,120 @@
     <p:extLst>
       <p:ext uri="{BB962C8B-B14F-4D97-AF65-F5344CB8AC3E}">
         <p14:creationId xmlns:p14="http://schemas.microsoft.com/office/powerpoint/2010/main" val="2992076502"/>
+      </p:ext>
+    </p:extLst>
+  </p:cSld>
+  <p:clrMapOvr>
+    <a:masterClrMapping/>
+  </p:clrMapOvr>
+</p:sld>
+</file>
+
+<file path=ppt/slides/slide11.xml><?xml version="1.0" encoding="utf-8"?>
+<p:sld xmlns:a="http://schemas.openxmlformats.org/drawingml/2006/main" xmlns:r="http://schemas.openxmlformats.org/officeDocument/2006/relationships" xmlns:p="http://schemas.openxmlformats.org/presentationml/2006/main">
+  <p:cSld>
+    <p:spTree>
+      <p:nvGrpSpPr>
+        <p:cNvPr id="1" name=""/>
+        <p:cNvGrpSpPr/>
+        <p:nvPr/>
+      </p:nvGrpSpPr>
+      <p:grpSpPr>
+        <a:xfrm>
+          <a:off x="0" y="0"/>
+          <a:ext cx="0" cy="0"/>
+          <a:chOff x="0" y="0"/>
+          <a:chExt cx="0" cy="0"/>
+        </a:xfrm>
+      </p:grpSpPr>
+      <p:sp>
+        <p:nvSpPr>
+          <p:cNvPr id="2" name="Title 1">
+            <a:extLst>
+              <a:ext uri="{FF2B5EF4-FFF2-40B4-BE49-F238E27FC236}">
+                <a16:creationId xmlns:a16="http://schemas.microsoft.com/office/drawing/2014/main" id="{FEBFB81A-4748-7962-0D3D-7EDECB061A60}"/>
+              </a:ext>
+            </a:extLst>
+          </p:cNvPr>
+          <p:cNvSpPr>
+            <a:spLocks noGrp="1"/>
+          </p:cNvSpPr>
+          <p:nvPr>
+            <p:ph type="title"/>
+          </p:nvPr>
+        </p:nvSpPr>
+        <p:spPr/>
+        <p:txBody>
+          <a:bodyPr/>
+          <a:lstStyle/>
+          <a:p>
+            <a:endParaRPr lang="en-AU"/>
+          </a:p>
+        </p:txBody>
+      </p:sp>
+      <p:pic>
+        <p:nvPicPr>
+          <p:cNvPr id="5" name="Content Placeholder 4">
+            <a:extLst>
+              <a:ext uri="{FF2B5EF4-FFF2-40B4-BE49-F238E27FC236}">
+                <a16:creationId xmlns:a16="http://schemas.microsoft.com/office/drawing/2014/main" id="{57109755-DE30-7958-2C85-108118894DBC}"/>
+              </a:ext>
+            </a:extLst>
+          </p:cNvPr>
+          <p:cNvPicPr>
+            <a:picLocks noGrp="1" noChangeAspect="1"/>
+          </p:cNvPicPr>
+          <p:nvPr>
+            <p:ph idx="1"/>
+          </p:nvPr>
+        </p:nvPicPr>
+        <p:blipFill>
+          <a:blip r:embed="rId2"/>
+          <a:stretch>
+            <a:fillRect/>
+          </a:stretch>
+        </p:blipFill>
+        <p:spPr>
+          <a:xfrm>
+            <a:off x="121012" y="2000885"/>
+            <a:ext cx="5771788" cy="4601726"/>
+          </a:xfrm>
+        </p:spPr>
+      </p:pic>
+      <p:pic>
+        <p:nvPicPr>
+          <p:cNvPr id="9" name="Picture 8">
+            <a:extLst>
+              <a:ext uri="{FF2B5EF4-FFF2-40B4-BE49-F238E27FC236}">
+                <a16:creationId xmlns:a16="http://schemas.microsoft.com/office/drawing/2014/main" id="{9C8AD551-68D4-AFEC-5102-FE37692126BB}"/>
+              </a:ext>
+            </a:extLst>
+          </p:cNvPr>
+          <p:cNvPicPr>
+            <a:picLocks noChangeAspect="1"/>
+          </p:cNvPicPr>
+          <p:nvPr/>
+        </p:nvPicPr>
+        <p:blipFill>
+          <a:blip r:embed="rId3"/>
+          <a:stretch>
+            <a:fillRect/>
+          </a:stretch>
+        </p:blipFill>
+        <p:spPr>
+          <a:xfrm>
+            <a:off x="5991691" y="2322714"/>
+            <a:ext cx="5588206" cy="3824085"/>
+          </a:xfrm>
+          <a:prstGeom prst="rect">
+            <a:avLst/>
+          </a:prstGeom>
+        </p:spPr>
+      </p:pic>
+    </p:spTree>
+    <p:extLst>
+      <p:ext uri="{BB962C8B-B14F-4D97-AF65-F5344CB8AC3E}">
+        <p14:creationId xmlns:p14="http://schemas.microsoft.com/office/powerpoint/2010/main" val="1763656324"/>
       </p:ext>
     </p:extLst>
   </p:cSld>
@@ -10220,8 +10336,8 @@
           <a:chExt cx="0" cy="0"/>
         </a:xfrm>
       </p:grpSpPr>
-      <mc:AlternateContent xmlns:mc="http://schemas.openxmlformats.org/markup-compatibility/2006">
-        <mc:Choice xmlns:a14="http://schemas.microsoft.com/office/drawing/2010/main" Requires="a14">
+      <mc:AlternateContent xmlns:mc="http://schemas.openxmlformats.org/markup-compatibility/2006" xmlns:a14="http://schemas.microsoft.com/office/drawing/2010/main">
+        <mc:Choice Requires="a14">
           <p:sp>
             <p:nvSpPr>
               <p:cNvPr id="2" name="Title 1">
@@ -10353,7 +10469,7 @@
             </p:txBody>
           </p:sp>
         </mc:Choice>
-        <mc:Fallback>
+        <mc:Fallback xmlns="">
           <p:sp>
             <p:nvSpPr>
               <p:cNvPr id="2" name="Title 1">
@@ -11263,8 +11379,8 @@
           </a:p>
         </p:txBody>
       </p:sp>
-      <mc:AlternateContent xmlns:mc="http://schemas.openxmlformats.org/markup-compatibility/2006">
-        <mc:Choice xmlns:a14="http://schemas.microsoft.com/office/drawing/2010/main" Requires="a14">
+      <mc:AlternateContent xmlns:mc="http://schemas.openxmlformats.org/markup-compatibility/2006" xmlns:a14="http://schemas.microsoft.com/office/drawing/2010/main">
+        <mc:Choice Requires="a14">
           <p:sp>
             <p:nvSpPr>
               <p:cNvPr id="3" name="Content Placeholder 2">
@@ -13274,7 +13390,7 @@
             </p:txBody>
           </p:sp>
         </mc:Choice>
-        <mc:Fallback>
+        <mc:Fallback xmlns="">
           <p:sp>
             <p:nvSpPr>
               <p:cNvPr id="3" name="Content Placeholder 2">

</xml_diff>

<commit_message>
Edited Experimental Methods Section
</commit_message>
<xml_diff>
--- a/Research_Project/LHCb Starterkit/MSc Research Project Progress 31 Aug 2022 [Autosaved].pptx
+++ b/Research_Project/LHCb Starterkit/MSc Research Project Progress 31 Aug 2022 [Autosaved].pptx
@@ -5679,7 +5679,10 @@
           <a:bodyPr/>
           <a:lstStyle/>
           <a:p>
-            <a:endParaRPr lang="en-AU"/>
+            <a:r>
+              <a:rPr lang="en-AU" b="1" dirty="0"/>
+              <a:t>Coupling Strength vs ALP Mass (fixed Branching Ratio)</a:t>
+            </a:r>
           </a:p>
         </p:txBody>
       </p:sp>
@@ -5707,8 +5710,8 @@
         </p:blipFill>
         <p:spPr>
           <a:xfrm>
-            <a:off x="121012" y="2000885"/>
-            <a:ext cx="5771788" cy="4601726"/>
+            <a:off x="0" y="1862797"/>
+            <a:ext cx="5373278" cy="4284002"/>
           </a:xfrm>
         </p:spPr>
       </p:pic>
@@ -5734,7 +5737,7 @@
         </p:blipFill>
         <p:spPr>
           <a:xfrm>
-            <a:off x="5991691" y="2322714"/>
+            <a:off x="5586338" y="1983349"/>
             <a:ext cx="5588206" cy="3824085"/>
           </a:xfrm>
           <a:prstGeom prst="rect">

</xml_diff>

<commit_message>
Added some references for Ch 1 of thesis
</commit_message>
<xml_diff>
--- a/Research_Project/LHCb Starterkit/MSc Research Project Progress 31 Aug 2022 [Autosaved].pptx
+++ b/Research_Project/LHCb Starterkit/MSc Research Project Progress 31 Aug 2022 [Autosaved].pptx
@@ -5,7 +5,7 @@
     <p:sldMasterId id="2147483648" r:id="rId1"/>
   </p:sldMasterIdLst>
   <p:notesMasterIdLst>
-    <p:notesMasterId r:id="rId13"/>
+    <p:notesMasterId r:id="rId14"/>
   </p:notesMasterIdLst>
   <p:sldIdLst>
     <p:sldId id="256" r:id="rId2"/>
@@ -13,12 +13,13 @@
     <p:sldId id="258" r:id="rId4"/>
     <p:sldId id="259" r:id="rId5"/>
     <p:sldId id="261" r:id="rId6"/>
-    <p:sldId id="262" r:id="rId7"/>
-    <p:sldId id="263" r:id="rId8"/>
-    <p:sldId id="260" r:id="rId9"/>
-    <p:sldId id="264" r:id="rId10"/>
-    <p:sldId id="265" r:id="rId11"/>
-    <p:sldId id="266" r:id="rId12"/>
+    <p:sldId id="267" r:id="rId7"/>
+    <p:sldId id="262" r:id="rId8"/>
+    <p:sldId id="263" r:id="rId9"/>
+    <p:sldId id="260" r:id="rId10"/>
+    <p:sldId id="264" r:id="rId11"/>
+    <p:sldId id="265" r:id="rId12"/>
+    <p:sldId id="266" r:id="rId13"/>
   </p:sldIdLst>
   <p:sldSz cx="12192000" cy="6858000"/>
   <p:notesSz cx="6858000" cy="9144000"/>
@@ -207,7 +208,7 @@
           <a:p>
             <a:fld id="{FC50BE67-3C8E-4570-A99E-8EC5CD30FB7F}" type="datetimeFigureOut">
               <a:rPr lang="en-AU" smtClean="0"/>
-              <a:t>9/11/2022</a:t>
+              <a:t>15/11/2022</a:t>
             </a:fld>
             <a:endParaRPr lang="en-AU"/>
           </a:p>
@@ -708,7 +709,7 @@
           <a:p>
             <a:fld id="{6D79F432-8B29-4E94-9828-C190BA0C460D}" type="datetimeFigureOut">
               <a:rPr lang="en-AU" smtClean="0"/>
-              <a:t>9/11/2022</a:t>
+              <a:t>15/11/2022</a:t>
             </a:fld>
             <a:endParaRPr lang="en-AU"/>
           </a:p>
@@ -908,7 +909,7 @@
           <a:p>
             <a:fld id="{6D79F432-8B29-4E94-9828-C190BA0C460D}" type="datetimeFigureOut">
               <a:rPr lang="en-AU" smtClean="0"/>
-              <a:t>9/11/2022</a:t>
+              <a:t>15/11/2022</a:t>
             </a:fld>
             <a:endParaRPr lang="en-AU"/>
           </a:p>
@@ -1118,7 +1119,7 @@
           <a:p>
             <a:fld id="{6D79F432-8B29-4E94-9828-C190BA0C460D}" type="datetimeFigureOut">
               <a:rPr lang="en-AU" smtClean="0"/>
-              <a:t>9/11/2022</a:t>
+              <a:t>15/11/2022</a:t>
             </a:fld>
             <a:endParaRPr lang="en-AU"/>
           </a:p>
@@ -1318,7 +1319,7 @@
           <a:p>
             <a:fld id="{6D79F432-8B29-4E94-9828-C190BA0C460D}" type="datetimeFigureOut">
               <a:rPr lang="en-AU" smtClean="0"/>
-              <a:t>9/11/2022</a:t>
+              <a:t>15/11/2022</a:t>
             </a:fld>
             <a:endParaRPr lang="en-AU"/>
           </a:p>
@@ -1594,7 +1595,7 @@
           <a:p>
             <a:fld id="{6D79F432-8B29-4E94-9828-C190BA0C460D}" type="datetimeFigureOut">
               <a:rPr lang="en-AU" smtClean="0"/>
-              <a:t>9/11/2022</a:t>
+              <a:t>15/11/2022</a:t>
             </a:fld>
             <a:endParaRPr lang="en-AU"/>
           </a:p>
@@ -1862,7 +1863,7 @@
           <a:p>
             <a:fld id="{6D79F432-8B29-4E94-9828-C190BA0C460D}" type="datetimeFigureOut">
               <a:rPr lang="en-AU" smtClean="0"/>
-              <a:t>9/11/2022</a:t>
+              <a:t>15/11/2022</a:t>
             </a:fld>
             <a:endParaRPr lang="en-AU"/>
           </a:p>
@@ -2277,7 +2278,7 @@
           <a:p>
             <a:fld id="{6D79F432-8B29-4E94-9828-C190BA0C460D}" type="datetimeFigureOut">
               <a:rPr lang="en-AU" smtClean="0"/>
-              <a:t>9/11/2022</a:t>
+              <a:t>15/11/2022</a:t>
             </a:fld>
             <a:endParaRPr lang="en-AU"/>
           </a:p>
@@ -2419,7 +2420,7 @@
           <a:p>
             <a:fld id="{6D79F432-8B29-4E94-9828-C190BA0C460D}" type="datetimeFigureOut">
               <a:rPr lang="en-AU" smtClean="0"/>
-              <a:t>9/11/2022</a:t>
+              <a:t>15/11/2022</a:t>
             </a:fld>
             <a:endParaRPr lang="en-AU"/>
           </a:p>
@@ -2532,7 +2533,7 @@
           <a:p>
             <a:fld id="{6D79F432-8B29-4E94-9828-C190BA0C460D}" type="datetimeFigureOut">
               <a:rPr lang="en-AU" smtClean="0"/>
-              <a:t>9/11/2022</a:t>
+              <a:t>15/11/2022</a:t>
             </a:fld>
             <a:endParaRPr lang="en-AU"/>
           </a:p>
@@ -2845,7 +2846,7 @@
           <a:p>
             <a:fld id="{6D79F432-8B29-4E94-9828-C190BA0C460D}" type="datetimeFigureOut">
               <a:rPr lang="en-AU" smtClean="0"/>
-              <a:t>9/11/2022</a:t>
+              <a:t>15/11/2022</a:t>
             </a:fld>
             <a:endParaRPr lang="en-AU"/>
           </a:p>
@@ -3134,7 +3135,7 @@
           <a:p>
             <a:fld id="{6D79F432-8B29-4E94-9828-C190BA0C460D}" type="datetimeFigureOut">
               <a:rPr lang="en-AU" smtClean="0"/>
-              <a:t>9/11/2022</a:t>
+              <a:t>15/11/2022</a:t>
             </a:fld>
             <a:endParaRPr lang="en-AU"/>
           </a:p>
@@ -3377,7 +3378,7 @@
           <a:p>
             <a:fld id="{6D79F432-8B29-4E94-9828-C190BA0C460D}" type="datetimeFigureOut">
               <a:rPr lang="en-AU" smtClean="0"/>
-              <a:t>9/11/2022</a:t>
+              <a:t>15/11/2022</a:t>
             </a:fld>
             <a:endParaRPr lang="en-AU"/>
           </a:p>
@@ -4584,6 +4585,2119 @@
           <a:chExt cx="0" cy="0"/>
         </a:xfrm>
       </p:grpSpPr>
+      <p:sp>
+        <p:nvSpPr>
+          <p:cNvPr id="2" name="Title 1">
+            <a:extLst>
+              <a:ext uri="{FF2B5EF4-FFF2-40B4-BE49-F238E27FC236}">
+                <a16:creationId xmlns:a16="http://schemas.microsoft.com/office/drawing/2014/main" id="{C031A75E-9A22-B5E6-4C87-D6265CDC5810}"/>
+              </a:ext>
+            </a:extLst>
+          </p:cNvPr>
+          <p:cNvSpPr>
+            <a:spLocks noGrp="1"/>
+          </p:cNvSpPr>
+          <p:nvPr>
+            <p:ph type="title"/>
+          </p:nvPr>
+        </p:nvSpPr>
+        <p:spPr/>
+        <p:txBody>
+          <a:bodyPr/>
+          <a:lstStyle/>
+          <a:p>
+            <a:r>
+              <a:rPr lang="en-AU" b="1" dirty="0"/>
+              <a:t>Link Between Branching Ratio, Coupling Strength and Mass of ALP</a:t>
+            </a:r>
+          </a:p>
+        </p:txBody>
+      </p:sp>
+      <mc:AlternateContent xmlns:mc="http://schemas.openxmlformats.org/markup-compatibility/2006" xmlns:a14="http://schemas.microsoft.com/office/drawing/2010/main">
+        <mc:Choice Requires="a14">
+          <p:sp>
+            <p:nvSpPr>
+              <p:cNvPr id="3" name="Content Placeholder 2">
+                <a:extLst>
+                  <a:ext uri="{FF2B5EF4-FFF2-40B4-BE49-F238E27FC236}">
+                    <a16:creationId xmlns:a16="http://schemas.microsoft.com/office/drawing/2014/main" id="{82478C4D-36D7-B03B-DB92-4BCFE01B6A3A}"/>
+                  </a:ext>
+                </a:extLst>
+              </p:cNvPr>
+              <p:cNvSpPr>
+                <a:spLocks noGrp="1"/>
+              </p:cNvSpPr>
+              <p:nvPr>
+                <p:ph idx="1"/>
+              </p:nvPr>
+            </p:nvSpPr>
+            <p:spPr>
+              <a:xfrm>
+                <a:off x="838200" y="1800686"/>
+                <a:ext cx="10515600" cy="4351338"/>
+              </a:xfrm>
+            </p:spPr>
+            <p:txBody>
+              <a:bodyPr>
+                <a:normAutofit fontScale="92500" lnSpcReduction="10000"/>
+              </a:bodyPr>
+              <a:lstStyle/>
+              <a:p>
+                <a:pPr marL="0" indent="0">
+                  <a:buNone/>
+                </a:pPr>
+                <a14:m>
+                  <m:oMathPara xmlns:m="http://schemas.openxmlformats.org/officeDocument/2006/math">
+                    <m:oMathParaPr>
+                      <m:jc m:val="centerGroup"/>
+                    </m:oMathParaPr>
+                    <m:oMath xmlns:m="http://schemas.openxmlformats.org/officeDocument/2006/math">
+                      <m:r>
+                        <a:rPr lang="en-AU" b="0" i="1" smtClean="0">
+                          <a:latin typeface="Cambria Math" panose="02040503050406030204" pitchFamily="18" charset="0"/>
+                        </a:rPr>
+                        <m:t>𝐵𝑅</m:t>
+                      </m:r>
+                      <m:d>
+                        <m:dPr>
+                          <m:ctrlPr>
+                            <a:rPr lang="en-AU" b="0" i="1" smtClean="0">
+                              <a:latin typeface="Cambria Math" panose="02040503050406030204" pitchFamily="18" charset="0"/>
+                            </a:rPr>
+                          </m:ctrlPr>
+                        </m:dPr>
+                        <m:e>
+                          <m:sSup>
+                            <m:sSupPr>
+                              <m:ctrlPr>
+                                <a:rPr lang="en-AU" b="0" i="1" smtClean="0">
+                                  <a:latin typeface="Cambria Math" panose="02040503050406030204" pitchFamily="18" charset="0"/>
+                                </a:rPr>
+                              </m:ctrlPr>
+                            </m:sSupPr>
+                            <m:e>
+                              <m:r>
+                                <a:rPr lang="en-AU" b="0" i="1" smtClean="0">
+                                  <a:latin typeface="Cambria Math" panose="02040503050406030204" pitchFamily="18" charset="0"/>
+                                </a:rPr>
+                                <m:t>𝐵</m:t>
+                              </m:r>
+                            </m:e>
+                            <m:sup>
+                              <m:r>
+                                <a:rPr lang="en-AU" b="0" i="1" smtClean="0">
+                                  <a:latin typeface="Cambria Math" panose="02040503050406030204" pitchFamily="18" charset="0"/>
+                                </a:rPr>
+                                <m:t>0</m:t>
+                              </m:r>
+                            </m:sup>
+                          </m:sSup>
+                          <m:r>
+                            <a:rPr lang="en-AU" b="0" i="1" smtClean="0">
+                              <a:latin typeface="Cambria Math" panose="02040503050406030204" pitchFamily="18" charset="0"/>
+                            </a:rPr>
+                            <m:t>→</m:t>
+                          </m:r>
+                          <m:sSup>
+                            <m:sSupPr>
+                              <m:ctrlPr>
+                                <a:rPr lang="en-AU" b="0" i="1" smtClean="0">
+                                  <a:latin typeface="Cambria Math" panose="02040503050406030204" pitchFamily="18" charset="0"/>
+                                </a:rPr>
+                              </m:ctrlPr>
+                            </m:sSupPr>
+                            <m:e>
+                              <m:r>
+                                <a:rPr lang="en-AU" b="0" i="1" smtClean="0">
+                                  <a:latin typeface="Cambria Math" panose="02040503050406030204" pitchFamily="18" charset="0"/>
+                                </a:rPr>
+                                <m:t>𝐾</m:t>
+                              </m:r>
+                            </m:e>
+                            <m:sup>
+                              <m:r>
+                                <a:rPr lang="en-AU" b="0" i="1" smtClean="0">
+                                  <a:latin typeface="Cambria Math" panose="02040503050406030204" pitchFamily="18" charset="0"/>
+                                </a:rPr>
+                                <m:t>∗</m:t>
+                              </m:r>
+                            </m:sup>
+                          </m:sSup>
+                          <m:sSub>
+                            <m:sSubPr>
+                              <m:ctrlPr>
+                                <a:rPr lang="en-AU" b="0" i="1" smtClean="0">
+                                  <a:latin typeface="Cambria Math" panose="02040503050406030204" pitchFamily="18" charset="0"/>
+                                </a:rPr>
+                              </m:ctrlPr>
+                            </m:sSubPr>
+                            <m:e>
+                              <m:r>
+                                <a:rPr lang="en-AU" b="0" i="1" smtClean="0">
+                                  <a:latin typeface="Cambria Math" panose="02040503050406030204" pitchFamily="18" charset="0"/>
+                                </a:rPr>
+                                <m:t>𝑎</m:t>
+                              </m:r>
+                            </m:e>
+                            <m:sub>
+                              <m:r>
+                                <a:rPr lang="en-AU" b="0" i="1" smtClean="0">
+                                  <a:latin typeface="Cambria Math" panose="02040503050406030204" pitchFamily="18" charset="0"/>
+                                </a:rPr>
+                                <m:t>0</m:t>
+                              </m:r>
+                            </m:sub>
+                          </m:sSub>
+                          <m:r>
+                            <a:rPr lang="en-AU" b="0" i="1" smtClean="0">
+                              <a:latin typeface="Cambria Math" panose="02040503050406030204" pitchFamily="18" charset="0"/>
+                            </a:rPr>
+                            <m:t>, </m:t>
+                          </m:r>
+                          <m:sSub>
+                            <m:sSubPr>
+                              <m:ctrlPr>
+                                <a:rPr lang="en-AU" b="0" i="1" smtClean="0">
+                                  <a:latin typeface="Cambria Math" panose="02040503050406030204" pitchFamily="18" charset="0"/>
+                                </a:rPr>
+                              </m:ctrlPr>
+                            </m:sSubPr>
+                            <m:e>
+                              <m:r>
+                                <a:rPr lang="en-AU" b="0" i="1" smtClean="0">
+                                  <a:latin typeface="Cambria Math" panose="02040503050406030204" pitchFamily="18" charset="0"/>
+                                </a:rPr>
+                                <m:t>𝑎</m:t>
+                              </m:r>
+                            </m:e>
+                            <m:sub>
+                              <m:r>
+                                <a:rPr lang="en-AU" b="0" i="1" smtClean="0">
+                                  <a:latin typeface="Cambria Math" panose="02040503050406030204" pitchFamily="18" charset="0"/>
+                                </a:rPr>
+                                <m:t>0</m:t>
+                              </m:r>
+                            </m:sub>
+                          </m:sSub>
+                          <m:r>
+                            <a:rPr lang="en-AU" b="0" i="1" smtClean="0">
+                              <a:latin typeface="Cambria Math" panose="02040503050406030204" pitchFamily="18" charset="0"/>
+                            </a:rPr>
+                            <m:t>→</m:t>
+                          </m:r>
+                          <m:r>
+                            <a:rPr lang="en-AU" b="0" i="1" smtClean="0">
+                              <a:latin typeface="Cambria Math" panose="02040503050406030204" pitchFamily="18" charset="0"/>
+                            </a:rPr>
+                            <m:t>𝛾𝛾</m:t>
+                          </m:r>
+                        </m:e>
+                      </m:d>
+                      <m:r>
+                        <a:rPr lang="en-AU" b="0" i="1" smtClean="0">
+                          <a:latin typeface="Cambria Math" panose="02040503050406030204" pitchFamily="18" charset="0"/>
+                        </a:rPr>
+                        <m:t>=</m:t>
+                      </m:r>
+                      <m:r>
+                        <m:rPr>
+                          <m:sty m:val="p"/>
+                        </m:rPr>
+                        <a:rPr lang="en-AU" b="0" i="0" smtClean="0">
+                          <a:latin typeface="Cambria Math" panose="02040503050406030204" pitchFamily="18" charset="0"/>
+                        </a:rPr>
+                        <m:t>Γ</m:t>
+                      </m:r>
+                      <m:d>
+                        <m:dPr>
+                          <m:ctrlPr>
+                            <a:rPr lang="en-AU" b="0" i="1" smtClean="0">
+                              <a:latin typeface="Cambria Math" panose="02040503050406030204" pitchFamily="18" charset="0"/>
+                            </a:rPr>
+                          </m:ctrlPr>
+                        </m:dPr>
+                        <m:e>
+                          <m:sSup>
+                            <m:sSupPr>
+                              <m:ctrlPr>
+                                <a:rPr lang="en-AU" b="0" i="1" smtClean="0">
+                                  <a:latin typeface="Cambria Math" panose="02040503050406030204" pitchFamily="18" charset="0"/>
+                                </a:rPr>
+                              </m:ctrlPr>
+                            </m:sSupPr>
+                            <m:e>
+                              <m:r>
+                                <a:rPr lang="en-AU" b="0" i="1" smtClean="0">
+                                  <a:latin typeface="Cambria Math" panose="02040503050406030204" pitchFamily="18" charset="0"/>
+                                </a:rPr>
+                                <m:t>𝐵</m:t>
+                              </m:r>
+                            </m:e>
+                            <m:sup>
+                              <m:r>
+                                <a:rPr lang="en-AU" b="0" i="1" smtClean="0">
+                                  <a:latin typeface="Cambria Math" panose="02040503050406030204" pitchFamily="18" charset="0"/>
+                                </a:rPr>
+                                <m:t>0</m:t>
+                              </m:r>
+                            </m:sup>
+                          </m:sSup>
+                          <m:r>
+                            <a:rPr lang="en-AU" b="0" i="1" smtClean="0">
+                              <a:latin typeface="Cambria Math" panose="02040503050406030204" pitchFamily="18" charset="0"/>
+                            </a:rPr>
+                            <m:t>→</m:t>
+                          </m:r>
+                          <m:sSup>
+                            <m:sSupPr>
+                              <m:ctrlPr>
+                                <a:rPr lang="en-AU" b="0" i="1" smtClean="0">
+                                  <a:latin typeface="Cambria Math" panose="02040503050406030204" pitchFamily="18" charset="0"/>
+                                </a:rPr>
+                              </m:ctrlPr>
+                            </m:sSupPr>
+                            <m:e>
+                              <m:r>
+                                <a:rPr lang="en-AU" b="0" i="1" smtClean="0">
+                                  <a:latin typeface="Cambria Math" panose="02040503050406030204" pitchFamily="18" charset="0"/>
+                                </a:rPr>
+                                <m:t>𝐾</m:t>
+                              </m:r>
+                            </m:e>
+                            <m:sup>
+                              <m:r>
+                                <a:rPr lang="en-AU" b="0" i="1" smtClean="0">
+                                  <a:latin typeface="Cambria Math" panose="02040503050406030204" pitchFamily="18" charset="0"/>
+                                </a:rPr>
+                                <m:t>∗</m:t>
+                              </m:r>
+                            </m:sup>
+                          </m:sSup>
+                          <m:sSub>
+                            <m:sSubPr>
+                              <m:ctrlPr>
+                                <a:rPr lang="en-AU" b="0" i="1" smtClean="0">
+                                  <a:latin typeface="Cambria Math" panose="02040503050406030204" pitchFamily="18" charset="0"/>
+                                </a:rPr>
+                              </m:ctrlPr>
+                            </m:sSubPr>
+                            <m:e>
+                              <m:r>
+                                <a:rPr lang="en-AU" b="0" i="1" smtClean="0">
+                                  <a:latin typeface="Cambria Math" panose="02040503050406030204" pitchFamily="18" charset="0"/>
+                                </a:rPr>
+                                <m:t>𝑎</m:t>
+                              </m:r>
+                            </m:e>
+                            <m:sub>
+                              <m:r>
+                                <a:rPr lang="en-AU" b="0" i="1" smtClean="0">
+                                  <a:latin typeface="Cambria Math" panose="02040503050406030204" pitchFamily="18" charset="0"/>
+                                </a:rPr>
+                                <m:t>0</m:t>
+                              </m:r>
+                            </m:sub>
+                          </m:sSub>
+                        </m:e>
+                      </m:d>
+                      <m:sSub>
+                        <m:sSubPr>
+                          <m:ctrlPr>
+                            <a:rPr lang="en-AU" b="0" i="1" smtClean="0">
+                              <a:latin typeface="Cambria Math" panose="02040503050406030204" pitchFamily="18" charset="0"/>
+                            </a:rPr>
+                          </m:ctrlPr>
+                        </m:sSubPr>
+                        <m:e>
+                          <m:r>
+                            <a:rPr lang="en-AU" b="0" i="1" smtClean="0">
+                              <a:latin typeface="Cambria Math" panose="02040503050406030204" pitchFamily="18" charset="0"/>
+                            </a:rPr>
+                            <m:t>𝜏</m:t>
+                          </m:r>
+                        </m:e>
+                        <m:sub>
+                          <m:sSup>
+                            <m:sSupPr>
+                              <m:ctrlPr>
+                                <a:rPr lang="en-AU" b="0" i="1" smtClean="0">
+                                  <a:latin typeface="Cambria Math" panose="02040503050406030204" pitchFamily="18" charset="0"/>
+                                </a:rPr>
+                              </m:ctrlPr>
+                            </m:sSupPr>
+                            <m:e>
+                              <m:r>
+                                <a:rPr lang="en-AU" b="0" i="1" smtClean="0">
+                                  <a:latin typeface="Cambria Math" panose="02040503050406030204" pitchFamily="18" charset="0"/>
+                                </a:rPr>
+                                <m:t>𝐵</m:t>
+                              </m:r>
+                            </m:e>
+                            <m:sup>
+                              <m:r>
+                                <a:rPr lang="en-AU" b="0" i="1" smtClean="0">
+                                  <a:latin typeface="Cambria Math" panose="02040503050406030204" pitchFamily="18" charset="0"/>
+                                </a:rPr>
+                                <m:t>0</m:t>
+                              </m:r>
+                            </m:sup>
+                          </m:sSup>
+                        </m:sub>
+                      </m:sSub>
+                      <m:r>
+                        <m:rPr>
+                          <m:sty m:val="p"/>
+                        </m:rPr>
+                        <a:rPr lang="en-AU" b="0" i="0" smtClean="0">
+                          <a:latin typeface="Cambria Math" panose="02040503050406030204" pitchFamily="18" charset="0"/>
+                        </a:rPr>
+                        <m:t>Γ</m:t>
+                      </m:r>
+                      <m:d>
+                        <m:dPr>
+                          <m:ctrlPr>
+                            <a:rPr lang="en-AU" b="0" i="1" smtClean="0">
+                              <a:latin typeface="Cambria Math" panose="02040503050406030204" pitchFamily="18" charset="0"/>
+                            </a:rPr>
+                          </m:ctrlPr>
+                        </m:dPr>
+                        <m:e>
+                          <m:sSub>
+                            <m:sSubPr>
+                              <m:ctrlPr>
+                                <a:rPr lang="en-AU" b="0" i="1" smtClean="0">
+                                  <a:latin typeface="Cambria Math" panose="02040503050406030204" pitchFamily="18" charset="0"/>
+                                </a:rPr>
+                              </m:ctrlPr>
+                            </m:sSubPr>
+                            <m:e>
+                              <m:r>
+                                <a:rPr lang="en-AU" b="0" i="1" smtClean="0">
+                                  <a:latin typeface="Cambria Math" panose="02040503050406030204" pitchFamily="18" charset="0"/>
+                                </a:rPr>
+                                <m:t>𝑎</m:t>
+                              </m:r>
+                            </m:e>
+                            <m:sub>
+                              <m:r>
+                                <a:rPr lang="en-AU" b="0" i="1" smtClean="0">
+                                  <a:latin typeface="Cambria Math" panose="02040503050406030204" pitchFamily="18" charset="0"/>
+                                </a:rPr>
+                                <m:t>0</m:t>
+                              </m:r>
+                            </m:sub>
+                          </m:sSub>
+                          <m:r>
+                            <a:rPr lang="en-AU" b="0" i="1" smtClean="0">
+                              <a:latin typeface="Cambria Math" panose="02040503050406030204" pitchFamily="18" charset="0"/>
+                            </a:rPr>
+                            <m:t>→</m:t>
+                          </m:r>
+                          <m:r>
+                            <a:rPr lang="en-AU" b="0" i="1" smtClean="0">
+                              <a:latin typeface="Cambria Math" panose="02040503050406030204" pitchFamily="18" charset="0"/>
+                            </a:rPr>
+                            <m:t>𝛾𝛾</m:t>
+                          </m:r>
+                        </m:e>
+                      </m:d>
+                      <m:sSub>
+                        <m:sSubPr>
+                          <m:ctrlPr>
+                            <a:rPr lang="en-AU" b="0" i="1" smtClean="0">
+                              <a:latin typeface="Cambria Math" panose="02040503050406030204" pitchFamily="18" charset="0"/>
+                            </a:rPr>
+                          </m:ctrlPr>
+                        </m:sSubPr>
+                        <m:e>
+                          <m:r>
+                            <a:rPr lang="en-AU" b="0" i="1" smtClean="0">
+                              <a:latin typeface="Cambria Math" panose="02040503050406030204" pitchFamily="18" charset="0"/>
+                            </a:rPr>
+                            <m:t>𝜏</m:t>
+                          </m:r>
+                        </m:e>
+                        <m:sub>
+                          <m:sSub>
+                            <m:sSubPr>
+                              <m:ctrlPr>
+                                <a:rPr lang="en-AU" b="0" i="1" smtClean="0">
+                                  <a:latin typeface="Cambria Math" panose="02040503050406030204" pitchFamily="18" charset="0"/>
+                                </a:rPr>
+                              </m:ctrlPr>
+                            </m:sSubPr>
+                            <m:e>
+                              <m:r>
+                                <a:rPr lang="en-AU" b="0" i="1" smtClean="0">
+                                  <a:latin typeface="Cambria Math" panose="02040503050406030204" pitchFamily="18" charset="0"/>
+                                </a:rPr>
+                                <m:t>𝑎</m:t>
+                              </m:r>
+                            </m:e>
+                            <m:sub>
+                              <m:r>
+                                <a:rPr lang="en-AU" b="0" i="1" smtClean="0">
+                                  <a:latin typeface="Cambria Math" panose="02040503050406030204" pitchFamily="18" charset="0"/>
+                                </a:rPr>
+                                <m:t>0</m:t>
+                              </m:r>
+                            </m:sub>
+                          </m:sSub>
+                        </m:sub>
+                      </m:sSub>
+                    </m:oMath>
+                  </m:oMathPara>
+                </a14:m>
+                <a:endParaRPr lang="en-AU" b="0" dirty="0"/>
+              </a:p>
+              <a:p>
+                <a:pPr marL="0" indent="0">
+                  <a:buNone/>
+                </a:pPr>
+                <a14:m>
+                  <m:oMathPara xmlns:m="http://schemas.openxmlformats.org/officeDocument/2006/math">
+                    <m:oMathParaPr>
+                      <m:jc m:val="centerGroup"/>
+                    </m:oMathParaPr>
+                    <m:oMath xmlns:m="http://schemas.openxmlformats.org/officeDocument/2006/math">
+                      <m:r>
+                        <a:rPr lang="en-AU" b="0" i="1" smtClean="0">
+                          <a:latin typeface="Cambria Math" panose="02040503050406030204" pitchFamily="18" charset="0"/>
+                        </a:rPr>
+                        <m:t>=</m:t>
+                      </m:r>
+                      <m:d>
+                        <m:dPr>
+                          <m:ctrlPr>
+                            <a:rPr lang="en-AU" b="0" i="1" smtClean="0">
+                              <a:latin typeface="Cambria Math" panose="02040503050406030204" pitchFamily="18" charset="0"/>
+                            </a:rPr>
+                          </m:ctrlPr>
+                        </m:dPr>
+                        <m:e>
+                          <m:f>
+                            <m:fPr>
+                              <m:ctrlPr>
+                                <a:rPr lang="en-AU" b="0" i="1" smtClean="0">
+                                  <a:latin typeface="Cambria Math" panose="02040503050406030204" pitchFamily="18" charset="0"/>
+                                </a:rPr>
+                              </m:ctrlPr>
+                            </m:fPr>
+                            <m:num>
+                              <m:sSubSup>
+                                <m:sSubSupPr>
+                                  <m:ctrlPr>
+                                    <a:rPr lang="en-AU" b="0" i="1" smtClean="0">
+                                      <a:latin typeface="Cambria Math" panose="02040503050406030204" pitchFamily="18" charset="0"/>
+                                    </a:rPr>
+                                  </m:ctrlPr>
+                                </m:sSubSupPr>
+                                <m:e>
+                                  <m:r>
+                                    <a:rPr lang="en-AU" b="0" i="1" smtClean="0">
+                                      <a:latin typeface="Cambria Math" panose="02040503050406030204" pitchFamily="18" charset="0"/>
+                                    </a:rPr>
+                                    <m:t>𝑀</m:t>
+                                  </m:r>
+                                </m:e>
+                                <m:sub>
+                                  <m:r>
+                                    <a:rPr lang="en-AU" b="0" i="1" smtClean="0">
+                                      <a:latin typeface="Cambria Math" panose="02040503050406030204" pitchFamily="18" charset="0"/>
+                                    </a:rPr>
+                                    <m:t>𝐵</m:t>
+                                  </m:r>
+                                </m:sub>
+                                <m:sup>
+                                  <m:r>
+                                    <a:rPr lang="en-AU" b="0" i="1" smtClean="0">
+                                      <a:latin typeface="Cambria Math" panose="02040503050406030204" pitchFamily="18" charset="0"/>
+                                    </a:rPr>
+                                    <m:t>3</m:t>
+                                  </m:r>
+                                </m:sup>
+                              </m:sSubSup>
+                            </m:num>
+                            <m:den>
+                              <m:r>
+                                <a:rPr lang="en-AU" b="0" i="1" smtClean="0">
+                                  <a:latin typeface="Cambria Math" panose="02040503050406030204" pitchFamily="18" charset="0"/>
+                                </a:rPr>
+                                <m:t>64</m:t>
+                              </m:r>
+                              <m:r>
+                                <a:rPr lang="en-AU" b="0" i="1" smtClean="0">
+                                  <a:latin typeface="Cambria Math" panose="02040503050406030204" pitchFamily="18" charset="0"/>
+                                </a:rPr>
+                                <m:t>𝜋</m:t>
+                              </m:r>
+                            </m:den>
+                          </m:f>
+                          <m:sSup>
+                            <m:sSupPr>
+                              <m:ctrlPr>
+                                <a:rPr lang="en-AU" b="0" i="1" smtClean="0">
+                                  <a:latin typeface="Cambria Math" panose="02040503050406030204" pitchFamily="18" charset="0"/>
+                                </a:rPr>
+                              </m:ctrlPr>
+                            </m:sSupPr>
+                            <m:e>
+                              <m:d>
+                                <m:dPr>
+                                  <m:begChr m:val="|"/>
+                                  <m:endChr m:val="|"/>
+                                  <m:ctrlPr>
+                                    <a:rPr lang="en-AU" b="0" i="1" smtClean="0">
+                                      <a:latin typeface="Cambria Math" panose="02040503050406030204" pitchFamily="18" charset="0"/>
+                                    </a:rPr>
+                                  </m:ctrlPr>
+                                </m:dPr>
+                                <m:e>
+                                  <m:sSub>
+                                    <m:sSubPr>
+                                      <m:ctrlPr>
+                                        <a:rPr lang="en-AU" b="0" i="1" smtClean="0">
+                                          <a:latin typeface="Cambria Math" panose="02040503050406030204" pitchFamily="18" charset="0"/>
+                                        </a:rPr>
+                                      </m:ctrlPr>
+                                    </m:sSubPr>
+                                    <m:e>
+                                      <m:r>
+                                        <a:rPr lang="en-AU" b="0" i="1" smtClean="0">
+                                          <a:latin typeface="Cambria Math" panose="02040503050406030204" pitchFamily="18" charset="0"/>
+                                        </a:rPr>
+                                        <m:t>𝑔</m:t>
+                                      </m:r>
+                                    </m:e>
+                                    <m:sub>
+                                      <m:r>
+                                        <a:rPr lang="en-AU" b="0" i="1" smtClean="0">
+                                          <a:latin typeface="Cambria Math" panose="02040503050406030204" pitchFamily="18" charset="0"/>
+                                        </a:rPr>
+                                        <m:t>𝑎𝑏𝑠</m:t>
+                                      </m:r>
+                                    </m:sub>
+                                  </m:sSub>
+                                </m:e>
+                              </m:d>
+                            </m:e>
+                            <m:sup>
+                              <m:r>
+                                <a:rPr lang="en-AU" b="0" i="1" smtClean="0">
+                                  <a:latin typeface="Cambria Math" panose="02040503050406030204" pitchFamily="18" charset="0"/>
+                                </a:rPr>
+                                <m:t>2</m:t>
+                              </m:r>
+                            </m:sup>
+                          </m:sSup>
+                          <m:sSubSup>
+                            <m:sSubSupPr>
+                              <m:ctrlPr>
+                                <a:rPr lang="en-AU" b="0" i="1" smtClean="0">
+                                  <a:latin typeface="Cambria Math" panose="02040503050406030204" pitchFamily="18" charset="0"/>
+                                </a:rPr>
+                              </m:ctrlPr>
+                            </m:sSubSupPr>
+                            <m:e>
+                              <m:r>
+                                <a:rPr lang="en-AU" b="0" i="1" smtClean="0">
+                                  <a:latin typeface="Cambria Math" panose="02040503050406030204" pitchFamily="18" charset="0"/>
+                                </a:rPr>
+                                <m:t>𝐴</m:t>
+                              </m:r>
+                            </m:e>
+                            <m:sub>
+                              <m:r>
+                                <a:rPr lang="en-AU" b="0" i="1" smtClean="0">
+                                  <a:latin typeface="Cambria Math" panose="02040503050406030204" pitchFamily="18" charset="0"/>
+                                </a:rPr>
+                                <m:t>0</m:t>
+                              </m:r>
+                            </m:sub>
+                            <m:sup>
+                              <m:r>
+                                <a:rPr lang="en-AU" b="0" i="1" smtClean="0">
+                                  <a:latin typeface="Cambria Math" panose="02040503050406030204" pitchFamily="18" charset="0"/>
+                                </a:rPr>
+                                <m:t>2</m:t>
+                              </m:r>
+                            </m:sup>
+                          </m:sSubSup>
+                          <m:d>
+                            <m:dPr>
+                              <m:ctrlPr>
+                                <a:rPr lang="en-AU" b="0" i="1" smtClean="0">
+                                  <a:latin typeface="Cambria Math" panose="02040503050406030204" pitchFamily="18" charset="0"/>
+                                </a:rPr>
+                              </m:ctrlPr>
+                            </m:dPr>
+                            <m:e>
+                              <m:sSubSup>
+                                <m:sSubSupPr>
+                                  <m:ctrlPr>
+                                    <a:rPr lang="en-AU" b="0" i="1" smtClean="0">
+                                      <a:latin typeface="Cambria Math" panose="02040503050406030204" pitchFamily="18" charset="0"/>
+                                    </a:rPr>
+                                  </m:ctrlPr>
+                                </m:sSubSupPr>
+                                <m:e>
+                                  <m:r>
+                                    <a:rPr lang="en-AU" b="0" i="1" smtClean="0">
+                                      <a:latin typeface="Cambria Math" panose="02040503050406030204" pitchFamily="18" charset="0"/>
+                                    </a:rPr>
+                                    <m:t>𝑀</m:t>
+                                  </m:r>
+                                </m:e>
+                                <m:sub>
+                                  <m:r>
+                                    <a:rPr lang="en-AU" b="0" i="1" smtClean="0">
+                                      <a:latin typeface="Cambria Math" panose="02040503050406030204" pitchFamily="18" charset="0"/>
+                                    </a:rPr>
+                                    <m:t>𝑎</m:t>
+                                  </m:r>
+                                </m:sub>
+                                <m:sup>
+                                  <m:r>
+                                    <a:rPr lang="en-AU" b="0" i="1" smtClean="0">
+                                      <a:latin typeface="Cambria Math" panose="02040503050406030204" pitchFamily="18" charset="0"/>
+                                    </a:rPr>
+                                    <m:t>2</m:t>
+                                  </m:r>
+                                </m:sup>
+                              </m:sSubSup>
+                            </m:e>
+                          </m:d>
+                          <m:sSubSup>
+                            <m:sSubSupPr>
+                              <m:ctrlPr>
+                                <a:rPr lang="en-AU" b="0" i="1" smtClean="0">
+                                  <a:latin typeface="Cambria Math" panose="02040503050406030204" pitchFamily="18" charset="0"/>
+                                </a:rPr>
+                              </m:ctrlPr>
+                            </m:sSubSupPr>
+                            <m:e>
+                              <m:r>
+                                <a:rPr lang="en-AU" b="0" i="1" smtClean="0">
+                                  <a:latin typeface="Cambria Math" panose="02040503050406030204" pitchFamily="18" charset="0"/>
+                                </a:rPr>
+                                <m:t>𝜆</m:t>
+                              </m:r>
+                            </m:e>
+                            <m:sub>
+                              <m:sSup>
+                                <m:sSupPr>
+                                  <m:ctrlPr>
+                                    <a:rPr lang="en-AU" b="0" i="1" smtClean="0">
+                                      <a:latin typeface="Cambria Math" panose="02040503050406030204" pitchFamily="18" charset="0"/>
+                                    </a:rPr>
+                                  </m:ctrlPr>
+                                </m:sSupPr>
+                                <m:e>
+                                  <m:r>
+                                    <a:rPr lang="en-AU" b="0" i="1" smtClean="0">
+                                      <a:latin typeface="Cambria Math" panose="02040503050406030204" pitchFamily="18" charset="0"/>
+                                    </a:rPr>
+                                    <m:t>𝐾</m:t>
+                                  </m:r>
+                                </m:e>
+                                <m:sup>
+                                  <m:r>
+                                    <a:rPr lang="en-AU" b="0" i="1" smtClean="0">
+                                      <a:latin typeface="Cambria Math" panose="02040503050406030204" pitchFamily="18" charset="0"/>
+                                    </a:rPr>
+                                    <m:t>∗</m:t>
+                                  </m:r>
+                                </m:sup>
+                              </m:sSup>
+                              <m:r>
+                                <a:rPr lang="en-AU" b="0" i="1" smtClean="0">
+                                  <a:latin typeface="Cambria Math" panose="02040503050406030204" pitchFamily="18" charset="0"/>
+                                </a:rPr>
+                                <m:t>𝑎</m:t>
+                              </m:r>
+                            </m:sub>
+                            <m:sup>
+                              <m:f>
+                                <m:fPr>
+                                  <m:ctrlPr>
+                                    <a:rPr lang="en-AU" b="0" i="1" smtClean="0">
+                                      <a:latin typeface="Cambria Math" panose="02040503050406030204" pitchFamily="18" charset="0"/>
+                                    </a:rPr>
+                                  </m:ctrlPr>
+                                </m:fPr>
+                                <m:num>
+                                  <m:r>
+                                    <a:rPr lang="en-AU" b="0" i="1" smtClean="0">
+                                      <a:latin typeface="Cambria Math" panose="02040503050406030204" pitchFamily="18" charset="0"/>
+                                    </a:rPr>
+                                    <m:t>3</m:t>
+                                  </m:r>
+                                </m:num>
+                                <m:den>
+                                  <m:r>
+                                    <a:rPr lang="en-AU" b="0" i="1" smtClean="0">
+                                      <a:latin typeface="Cambria Math" panose="02040503050406030204" pitchFamily="18" charset="0"/>
+                                    </a:rPr>
+                                    <m:t>2</m:t>
+                                  </m:r>
+                                </m:den>
+                              </m:f>
+                            </m:sup>
+                          </m:sSubSup>
+                        </m:e>
+                      </m:d>
+                      <m:sSub>
+                        <m:sSubPr>
+                          <m:ctrlPr>
+                            <a:rPr lang="en-AU" b="0" i="1" smtClean="0">
+                              <a:latin typeface="Cambria Math" panose="02040503050406030204" pitchFamily="18" charset="0"/>
+                            </a:rPr>
+                          </m:ctrlPr>
+                        </m:sSubPr>
+                        <m:e>
+                          <m:r>
+                            <a:rPr lang="en-AU" b="0" i="1" smtClean="0">
+                              <a:latin typeface="Cambria Math" panose="02040503050406030204" pitchFamily="18" charset="0"/>
+                            </a:rPr>
+                            <m:t>𝜏</m:t>
+                          </m:r>
+                        </m:e>
+                        <m:sub>
+                          <m:sSub>
+                            <m:sSubPr>
+                              <m:ctrlPr>
+                                <a:rPr lang="en-AU" b="0" i="1" smtClean="0">
+                                  <a:latin typeface="Cambria Math" panose="02040503050406030204" pitchFamily="18" charset="0"/>
+                                </a:rPr>
+                              </m:ctrlPr>
+                            </m:sSubPr>
+                            <m:e>
+                              <m:r>
+                                <a:rPr lang="en-AU" b="0" i="1" smtClean="0">
+                                  <a:latin typeface="Cambria Math" panose="02040503050406030204" pitchFamily="18" charset="0"/>
+                                </a:rPr>
+                                <m:t>𝐵</m:t>
+                              </m:r>
+                            </m:e>
+                            <m:sub>
+                              <m:r>
+                                <a:rPr lang="en-AU" b="0" i="1" smtClean="0">
+                                  <a:latin typeface="Cambria Math" panose="02040503050406030204" pitchFamily="18" charset="0"/>
+                                </a:rPr>
+                                <m:t>0</m:t>
+                              </m:r>
+                            </m:sub>
+                          </m:sSub>
+                        </m:sub>
+                      </m:sSub>
+                      <m:d>
+                        <m:dPr>
+                          <m:ctrlPr>
+                            <a:rPr lang="en-AU" b="0" i="1" smtClean="0">
+                              <a:latin typeface="Cambria Math" panose="02040503050406030204" pitchFamily="18" charset="0"/>
+                            </a:rPr>
+                          </m:ctrlPr>
+                        </m:dPr>
+                        <m:e>
+                          <m:f>
+                            <m:fPr>
+                              <m:ctrlPr>
+                                <a:rPr lang="en-AU" b="0" i="1" smtClean="0">
+                                  <a:latin typeface="Cambria Math" panose="02040503050406030204" pitchFamily="18" charset="0"/>
+                                </a:rPr>
+                              </m:ctrlPr>
+                            </m:fPr>
+                            <m:num>
+                              <m:r>
+                                <a:rPr lang="en-AU" b="0" i="1" smtClean="0">
+                                  <a:latin typeface="Cambria Math" panose="02040503050406030204" pitchFamily="18" charset="0"/>
+                                </a:rPr>
+                                <m:t>4</m:t>
+                              </m:r>
+                              <m:r>
+                                <a:rPr lang="en-AU" b="0" i="1" smtClean="0">
+                                  <a:latin typeface="Cambria Math" panose="02040503050406030204" pitchFamily="18" charset="0"/>
+                                </a:rPr>
+                                <m:t>𝜋𝛼</m:t>
+                              </m:r>
+                              <m:sSubSup>
+                                <m:sSubSupPr>
+                                  <m:ctrlPr>
+                                    <a:rPr lang="en-AU" b="0" i="1" smtClean="0">
+                                      <a:latin typeface="Cambria Math" panose="02040503050406030204" pitchFamily="18" charset="0"/>
+                                    </a:rPr>
+                                  </m:ctrlPr>
+                                </m:sSubSupPr>
+                                <m:e>
+                                  <m:r>
+                                    <a:rPr lang="en-AU" b="0" i="1" smtClean="0">
+                                      <a:latin typeface="Cambria Math" panose="02040503050406030204" pitchFamily="18" charset="0"/>
+                                    </a:rPr>
+                                    <m:t>𝑀</m:t>
+                                  </m:r>
+                                </m:e>
+                                <m:sub>
+                                  <m:r>
+                                    <a:rPr lang="en-AU" b="0" i="1" smtClean="0">
+                                      <a:latin typeface="Cambria Math" panose="02040503050406030204" pitchFamily="18" charset="0"/>
+                                    </a:rPr>
+                                    <m:t>𝑎</m:t>
+                                  </m:r>
+                                </m:sub>
+                                <m:sup>
+                                  <m:r>
+                                    <a:rPr lang="en-AU" b="0" i="1" smtClean="0">
+                                      <a:latin typeface="Cambria Math" panose="02040503050406030204" pitchFamily="18" charset="0"/>
+                                    </a:rPr>
+                                    <m:t>3</m:t>
+                                  </m:r>
+                                </m:sup>
+                              </m:sSubSup>
+                            </m:num>
+                            <m:den>
+                              <m:sSup>
+                                <m:sSupPr>
+                                  <m:ctrlPr>
+                                    <a:rPr lang="en-AU" b="0" i="1" smtClean="0">
+                                      <a:latin typeface="Cambria Math" panose="02040503050406030204" pitchFamily="18" charset="0"/>
+                                    </a:rPr>
+                                  </m:ctrlPr>
+                                </m:sSupPr>
+                                <m:e>
+                                  <m:r>
+                                    <m:rPr>
+                                      <m:sty m:val="p"/>
+                                    </m:rPr>
+                                    <a:rPr lang="en-AU" b="0" i="0" smtClean="0">
+                                      <a:latin typeface="Cambria Math" panose="02040503050406030204" pitchFamily="18" charset="0"/>
+                                    </a:rPr>
+                                    <m:t>Λ</m:t>
+                                  </m:r>
+                                </m:e>
+                                <m:sup>
+                                  <m:r>
+                                    <a:rPr lang="en-AU" b="0" i="1" smtClean="0">
+                                      <a:latin typeface="Cambria Math" panose="02040503050406030204" pitchFamily="18" charset="0"/>
+                                    </a:rPr>
+                                    <m:t>2</m:t>
+                                  </m:r>
+                                </m:sup>
+                              </m:sSup>
+                            </m:den>
+                          </m:f>
+                          <m:sSup>
+                            <m:sSupPr>
+                              <m:ctrlPr>
+                                <a:rPr lang="en-AU" b="0" i="1" smtClean="0">
+                                  <a:latin typeface="Cambria Math" panose="02040503050406030204" pitchFamily="18" charset="0"/>
+                                </a:rPr>
+                              </m:ctrlPr>
+                            </m:sSupPr>
+                            <m:e>
+                              <m:d>
+                                <m:dPr>
+                                  <m:begChr m:val="|"/>
+                                  <m:endChr m:val="|"/>
+                                  <m:ctrlPr>
+                                    <a:rPr lang="en-AU" b="0" i="1" smtClean="0">
+                                      <a:latin typeface="Cambria Math" panose="02040503050406030204" pitchFamily="18" charset="0"/>
+                                    </a:rPr>
+                                  </m:ctrlPr>
+                                </m:dPr>
+                                <m:e>
+                                  <m:sSubSup>
+                                    <m:sSubSupPr>
+                                      <m:ctrlPr>
+                                        <a:rPr lang="en-AU" b="0" i="1" smtClean="0">
+                                          <a:latin typeface="Cambria Math" panose="02040503050406030204" pitchFamily="18" charset="0"/>
+                                        </a:rPr>
+                                      </m:ctrlPr>
+                                    </m:sSubSupPr>
+                                    <m:e>
+                                      <m:r>
+                                        <a:rPr lang="en-AU" b="0" i="1" smtClean="0">
+                                          <a:latin typeface="Cambria Math" panose="02040503050406030204" pitchFamily="18" charset="0"/>
+                                        </a:rPr>
+                                        <m:t>𝐶</m:t>
+                                      </m:r>
+                                    </m:e>
+                                    <m:sub>
+                                      <m:r>
+                                        <a:rPr lang="en-AU" b="0" i="1" smtClean="0">
+                                          <a:latin typeface="Cambria Math" panose="02040503050406030204" pitchFamily="18" charset="0"/>
+                                        </a:rPr>
+                                        <m:t>𝑒𝑓𝑓</m:t>
+                                      </m:r>
+                                    </m:sub>
+                                    <m:sup>
+                                      <m:r>
+                                        <a:rPr lang="en-AU" b="0" i="1" smtClean="0">
+                                          <a:latin typeface="Cambria Math" panose="02040503050406030204" pitchFamily="18" charset="0"/>
+                                        </a:rPr>
+                                        <m:t>𝛾𝛾</m:t>
+                                      </m:r>
+                                    </m:sup>
+                                  </m:sSubSup>
+                                </m:e>
+                              </m:d>
+                            </m:e>
+                            <m:sup>
+                              <m:r>
+                                <a:rPr lang="en-AU" b="0" i="1" smtClean="0">
+                                  <a:latin typeface="Cambria Math" panose="02040503050406030204" pitchFamily="18" charset="0"/>
+                                </a:rPr>
+                                <m:t>2</m:t>
+                              </m:r>
+                            </m:sup>
+                          </m:sSup>
+                        </m:e>
+                      </m:d>
+                      <m:sSub>
+                        <m:sSubPr>
+                          <m:ctrlPr>
+                            <a:rPr lang="en-AU" b="0" i="1" smtClean="0">
+                              <a:latin typeface="Cambria Math" panose="02040503050406030204" pitchFamily="18" charset="0"/>
+                            </a:rPr>
+                          </m:ctrlPr>
+                        </m:sSubPr>
+                        <m:e>
+                          <m:r>
+                            <a:rPr lang="en-AU" b="0" i="1" smtClean="0">
+                              <a:latin typeface="Cambria Math" panose="02040503050406030204" pitchFamily="18" charset="0"/>
+                            </a:rPr>
+                            <m:t>𝜏</m:t>
+                          </m:r>
+                        </m:e>
+                        <m:sub>
+                          <m:sSub>
+                            <m:sSubPr>
+                              <m:ctrlPr>
+                                <a:rPr lang="en-AU" b="0" i="1" smtClean="0">
+                                  <a:latin typeface="Cambria Math" panose="02040503050406030204" pitchFamily="18" charset="0"/>
+                                </a:rPr>
+                              </m:ctrlPr>
+                            </m:sSubPr>
+                            <m:e>
+                              <m:r>
+                                <a:rPr lang="en-AU" b="0" i="1" smtClean="0">
+                                  <a:latin typeface="Cambria Math" panose="02040503050406030204" pitchFamily="18" charset="0"/>
+                                </a:rPr>
+                                <m:t>𝑎</m:t>
+                              </m:r>
+                            </m:e>
+                            <m:sub>
+                              <m:r>
+                                <a:rPr lang="en-AU" b="0" i="1" smtClean="0">
+                                  <a:latin typeface="Cambria Math" panose="02040503050406030204" pitchFamily="18" charset="0"/>
+                                </a:rPr>
+                                <m:t>0</m:t>
+                              </m:r>
+                            </m:sub>
+                          </m:sSub>
+                        </m:sub>
+                      </m:sSub>
+                    </m:oMath>
+                  </m:oMathPara>
+                </a14:m>
+                <a:endParaRPr lang="en-AU" dirty="0"/>
+              </a:p>
+              <a:p>
+                <a:pPr marL="0" indent="0">
+                  <a:buNone/>
+                </a:pPr>
+                <a14:m>
+                  <m:oMathPara xmlns:m="http://schemas.openxmlformats.org/officeDocument/2006/math">
+                    <m:oMathParaPr>
+                      <m:jc m:val="centerGroup"/>
+                    </m:oMathParaPr>
+                    <m:oMath xmlns:m="http://schemas.openxmlformats.org/officeDocument/2006/math">
+                      <m:r>
+                        <a:rPr lang="en-AU" b="0" i="1" smtClean="0">
+                          <a:latin typeface="Cambria Math" panose="02040503050406030204" pitchFamily="18" charset="0"/>
+                        </a:rPr>
+                        <m:t>=</m:t>
+                      </m:r>
+                      <m:d>
+                        <m:dPr>
+                          <m:ctrlPr>
+                            <a:rPr lang="en-AU" b="0" i="1" smtClean="0">
+                              <a:latin typeface="Cambria Math" panose="02040503050406030204" pitchFamily="18" charset="0"/>
+                            </a:rPr>
+                          </m:ctrlPr>
+                        </m:dPr>
+                        <m:e>
+                          <m:f>
+                            <m:fPr>
+                              <m:ctrlPr>
+                                <a:rPr lang="en-AU" b="0" i="1" smtClean="0">
+                                  <a:latin typeface="Cambria Math" panose="02040503050406030204" pitchFamily="18" charset="0"/>
+                                </a:rPr>
+                              </m:ctrlPr>
+                            </m:fPr>
+                            <m:num>
+                              <m:sSubSup>
+                                <m:sSubSupPr>
+                                  <m:ctrlPr>
+                                    <a:rPr lang="en-AU" b="0" i="1" smtClean="0">
+                                      <a:latin typeface="Cambria Math" panose="02040503050406030204" pitchFamily="18" charset="0"/>
+                                    </a:rPr>
+                                  </m:ctrlPr>
+                                </m:sSubSupPr>
+                                <m:e>
+                                  <m:r>
+                                    <a:rPr lang="en-AU" b="0" i="1" smtClean="0">
+                                      <a:latin typeface="Cambria Math" panose="02040503050406030204" pitchFamily="18" charset="0"/>
+                                    </a:rPr>
+                                    <m:t>𝑀</m:t>
+                                  </m:r>
+                                </m:e>
+                                <m:sub>
+                                  <m:r>
+                                    <a:rPr lang="en-AU" b="0" i="1" smtClean="0">
+                                      <a:latin typeface="Cambria Math" panose="02040503050406030204" pitchFamily="18" charset="0"/>
+                                    </a:rPr>
+                                    <m:t>𝐵</m:t>
+                                  </m:r>
+                                </m:sub>
+                                <m:sup>
+                                  <m:r>
+                                    <a:rPr lang="en-AU" b="0" i="1" smtClean="0">
+                                      <a:latin typeface="Cambria Math" panose="02040503050406030204" pitchFamily="18" charset="0"/>
+                                    </a:rPr>
+                                    <m:t>3</m:t>
+                                  </m:r>
+                                </m:sup>
+                              </m:sSubSup>
+                            </m:num>
+                            <m:den>
+                              <m:r>
+                                <a:rPr lang="en-AU" b="0" i="1" smtClean="0">
+                                  <a:latin typeface="Cambria Math" panose="02040503050406030204" pitchFamily="18" charset="0"/>
+                                </a:rPr>
+                                <m:t>16</m:t>
+                              </m:r>
+                            </m:den>
+                          </m:f>
+                          <m:sSup>
+                            <m:sSupPr>
+                              <m:ctrlPr>
+                                <a:rPr lang="en-AU" b="0" i="1" smtClean="0">
+                                  <a:latin typeface="Cambria Math" panose="02040503050406030204" pitchFamily="18" charset="0"/>
+                                </a:rPr>
+                              </m:ctrlPr>
+                            </m:sSupPr>
+                            <m:e>
+                              <m:d>
+                                <m:dPr>
+                                  <m:begChr m:val="|"/>
+                                  <m:endChr m:val="|"/>
+                                  <m:ctrlPr>
+                                    <a:rPr lang="en-AU" b="0" i="1" smtClean="0">
+                                      <a:latin typeface="Cambria Math" panose="02040503050406030204" pitchFamily="18" charset="0"/>
+                                    </a:rPr>
+                                  </m:ctrlPr>
+                                </m:dPr>
+                                <m:e>
+                                  <m:sSub>
+                                    <m:sSubPr>
+                                      <m:ctrlPr>
+                                        <a:rPr lang="en-AU" b="0" i="1" smtClean="0">
+                                          <a:latin typeface="Cambria Math" panose="02040503050406030204" pitchFamily="18" charset="0"/>
+                                        </a:rPr>
+                                      </m:ctrlPr>
+                                    </m:sSubPr>
+                                    <m:e>
+                                      <m:r>
+                                        <a:rPr lang="en-AU" b="0" i="1" smtClean="0">
+                                          <a:latin typeface="Cambria Math" panose="02040503050406030204" pitchFamily="18" charset="0"/>
+                                        </a:rPr>
+                                        <m:t>𝑔</m:t>
+                                      </m:r>
+                                    </m:e>
+                                    <m:sub>
+                                      <m:r>
+                                        <a:rPr lang="en-AU" b="0" i="1" smtClean="0">
+                                          <a:latin typeface="Cambria Math" panose="02040503050406030204" pitchFamily="18" charset="0"/>
+                                        </a:rPr>
+                                        <m:t>𝑎𝑏𝑠</m:t>
+                                      </m:r>
+                                    </m:sub>
+                                  </m:sSub>
+                                </m:e>
+                              </m:d>
+                            </m:e>
+                            <m:sup>
+                              <m:r>
+                                <a:rPr lang="en-AU" b="0" i="1" smtClean="0">
+                                  <a:latin typeface="Cambria Math" panose="02040503050406030204" pitchFamily="18" charset="0"/>
+                                </a:rPr>
+                                <m:t>2</m:t>
+                              </m:r>
+                            </m:sup>
+                          </m:sSup>
+                          <m:sSubSup>
+                            <m:sSubSupPr>
+                              <m:ctrlPr>
+                                <a:rPr lang="en-AU" b="0" i="1" smtClean="0">
+                                  <a:latin typeface="Cambria Math" panose="02040503050406030204" pitchFamily="18" charset="0"/>
+                                </a:rPr>
+                              </m:ctrlPr>
+                            </m:sSubSupPr>
+                            <m:e>
+                              <m:r>
+                                <a:rPr lang="en-AU" b="0" i="1" smtClean="0">
+                                  <a:latin typeface="Cambria Math" panose="02040503050406030204" pitchFamily="18" charset="0"/>
+                                </a:rPr>
+                                <m:t>𝐴</m:t>
+                              </m:r>
+                            </m:e>
+                            <m:sub>
+                              <m:r>
+                                <a:rPr lang="en-AU" b="0" i="1" smtClean="0">
+                                  <a:latin typeface="Cambria Math" panose="02040503050406030204" pitchFamily="18" charset="0"/>
+                                </a:rPr>
+                                <m:t>0</m:t>
+                              </m:r>
+                            </m:sub>
+                            <m:sup>
+                              <m:r>
+                                <a:rPr lang="en-AU" b="0" i="1" smtClean="0">
+                                  <a:latin typeface="Cambria Math" panose="02040503050406030204" pitchFamily="18" charset="0"/>
+                                </a:rPr>
+                                <m:t>2</m:t>
+                              </m:r>
+                            </m:sup>
+                          </m:sSubSup>
+                          <m:d>
+                            <m:dPr>
+                              <m:ctrlPr>
+                                <a:rPr lang="en-AU" b="0" i="1" smtClean="0">
+                                  <a:latin typeface="Cambria Math" panose="02040503050406030204" pitchFamily="18" charset="0"/>
+                                </a:rPr>
+                              </m:ctrlPr>
+                            </m:dPr>
+                            <m:e>
+                              <m:sSubSup>
+                                <m:sSubSupPr>
+                                  <m:ctrlPr>
+                                    <a:rPr lang="en-AU" b="0" i="1" smtClean="0">
+                                      <a:latin typeface="Cambria Math" panose="02040503050406030204" pitchFamily="18" charset="0"/>
+                                    </a:rPr>
+                                  </m:ctrlPr>
+                                </m:sSubSupPr>
+                                <m:e>
+                                  <m:r>
+                                    <a:rPr lang="en-AU" b="0" i="1" smtClean="0">
+                                      <a:latin typeface="Cambria Math" panose="02040503050406030204" pitchFamily="18" charset="0"/>
+                                    </a:rPr>
+                                    <m:t>𝑀</m:t>
+                                  </m:r>
+                                </m:e>
+                                <m:sub>
+                                  <m:r>
+                                    <a:rPr lang="en-AU" b="0" i="1" smtClean="0">
+                                      <a:latin typeface="Cambria Math" panose="02040503050406030204" pitchFamily="18" charset="0"/>
+                                    </a:rPr>
+                                    <m:t>𝑎</m:t>
+                                  </m:r>
+                                </m:sub>
+                                <m:sup>
+                                  <m:r>
+                                    <a:rPr lang="en-AU" b="0" i="1" smtClean="0">
+                                      <a:latin typeface="Cambria Math" panose="02040503050406030204" pitchFamily="18" charset="0"/>
+                                    </a:rPr>
+                                    <m:t>2</m:t>
+                                  </m:r>
+                                </m:sup>
+                              </m:sSubSup>
+                            </m:e>
+                          </m:d>
+                          <m:sSubSup>
+                            <m:sSubSupPr>
+                              <m:ctrlPr>
+                                <a:rPr lang="en-AU" b="0" i="1" smtClean="0">
+                                  <a:latin typeface="Cambria Math" panose="02040503050406030204" pitchFamily="18" charset="0"/>
+                                </a:rPr>
+                              </m:ctrlPr>
+                            </m:sSubSupPr>
+                            <m:e>
+                              <m:r>
+                                <a:rPr lang="en-AU" b="0" i="1" smtClean="0">
+                                  <a:latin typeface="Cambria Math" panose="02040503050406030204" pitchFamily="18" charset="0"/>
+                                </a:rPr>
+                                <m:t>𝜆</m:t>
+                              </m:r>
+                            </m:e>
+                            <m:sub>
+                              <m:sSup>
+                                <m:sSupPr>
+                                  <m:ctrlPr>
+                                    <a:rPr lang="en-AU" b="0" i="1" smtClean="0">
+                                      <a:latin typeface="Cambria Math" panose="02040503050406030204" pitchFamily="18" charset="0"/>
+                                    </a:rPr>
+                                  </m:ctrlPr>
+                                </m:sSupPr>
+                                <m:e>
+                                  <m:r>
+                                    <a:rPr lang="en-AU" b="0" i="1" smtClean="0">
+                                      <a:latin typeface="Cambria Math" panose="02040503050406030204" pitchFamily="18" charset="0"/>
+                                    </a:rPr>
+                                    <m:t>𝐾</m:t>
+                                  </m:r>
+                                </m:e>
+                                <m:sup>
+                                  <m:r>
+                                    <a:rPr lang="en-AU" b="0" i="1" smtClean="0">
+                                      <a:latin typeface="Cambria Math" panose="02040503050406030204" pitchFamily="18" charset="0"/>
+                                    </a:rPr>
+                                    <m:t>∗</m:t>
+                                  </m:r>
+                                </m:sup>
+                              </m:sSup>
+                              <m:r>
+                                <a:rPr lang="en-AU" b="0" i="1" smtClean="0">
+                                  <a:latin typeface="Cambria Math" panose="02040503050406030204" pitchFamily="18" charset="0"/>
+                                </a:rPr>
+                                <m:t>𝑎</m:t>
+                              </m:r>
+                            </m:sub>
+                            <m:sup>
+                              <m:f>
+                                <m:fPr>
+                                  <m:ctrlPr>
+                                    <a:rPr lang="en-AU" b="0" i="1" smtClean="0">
+                                      <a:latin typeface="Cambria Math" panose="02040503050406030204" pitchFamily="18" charset="0"/>
+                                    </a:rPr>
+                                  </m:ctrlPr>
+                                </m:fPr>
+                                <m:num>
+                                  <m:r>
+                                    <a:rPr lang="en-AU" b="0" i="1" smtClean="0">
+                                      <a:latin typeface="Cambria Math" panose="02040503050406030204" pitchFamily="18" charset="0"/>
+                                    </a:rPr>
+                                    <m:t>3</m:t>
+                                  </m:r>
+                                </m:num>
+                                <m:den>
+                                  <m:r>
+                                    <a:rPr lang="en-AU" b="0" i="1" smtClean="0">
+                                      <a:latin typeface="Cambria Math" panose="02040503050406030204" pitchFamily="18" charset="0"/>
+                                    </a:rPr>
+                                    <m:t>2</m:t>
+                                  </m:r>
+                                </m:den>
+                              </m:f>
+                            </m:sup>
+                          </m:sSubSup>
+                        </m:e>
+                      </m:d>
+                      <m:sSub>
+                        <m:sSubPr>
+                          <m:ctrlPr>
+                            <a:rPr lang="en-AU" b="0" i="1" smtClean="0">
+                              <a:latin typeface="Cambria Math" panose="02040503050406030204" pitchFamily="18" charset="0"/>
+                            </a:rPr>
+                          </m:ctrlPr>
+                        </m:sSubPr>
+                        <m:e>
+                          <m:r>
+                            <a:rPr lang="en-AU" b="0" i="1" smtClean="0">
+                              <a:latin typeface="Cambria Math" panose="02040503050406030204" pitchFamily="18" charset="0"/>
+                            </a:rPr>
+                            <m:t>𝜏</m:t>
+                          </m:r>
+                        </m:e>
+                        <m:sub>
+                          <m:sSup>
+                            <m:sSupPr>
+                              <m:ctrlPr>
+                                <a:rPr lang="en-AU" b="0" i="1" smtClean="0">
+                                  <a:latin typeface="Cambria Math" panose="02040503050406030204" pitchFamily="18" charset="0"/>
+                                </a:rPr>
+                              </m:ctrlPr>
+                            </m:sSupPr>
+                            <m:e>
+                              <m:r>
+                                <a:rPr lang="en-AU" b="0" i="1" smtClean="0">
+                                  <a:latin typeface="Cambria Math" panose="02040503050406030204" pitchFamily="18" charset="0"/>
+                                </a:rPr>
+                                <m:t>𝐵</m:t>
+                              </m:r>
+                            </m:e>
+                            <m:sup>
+                              <m:r>
+                                <a:rPr lang="en-AU" b="0" i="1" smtClean="0">
+                                  <a:latin typeface="Cambria Math" panose="02040503050406030204" pitchFamily="18" charset="0"/>
+                                </a:rPr>
+                                <m:t>0</m:t>
+                              </m:r>
+                            </m:sup>
+                          </m:sSup>
+                        </m:sub>
+                      </m:sSub>
+                      <m:d>
+                        <m:dPr>
+                          <m:ctrlPr>
+                            <a:rPr lang="en-AU" b="0" i="1" smtClean="0">
+                              <a:latin typeface="Cambria Math" panose="02040503050406030204" pitchFamily="18" charset="0"/>
+                            </a:rPr>
+                          </m:ctrlPr>
+                        </m:dPr>
+                        <m:e>
+                          <m:f>
+                            <m:fPr>
+                              <m:ctrlPr>
+                                <a:rPr lang="en-AU" b="0" i="1" smtClean="0">
+                                  <a:latin typeface="Cambria Math" panose="02040503050406030204" pitchFamily="18" charset="0"/>
+                                </a:rPr>
+                              </m:ctrlPr>
+                            </m:fPr>
+                            <m:num>
+                              <m:sSubSup>
+                                <m:sSubSupPr>
+                                  <m:ctrlPr>
+                                    <a:rPr lang="en-AU" b="0" i="1" smtClean="0">
+                                      <a:latin typeface="Cambria Math" panose="02040503050406030204" pitchFamily="18" charset="0"/>
+                                    </a:rPr>
+                                  </m:ctrlPr>
+                                </m:sSubSupPr>
+                                <m:e>
+                                  <m:r>
+                                    <a:rPr lang="en-AU" b="0" i="1" smtClean="0">
+                                      <a:latin typeface="Cambria Math" panose="02040503050406030204" pitchFamily="18" charset="0"/>
+                                    </a:rPr>
+                                    <m:t>𝑀</m:t>
+                                  </m:r>
+                                </m:e>
+                                <m:sub>
+                                  <m:r>
+                                    <a:rPr lang="en-AU" b="0" i="1" smtClean="0">
+                                      <a:latin typeface="Cambria Math" panose="02040503050406030204" pitchFamily="18" charset="0"/>
+                                    </a:rPr>
+                                    <m:t>𝑎</m:t>
+                                  </m:r>
+                                </m:sub>
+                                <m:sup>
+                                  <m:r>
+                                    <a:rPr lang="en-AU" b="0" i="1" smtClean="0">
+                                      <a:latin typeface="Cambria Math" panose="02040503050406030204" pitchFamily="18" charset="0"/>
+                                    </a:rPr>
+                                    <m:t>3</m:t>
+                                  </m:r>
+                                </m:sup>
+                              </m:sSubSup>
+                              <m:r>
+                                <a:rPr lang="en-AU" b="0" i="1" smtClean="0">
+                                  <a:latin typeface="Cambria Math" panose="02040503050406030204" pitchFamily="18" charset="0"/>
+                                </a:rPr>
+                                <m:t>𝛼</m:t>
+                              </m:r>
+                            </m:num>
+                            <m:den>
+                              <m:sSup>
+                                <m:sSupPr>
+                                  <m:ctrlPr>
+                                    <a:rPr lang="en-AU" b="0" i="1" smtClean="0">
+                                      <a:latin typeface="Cambria Math" panose="02040503050406030204" pitchFamily="18" charset="0"/>
+                                    </a:rPr>
+                                  </m:ctrlPr>
+                                </m:sSupPr>
+                                <m:e>
+                                  <m:r>
+                                    <m:rPr>
+                                      <m:sty m:val="p"/>
+                                    </m:rPr>
+                                    <a:rPr lang="en-AU" b="0" i="0" smtClean="0">
+                                      <a:latin typeface="Cambria Math" panose="02040503050406030204" pitchFamily="18" charset="0"/>
+                                    </a:rPr>
+                                    <m:t>Λ</m:t>
+                                  </m:r>
+                                </m:e>
+                                <m:sup>
+                                  <m:r>
+                                    <a:rPr lang="en-AU" b="0" i="1" smtClean="0">
+                                      <a:latin typeface="Cambria Math" panose="02040503050406030204" pitchFamily="18" charset="0"/>
+                                    </a:rPr>
+                                    <m:t>2</m:t>
+                                  </m:r>
+                                </m:sup>
+                              </m:sSup>
+                            </m:den>
+                          </m:f>
+                          <m:sSup>
+                            <m:sSupPr>
+                              <m:ctrlPr>
+                                <a:rPr lang="en-AU" b="0" i="1" smtClean="0">
+                                  <a:latin typeface="Cambria Math" panose="02040503050406030204" pitchFamily="18" charset="0"/>
+                                </a:rPr>
+                              </m:ctrlPr>
+                            </m:sSupPr>
+                            <m:e>
+                              <m:d>
+                                <m:dPr>
+                                  <m:begChr m:val="|"/>
+                                  <m:endChr m:val="|"/>
+                                  <m:ctrlPr>
+                                    <a:rPr lang="en-AU" b="0" i="1" smtClean="0">
+                                      <a:latin typeface="Cambria Math" panose="02040503050406030204" pitchFamily="18" charset="0"/>
+                                    </a:rPr>
+                                  </m:ctrlPr>
+                                </m:dPr>
+                                <m:e>
+                                  <m:sSubSup>
+                                    <m:sSubSupPr>
+                                      <m:ctrlPr>
+                                        <a:rPr lang="en-AU" b="0" i="1" smtClean="0">
+                                          <a:latin typeface="Cambria Math" panose="02040503050406030204" pitchFamily="18" charset="0"/>
+                                        </a:rPr>
+                                      </m:ctrlPr>
+                                    </m:sSubSupPr>
+                                    <m:e>
+                                      <m:r>
+                                        <a:rPr lang="en-AU" b="0" i="1" smtClean="0">
+                                          <a:latin typeface="Cambria Math" panose="02040503050406030204" pitchFamily="18" charset="0"/>
+                                        </a:rPr>
+                                        <m:t>𝐶</m:t>
+                                      </m:r>
+                                    </m:e>
+                                    <m:sub>
+                                      <m:r>
+                                        <a:rPr lang="en-AU" b="0" i="1" smtClean="0">
+                                          <a:latin typeface="Cambria Math" panose="02040503050406030204" pitchFamily="18" charset="0"/>
+                                        </a:rPr>
+                                        <m:t>𝑒𝑓𝑓</m:t>
+                                      </m:r>
+                                    </m:sub>
+                                    <m:sup>
+                                      <m:r>
+                                        <a:rPr lang="en-AU" b="0" i="1" smtClean="0">
+                                          <a:latin typeface="Cambria Math" panose="02040503050406030204" pitchFamily="18" charset="0"/>
+                                        </a:rPr>
+                                        <m:t>𝛾𝛾</m:t>
+                                      </m:r>
+                                    </m:sup>
+                                  </m:sSubSup>
+                                </m:e>
+                              </m:d>
+                            </m:e>
+                            <m:sup>
+                              <m:r>
+                                <a:rPr lang="en-AU" b="0" i="1" smtClean="0">
+                                  <a:latin typeface="Cambria Math" panose="02040503050406030204" pitchFamily="18" charset="0"/>
+                                </a:rPr>
+                                <m:t>2</m:t>
+                              </m:r>
+                            </m:sup>
+                          </m:sSup>
+                        </m:e>
+                      </m:d>
+                      <m:sSub>
+                        <m:sSubPr>
+                          <m:ctrlPr>
+                            <a:rPr lang="en-AU" b="0" i="1" smtClean="0">
+                              <a:latin typeface="Cambria Math" panose="02040503050406030204" pitchFamily="18" charset="0"/>
+                            </a:rPr>
+                          </m:ctrlPr>
+                        </m:sSubPr>
+                        <m:e>
+                          <m:r>
+                            <a:rPr lang="en-AU" b="0" i="1" smtClean="0">
+                              <a:latin typeface="Cambria Math" panose="02040503050406030204" pitchFamily="18" charset="0"/>
+                            </a:rPr>
+                            <m:t>𝜏</m:t>
+                          </m:r>
+                        </m:e>
+                        <m:sub>
+                          <m:sSub>
+                            <m:sSubPr>
+                              <m:ctrlPr>
+                                <a:rPr lang="en-AU" b="0" i="1" smtClean="0">
+                                  <a:latin typeface="Cambria Math" panose="02040503050406030204" pitchFamily="18" charset="0"/>
+                                </a:rPr>
+                              </m:ctrlPr>
+                            </m:sSubPr>
+                            <m:e>
+                              <m:r>
+                                <a:rPr lang="en-AU" b="0" i="1" smtClean="0">
+                                  <a:latin typeface="Cambria Math" panose="02040503050406030204" pitchFamily="18" charset="0"/>
+                                </a:rPr>
+                                <m:t>𝑎</m:t>
+                              </m:r>
+                            </m:e>
+                            <m:sub>
+                              <m:r>
+                                <a:rPr lang="en-AU" b="0" i="1" smtClean="0">
+                                  <a:latin typeface="Cambria Math" panose="02040503050406030204" pitchFamily="18" charset="0"/>
+                                </a:rPr>
+                                <m:t>0</m:t>
+                              </m:r>
+                            </m:sub>
+                          </m:sSub>
+                        </m:sub>
+                      </m:sSub>
+                    </m:oMath>
+                  </m:oMathPara>
+                </a14:m>
+                <a:endParaRPr lang="en-AU" b="0" dirty="0"/>
+              </a:p>
+              <a:p>
+                <a:pPr marL="0" indent="0">
+                  <a:buNone/>
+                </a:pPr>
+                <a:r>
+                  <a:rPr lang="en-AU" dirty="0"/>
+                  <a:t>Here: </a:t>
+                </a:r>
+              </a:p>
+              <a:p>
+                <a:pPr marL="0" indent="0">
+                  <a:buNone/>
+                </a:pPr>
+                <a14:m>
+                  <m:oMathPara xmlns:m="http://schemas.openxmlformats.org/officeDocument/2006/math">
+                    <m:oMathParaPr>
+                      <m:jc m:val="centerGroup"/>
+                    </m:oMathParaPr>
+                    <m:oMath xmlns:m="http://schemas.openxmlformats.org/officeDocument/2006/math">
+                      <m:sSub>
+                        <m:sSubPr>
+                          <m:ctrlPr>
+                            <a:rPr lang="en-AU" b="0" i="1" smtClean="0">
+                              <a:latin typeface="Cambria Math" panose="02040503050406030204" pitchFamily="18" charset="0"/>
+                            </a:rPr>
+                          </m:ctrlPr>
+                        </m:sSubPr>
+                        <m:e>
+                          <m:r>
+                            <a:rPr lang="en-AU" b="0" i="1" smtClean="0">
+                              <a:latin typeface="Cambria Math" panose="02040503050406030204" pitchFamily="18" charset="0"/>
+                            </a:rPr>
+                            <m:t>𝜆</m:t>
+                          </m:r>
+                        </m:e>
+                        <m:sub>
+                          <m:sSup>
+                            <m:sSupPr>
+                              <m:ctrlPr>
+                                <a:rPr lang="en-AU" b="0" i="1" smtClean="0">
+                                  <a:latin typeface="Cambria Math" panose="02040503050406030204" pitchFamily="18" charset="0"/>
+                                </a:rPr>
+                              </m:ctrlPr>
+                            </m:sSupPr>
+                            <m:e>
+                              <m:r>
+                                <a:rPr lang="en-AU" b="0" i="1" smtClean="0">
+                                  <a:latin typeface="Cambria Math" panose="02040503050406030204" pitchFamily="18" charset="0"/>
+                                </a:rPr>
+                                <m:t>𝐾</m:t>
+                              </m:r>
+                            </m:e>
+                            <m:sup>
+                              <m:r>
+                                <a:rPr lang="en-AU" b="0" i="1" smtClean="0">
+                                  <a:latin typeface="Cambria Math" panose="02040503050406030204" pitchFamily="18" charset="0"/>
+                                </a:rPr>
+                                <m:t>∗</m:t>
+                              </m:r>
+                            </m:sup>
+                          </m:sSup>
+                          <m:r>
+                            <a:rPr lang="en-AU" b="0" i="1" smtClean="0">
+                              <a:latin typeface="Cambria Math" panose="02040503050406030204" pitchFamily="18" charset="0"/>
+                            </a:rPr>
+                            <m:t>𝑎</m:t>
+                          </m:r>
+                        </m:sub>
+                      </m:sSub>
+                      <m:r>
+                        <a:rPr lang="en-AU" b="0" i="1" smtClean="0">
+                          <a:latin typeface="Cambria Math" panose="02040503050406030204" pitchFamily="18" charset="0"/>
+                        </a:rPr>
+                        <m:t>=</m:t>
+                      </m:r>
+                      <m:d>
+                        <m:dPr>
+                          <m:begChr m:val="["/>
+                          <m:endChr m:val="]"/>
+                          <m:ctrlPr>
+                            <a:rPr lang="en-AU" b="0" i="1" smtClean="0">
+                              <a:latin typeface="Cambria Math" panose="02040503050406030204" pitchFamily="18" charset="0"/>
+                            </a:rPr>
+                          </m:ctrlPr>
+                        </m:dPr>
+                        <m:e>
+                          <m:r>
+                            <a:rPr lang="en-AU" b="0" i="1" smtClean="0">
+                              <a:latin typeface="Cambria Math" panose="02040503050406030204" pitchFamily="18" charset="0"/>
+                            </a:rPr>
+                            <m:t>1−</m:t>
+                          </m:r>
+                          <m:f>
+                            <m:fPr>
+                              <m:ctrlPr>
+                                <a:rPr lang="en-AU" b="0" i="1" smtClean="0">
+                                  <a:latin typeface="Cambria Math" panose="02040503050406030204" pitchFamily="18" charset="0"/>
+                                </a:rPr>
+                              </m:ctrlPr>
+                            </m:fPr>
+                            <m:num>
+                              <m:sSup>
+                                <m:sSupPr>
+                                  <m:ctrlPr>
+                                    <a:rPr lang="en-AU" b="0" i="1" smtClean="0">
+                                      <a:latin typeface="Cambria Math" panose="02040503050406030204" pitchFamily="18" charset="0"/>
+                                    </a:rPr>
+                                  </m:ctrlPr>
+                                </m:sSupPr>
+                                <m:e>
+                                  <m:d>
+                                    <m:dPr>
+                                      <m:ctrlPr>
+                                        <a:rPr lang="en-AU" b="0" i="1" smtClean="0">
+                                          <a:latin typeface="Cambria Math" panose="02040503050406030204" pitchFamily="18" charset="0"/>
+                                        </a:rPr>
+                                      </m:ctrlPr>
+                                    </m:dPr>
+                                    <m:e>
+                                      <m:sSub>
+                                        <m:sSubPr>
+                                          <m:ctrlPr>
+                                            <a:rPr lang="en-AU" b="0" i="1" smtClean="0">
+                                              <a:latin typeface="Cambria Math" panose="02040503050406030204" pitchFamily="18" charset="0"/>
+                                            </a:rPr>
+                                          </m:ctrlPr>
+                                        </m:sSubPr>
+                                        <m:e>
+                                          <m:r>
+                                            <a:rPr lang="en-AU" b="0" i="1" smtClean="0">
+                                              <a:latin typeface="Cambria Math" panose="02040503050406030204" pitchFamily="18" charset="0"/>
+                                            </a:rPr>
+                                            <m:t>𝑀</m:t>
+                                          </m:r>
+                                        </m:e>
+                                        <m:sub>
+                                          <m:r>
+                                            <a:rPr lang="en-AU" b="0" i="1" smtClean="0">
+                                              <a:latin typeface="Cambria Math" panose="02040503050406030204" pitchFamily="18" charset="0"/>
+                                            </a:rPr>
+                                            <m:t>𝑎</m:t>
+                                          </m:r>
+                                        </m:sub>
+                                      </m:sSub>
+                                      <m:r>
+                                        <a:rPr lang="en-AU" b="0" i="1" smtClean="0">
+                                          <a:latin typeface="Cambria Math" panose="02040503050406030204" pitchFamily="18" charset="0"/>
+                                        </a:rPr>
+                                        <m:t>+</m:t>
+                                      </m:r>
+                                      <m:sSub>
+                                        <m:sSubPr>
+                                          <m:ctrlPr>
+                                            <a:rPr lang="en-AU" b="0" i="1" smtClean="0">
+                                              <a:latin typeface="Cambria Math" panose="02040503050406030204" pitchFamily="18" charset="0"/>
+                                            </a:rPr>
+                                          </m:ctrlPr>
+                                        </m:sSubPr>
+                                        <m:e>
+                                          <m:r>
+                                            <a:rPr lang="en-AU" b="0" i="1" smtClean="0">
+                                              <a:latin typeface="Cambria Math" panose="02040503050406030204" pitchFamily="18" charset="0"/>
+                                            </a:rPr>
+                                            <m:t>𝑀</m:t>
+                                          </m:r>
+                                        </m:e>
+                                        <m:sub>
+                                          <m:sSup>
+                                            <m:sSupPr>
+                                              <m:ctrlPr>
+                                                <a:rPr lang="en-AU" b="0" i="1" smtClean="0">
+                                                  <a:latin typeface="Cambria Math" panose="02040503050406030204" pitchFamily="18" charset="0"/>
+                                                </a:rPr>
+                                              </m:ctrlPr>
+                                            </m:sSupPr>
+                                            <m:e>
+                                              <m:r>
+                                                <a:rPr lang="en-AU" b="0" i="1" smtClean="0">
+                                                  <a:latin typeface="Cambria Math" panose="02040503050406030204" pitchFamily="18" charset="0"/>
+                                                </a:rPr>
+                                                <m:t>𝐾</m:t>
+                                              </m:r>
+                                            </m:e>
+                                            <m:sup>
+                                              <m:r>
+                                                <a:rPr lang="en-AU" b="0" i="1" smtClean="0">
+                                                  <a:latin typeface="Cambria Math" panose="02040503050406030204" pitchFamily="18" charset="0"/>
+                                                </a:rPr>
+                                                <m:t>∗</m:t>
+                                              </m:r>
+                                            </m:sup>
+                                          </m:sSup>
+                                        </m:sub>
+                                      </m:sSub>
+                                    </m:e>
+                                  </m:d>
+                                </m:e>
+                                <m:sup>
+                                  <m:r>
+                                    <a:rPr lang="en-AU" b="0" i="1" smtClean="0">
+                                      <a:latin typeface="Cambria Math" panose="02040503050406030204" pitchFamily="18" charset="0"/>
+                                    </a:rPr>
+                                    <m:t>2</m:t>
+                                  </m:r>
+                                </m:sup>
+                              </m:sSup>
+                            </m:num>
+                            <m:den>
+                              <m:sSubSup>
+                                <m:sSubSupPr>
+                                  <m:ctrlPr>
+                                    <a:rPr lang="en-AU" b="0" i="1" smtClean="0">
+                                      <a:latin typeface="Cambria Math" panose="02040503050406030204" pitchFamily="18" charset="0"/>
+                                    </a:rPr>
+                                  </m:ctrlPr>
+                                </m:sSubSupPr>
+                                <m:e>
+                                  <m:r>
+                                    <a:rPr lang="en-AU" b="0" i="1" smtClean="0">
+                                      <a:latin typeface="Cambria Math" panose="02040503050406030204" pitchFamily="18" charset="0"/>
+                                    </a:rPr>
+                                    <m:t>𝑀</m:t>
+                                  </m:r>
+                                </m:e>
+                                <m:sub>
+                                  <m:r>
+                                    <a:rPr lang="en-AU" b="0" i="1" smtClean="0">
+                                      <a:latin typeface="Cambria Math" panose="02040503050406030204" pitchFamily="18" charset="0"/>
+                                    </a:rPr>
+                                    <m:t>𝐵</m:t>
+                                  </m:r>
+                                </m:sub>
+                                <m:sup>
+                                  <m:r>
+                                    <a:rPr lang="en-AU" b="0" i="1" smtClean="0">
+                                      <a:latin typeface="Cambria Math" panose="02040503050406030204" pitchFamily="18" charset="0"/>
+                                    </a:rPr>
+                                    <m:t>2</m:t>
+                                  </m:r>
+                                </m:sup>
+                              </m:sSubSup>
+                            </m:den>
+                          </m:f>
+                        </m:e>
+                      </m:d>
+                      <m:d>
+                        <m:dPr>
+                          <m:begChr m:val="["/>
+                          <m:endChr m:val="]"/>
+                          <m:ctrlPr>
+                            <a:rPr lang="en-AU" b="0" i="1" smtClean="0">
+                              <a:latin typeface="Cambria Math" panose="02040503050406030204" pitchFamily="18" charset="0"/>
+                            </a:rPr>
+                          </m:ctrlPr>
+                        </m:dPr>
+                        <m:e>
+                          <m:r>
+                            <a:rPr lang="en-AU" b="0" i="1" smtClean="0">
+                              <a:latin typeface="Cambria Math" panose="02040503050406030204" pitchFamily="18" charset="0"/>
+                            </a:rPr>
+                            <m:t>1−</m:t>
+                          </m:r>
+                          <m:f>
+                            <m:fPr>
+                              <m:ctrlPr>
+                                <a:rPr lang="en-AU" b="0" i="1" smtClean="0">
+                                  <a:latin typeface="Cambria Math" panose="02040503050406030204" pitchFamily="18" charset="0"/>
+                                </a:rPr>
+                              </m:ctrlPr>
+                            </m:fPr>
+                            <m:num>
+                              <m:sSup>
+                                <m:sSupPr>
+                                  <m:ctrlPr>
+                                    <a:rPr lang="en-AU" b="0" i="1" smtClean="0">
+                                      <a:latin typeface="Cambria Math" panose="02040503050406030204" pitchFamily="18" charset="0"/>
+                                    </a:rPr>
+                                  </m:ctrlPr>
+                                </m:sSupPr>
+                                <m:e>
+                                  <m:d>
+                                    <m:dPr>
+                                      <m:ctrlPr>
+                                        <a:rPr lang="en-AU" b="0" i="1" smtClean="0">
+                                          <a:latin typeface="Cambria Math" panose="02040503050406030204" pitchFamily="18" charset="0"/>
+                                        </a:rPr>
+                                      </m:ctrlPr>
+                                    </m:dPr>
+                                    <m:e>
+                                      <m:sSub>
+                                        <m:sSubPr>
+                                          <m:ctrlPr>
+                                            <a:rPr lang="en-AU" b="0" i="1" smtClean="0">
+                                              <a:latin typeface="Cambria Math" panose="02040503050406030204" pitchFamily="18" charset="0"/>
+                                            </a:rPr>
+                                          </m:ctrlPr>
+                                        </m:sSubPr>
+                                        <m:e>
+                                          <m:r>
+                                            <a:rPr lang="en-AU" b="0" i="1" smtClean="0">
+                                              <a:latin typeface="Cambria Math" panose="02040503050406030204" pitchFamily="18" charset="0"/>
+                                            </a:rPr>
+                                            <m:t>𝑀</m:t>
+                                          </m:r>
+                                        </m:e>
+                                        <m:sub>
+                                          <m:r>
+                                            <a:rPr lang="en-AU" b="0" i="1" smtClean="0">
+                                              <a:latin typeface="Cambria Math" panose="02040503050406030204" pitchFamily="18" charset="0"/>
+                                            </a:rPr>
+                                            <m:t>𝑎</m:t>
+                                          </m:r>
+                                        </m:sub>
+                                      </m:sSub>
+                                      <m:r>
+                                        <a:rPr lang="en-AU" b="0" i="1" smtClean="0">
+                                          <a:latin typeface="Cambria Math" panose="02040503050406030204" pitchFamily="18" charset="0"/>
+                                        </a:rPr>
+                                        <m:t>−</m:t>
+                                      </m:r>
+                                      <m:sSub>
+                                        <m:sSubPr>
+                                          <m:ctrlPr>
+                                            <a:rPr lang="en-AU" b="0" i="1" smtClean="0">
+                                              <a:latin typeface="Cambria Math" panose="02040503050406030204" pitchFamily="18" charset="0"/>
+                                            </a:rPr>
+                                          </m:ctrlPr>
+                                        </m:sSubPr>
+                                        <m:e>
+                                          <m:r>
+                                            <a:rPr lang="en-AU" b="0" i="1" smtClean="0">
+                                              <a:latin typeface="Cambria Math" panose="02040503050406030204" pitchFamily="18" charset="0"/>
+                                            </a:rPr>
+                                            <m:t>𝑀</m:t>
+                                          </m:r>
+                                        </m:e>
+                                        <m:sub>
+                                          <m:sSup>
+                                            <m:sSupPr>
+                                              <m:ctrlPr>
+                                                <a:rPr lang="en-AU" b="0" i="1" smtClean="0">
+                                                  <a:latin typeface="Cambria Math" panose="02040503050406030204" pitchFamily="18" charset="0"/>
+                                                </a:rPr>
+                                              </m:ctrlPr>
+                                            </m:sSupPr>
+                                            <m:e>
+                                              <m:r>
+                                                <a:rPr lang="en-AU" b="0" i="1" smtClean="0">
+                                                  <a:latin typeface="Cambria Math" panose="02040503050406030204" pitchFamily="18" charset="0"/>
+                                                </a:rPr>
+                                                <m:t>𝐾</m:t>
+                                              </m:r>
+                                            </m:e>
+                                            <m:sup>
+                                              <m:r>
+                                                <a:rPr lang="en-AU" b="0" i="1" smtClean="0">
+                                                  <a:latin typeface="Cambria Math" panose="02040503050406030204" pitchFamily="18" charset="0"/>
+                                                </a:rPr>
+                                                <m:t>∗</m:t>
+                                              </m:r>
+                                            </m:sup>
+                                          </m:sSup>
+                                        </m:sub>
+                                      </m:sSub>
+                                    </m:e>
+                                  </m:d>
+                                </m:e>
+                                <m:sup>
+                                  <m:r>
+                                    <a:rPr lang="en-AU" b="0" i="1" smtClean="0">
+                                      <a:latin typeface="Cambria Math" panose="02040503050406030204" pitchFamily="18" charset="0"/>
+                                    </a:rPr>
+                                    <m:t>2</m:t>
+                                  </m:r>
+                                </m:sup>
+                              </m:sSup>
+                            </m:num>
+                            <m:den>
+                              <m:sSubSup>
+                                <m:sSubSupPr>
+                                  <m:ctrlPr>
+                                    <a:rPr lang="en-AU" b="0" i="1" smtClean="0">
+                                      <a:latin typeface="Cambria Math" panose="02040503050406030204" pitchFamily="18" charset="0"/>
+                                    </a:rPr>
+                                  </m:ctrlPr>
+                                </m:sSubSupPr>
+                                <m:e>
+                                  <m:r>
+                                    <a:rPr lang="en-AU" b="0" i="1" smtClean="0">
+                                      <a:latin typeface="Cambria Math" panose="02040503050406030204" pitchFamily="18" charset="0"/>
+                                    </a:rPr>
+                                    <m:t>𝑀</m:t>
+                                  </m:r>
+                                </m:e>
+                                <m:sub>
+                                  <m:r>
+                                    <a:rPr lang="en-AU" b="0" i="1" smtClean="0">
+                                      <a:latin typeface="Cambria Math" panose="02040503050406030204" pitchFamily="18" charset="0"/>
+                                    </a:rPr>
+                                    <m:t>𝐵</m:t>
+                                  </m:r>
+                                </m:sub>
+                                <m:sup>
+                                  <m:r>
+                                    <a:rPr lang="en-AU" b="0" i="1" smtClean="0">
+                                      <a:latin typeface="Cambria Math" panose="02040503050406030204" pitchFamily="18" charset="0"/>
+                                    </a:rPr>
+                                    <m:t>2</m:t>
+                                  </m:r>
+                                </m:sup>
+                              </m:sSubSup>
+                            </m:den>
+                          </m:f>
+                        </m:e>
+                      </m:d>
+                    </m:oMath>
+                  </m:oMathPara>
+                </a14:m>
+                <a:endParaRPr lang="en-AU" dirty="0"/>
+              </a:p>
+              <a:p>
+                <a:pPr marL="0" indent="0">
+                  <a:buNone/>
+                </a:pPr>
+                <a:r>
+                  <a:rPr lang="en-AU" dirty="0"/>
+                  <a:t>And </a:t>
+                </a:r>
+                <a14:m>
+                  <m:oMath xmlns:m="http://schemas.openxmlformats.org/officeDocument/2006/math">
+                    <m:sSub>
+                      <m:sSubPr>
+                        <m:ctrlPr>
+                          <a:rPr lang="en-AU" b="0" i="1" smtClean="0">
+                            <a:latin typeface="Cambria Math" panose="02040503050406030204" pitchFamily="18" charset="0"/>
+                          </a:rPr>
+                        </m:ctrlPr>
+                      </m:sSubPr>
+                      <m:e>
+                        <m:r>
+                          <a:rPr lang="en-AU" b="0" i="1" smtClean="0">
+                            <a:latin typeface="Cambria Math" panose="02040503050406030204" pitchFamily="18" charset="0"/>
+                          </a:rPr>
+                          <m:t>𝐴</m:t>
+                        </m:r>
+                      </m:e>
+                      <m:sub>
+                        <m:r>
+                          <a:rPr lang="en-AU" b="0" i="1" smtClean="0">
+                            <a:latin typeface="Cambria Math" panose="02040503050406030204" pitchFamily="18" charset="0"/>
+                          </a:rPr>
+                          <m:t>0</m:t>
+                        </m:r>
+                      </m:sub>
+                    </m:sSub>
+                  </m:oMath>
+                </a14:m>
+                <a:r>
+                  <a:rPr lang="en-AU" dirty="0"/>
+                  <a:t> is the form factor of the pseudoscalar current (see next slide)</a:t>
+                </a:r>
+              </a:p>
+              <a:p>
+                <a:pPr marL="0" indent="0">
+                  <a:buNone/>
+                </a:pPr>
+                <a:r>
+                  <a:rPr lang="en-AU" dirty="0"/>
+                  <a:t>(Source: </a:t>
+                </a:r>
+                <a:r>
+                  <a:rPr lang="en-AU" dirty="0">
+                    <a:hlinkClick r:id="rId2"/>
+                  </a:rPr>
+                  <a:t>https://arxiv.org/abs/1611.09355</a:t>
+                </a:r>
+                <a:r>
+                  <a:rPr lang="en-AU" dirty="0"/>
+                  <a:t>) </a:t>
+                </a:r>
+              </a:p>
+            </p:txBody>
+          </p:sp>
+        </mc:Choice>
+        <mc:Fallback xmlns="">
+          <p:sp>
+            <p:nvSpPr>
+              <p:cNvPr id="3" name="Content Placeholder 2">
+                <a:extLst>
+                  <a:ext uri="{FF2B5EF4-FFF2-40B4-BE49-F238E27FC236}">
+                    <a16:creationId xmlns:a16="http://schemas.microsoft.com/office/drawing/2014/main" id="{82478C4D-36D7-B03B-DB92-4BCFE01B6A3A}"/>
+                  </a:ext>
+                </a:extLst>
+              </p:cNvPr>
+              <p:cNvSpPr>
+                <a:spLocks noGrp="1" noRot="1" noChangeAspect="1" noMove="1" noResize="1" noEditPoints="1" noAdjustHandles="1" noChangeArrowheads="1" noChangeShapeType="1" noTextEdit="1"/>
+              </p:cNvSpPr>
+              <p:nvPr>
+                <p:ph idx="1"/>
+              </p:nvPr>
+            </p:nvSpPr>
+            <p:spPr>
+              <a:xfrm>
+                <a:off x="838200" y="1800686"/>
+                <a:ext cx="10515600" cy="4351338"/>
+              </a:xfrm>
+              <a:blipFill>
+                <a:blip r:embed="rId3"/>
+                <a:stretch>
+                  <a:fillRect l="-1043" b="-1961"/>
+                </a:stretch>
+              </a:blipFill>
+            </p:spPr>
+            <p:txBody>
+              <a:bodyPr/>
+              <a:lstStyle/>
+              <a:p>
+                <a:r>
+                  <a:rPr lang="en-AU">
+                    <a:noFill/>
+                  </a:rPr>
+                  <a:t> </a:t>
+                </a:r>
+              </a:p>
+            </p:txBody>
+          </p:sp>
+        </mc:Fallback>
+      </mc:AlternateContent>
+    </p:spTree>
+    <p:extLst>
+      <p:ext uri="{BB962C8B-B14F-4D97-AF65-F5344CB8AC3E}">
+        <p14:creationId xmlns:p14="http://schemas.microsoft.com/office/powerpoint/2010/main" val="659846700"/>
+      </p:ext>
+    </p:extLst>
+  </p:cSld>
+  <p:clrMapOvr>
+    <a:masterClrMapping/>
+  </p:clrMapOvr>
+</p:sld>
+</file>
+
+<file path=ppt/slides/slide11.xml><?xml version="1.0" encoding="utf-8"?>
+<p:sld xmlns:a="http://schemas.openxmlformats.org/drawingml/2006/main" xmlns:r="http://schemas.openxmlformats.org/officeDocument/2006/relationships" xmlns:p="http://schemas.openxmlformats.org/presentationml/2006/main">
+  <p:cSld>
+    <p:spTree>
+      <p:nvGrpSpPr>
+        <p:cNvPr id="1" name=""/>
+        <p:cNvGrpSpPr/>
+        <p:nvPr/>
+      </p:nvGrpSpPr>
+      <p:grpSpPr>
+        <a:xfrm>
+          <a:off x="0" y="0"/>
+          <a:ext cx="0" cy="0"/>
+          <a:chOff x="0" y="0"/>
+          <a:chExt cx="0" cy="0"/>
+        </a:xfrm>
+      </p:grpSpPr>
       <mc:AlternateContent xmlns:mc="http://schemas.openxmlformats.org/markup-compatibility/2006" xmlns:a14="http://schemas.microsoft.com/office/drawing/2010/main">
         <mc:Choice Requires="a14">
           <p:sp>
@@ -5641,7 +7755,7 @@
 </p:sld>
 </file>
 
-<file path=ppt/slides/slide11.xml><?xml version="1.0" encoding="utf-8"?>
+<file path=ppt/slides/slide12.xml><?xml version="1.0" encoding="utf-8"?>
 <p:sld xmlns:a="http://schemas.openxmlformats.org/drawingml/2006/main" xmlns:r="http://schemas.openxmlformats.org/officeDocument/2006/relationships" xmlns:p="http://schemas.openxmlformats.org/presentationml/2006/main">
   <p:cSld>
     <p:spTree>
@@ -10231,6 +12345,345 @@
           <p:cNvPr id="2" name="Title 1">
             <a:extLst>
               <a:ext uri="{FF2B5EF4-FFF2-40B4-BE49-F238E27FC236}">
+                <a16:creationId xmlns:a16="http://schemas.microsoft.com/office/drawing/2014/main" id="{D4DAE5EC-A291-71B6-D008-AD6EDE0BA6A8}"/>
+              </a:ext>
+            </a:extLst>
+          </p:cNvPr>
+          <p:cNvSpPr>
+            <a:spLocks noGrp="1"/>
+          </p:cNvSpPr>
+          <p:nvPr>
+            <p:ph type="title"/>
+          </p:nvPr>
+        </p:nvSpPr>
+        <p:spPr/>
+        <p:txBody>
+          <a:bodyPr/>
+          <a:lstStyle/>
+          <a:p>
+            <a:endParaRPr lang="en-AU"/>
+          </a:p>
+        </p:txBody>
+      </p:sp>
+      <p:pic>
+        <p:nvPicPr>
+          <p:cNvPr id="4" name="Content Placeholder 3">
+            <a:extLst>
+              <a:ext uri="{FF2B5EF4-FFF2-40B4-BE49-F238E27FC236}">
+                <a16:creationId xmlns:a16="http://schemas.microsoft.com/office/drawing/2014/main" id="{DCC1A78D-8AC6-95A8-91A4-39F8B04AFAB4}"/>
+              </a:ext>
+            </a:extLst>
+          </p:cNvPr>
+          <p:cNvPicPr>
+            <a:picLocks noGrp="1" noChangeAspect="1"/>
+          </p:cNvPicPr>
+          <p:nvPr>
+            <p:ph idx="1"/>
+          </p:nvPr>
+        </p:nvPicPr>
+        <p:blipFill>
+          <a:blip r:embed="rId2"/>
+          <a:stretch>
+            <a:fillRect/>
+          </a:stretch>
+        </p:blipFill>
+        <p:spPr>
+          <a:xfrm>
+            <a:off x="2207911" y="468316"/>
+            <a:ext cx="7420992" cy="4412025"/>
+          </a:xfrm>
+          <a:prstGeom prst="rect">
+            <a:avLst/>
+          </a:prstGeom>
+        </p:spPr>
+      </p:pic>
+      <mc:AlternateContent xmlns:mc="http://schemas.openxmlformats.org/markup-compatibility/2006">
+        <mc:Choice xmlns:a14="http://schemas.microsoft.com/office/drawing/2010/main" Requires="a14">
+          <p:sp>
+            <p:nvSpPr>
+              <p:cNvPr id="5" name="TextBox 4">
+                <a:extLst>
+                  <a:ext uri="{FF2B5EF4-FFF2-40B4-BE49-F238E27FC236}">
+                    <a16:creationId xmlns:a16="http://schemas.microsoft.com/office/drawing/2014/main" id="{8E1AC157-D6DE-7A62-CB4A-E7CAC90BF762}"/>
+                  </a:ext>
+                </a:extLst>
+              </p:cNvPr>
+              <p:cNvSpPr txBox="1"/>
+              <p:nvPr/>
+            </p:nvSpPr>
+            <p:spPr>
+              <a:xfrm>
+                <a:off x="731256" y="5066245"/>
+                <a:ext cx="11170763" cy="1323439"/>
+              </a:xfrm>
+              <a:prstGeom prst="rect">
+                <a:avLst/>
+              </a:prstGeom>
+              <a:noFill/>
+            </p:spPr>
+            <p:txBody>
+              <a:bodyPr wrap="square" rtlCol="0">
+                <a:spAutoFit/>
+              </a:bodyPr>
+              <a:lstStyle/>
+              <a:p>
+                <a:pPr marL="285750" indent="-285750">
+                  <a:buFont typeface="Arial" panose="020B0604020202020204" pitchFamily="34" charset="0"/>
+                  <a:buChar char="•"/>
+                </a:pPr>
+                <a:r>
+                  <a:rPr lang="en-AU" sz="2000" dirty="0"/>
+                  <a:t>Two types of coupling from </a:t>
+                </a:r>
+                <a14:m>
+                  <m:oMath xmlns:m="http://schemas.openxmlformats.org/officeDocument/2006/math">
+                    <m:sSub>
+                      <m:sSubPr>
+                        <m:ctrlPr>
+                          <a:rPr lang="en-AU" sz="2000" b="0" i="1" smtClean="0">
+                            <a:latin typeface="Cambria Math" panose="02040503050406030204" pitchFamily="18" charset="0"/>
+                          </a:rPr>
+                        </m:ctrlPr>
+                      </m:sSubPr>
+                      <m:e>
+                        <m:r>
+                          <a:rPr lang="en-AU" sz="2000" b="0" i="1" smtClean="0">
+                            <a:latin typeface="Cambria Math" panose="02040503050406030204" pitchFamily="18" charset="0"/>
+                          </a:rPr>
+                          <m:t>𝑎</m:t>
+                        </m:r>
+                      </m:e>
+                      <m:sub>
+                        <m:r>
+                          <a:rPr lang="en-AU" sz="2000" b="0" i="1" smtClean="0">
+                            <a:latin typeface="Cambria Math" panose="02040503050406030204" pitchFamily="18" charset="0"/>
+                          </a:rPr>
+                          <m:t>0</m:t>
+                        </m:r>
+                      </m:sub>
+                    </m:sSub>
+                    <m:r>
+                      <a:rPr lang="en-AU" sz="2000" b="0" i="1" smtClean="0">
+                        <a:latin typeface="Cambria Math" panose="02040503050406030204" pitchFamily="18" charset="0"/>
+                      </a:rPr>
+                      <m:t>→</m:t>
+                    </m:r>
+                    <m:r>
+                      <a:rPr lang="en-AU" sz="2000" b="0" i="1" smtClean="0">
+                        <a:latin typeface="Cambria Math" panose="02040503050406030204" pitchFamily="18" charset="0"/>
+                      </a:rPr>
+                      <m:t>𝛾𝛾</m:t>
+                    </m:r>
+                  </m:oMath>
+                </a14:m>
+                <a:r>
+                  <a:rPr lang="en-AU" sz="2000" dirty="0"/>
+                  <a:t>. One from chiral transformation and the other one from mixing between pseudoscalars and ALP</a:t>
+                </a:r>
+              </a:p>
+              <a:p>
+                <a:pPr marL="285750" indent="-285750">
+                  <a:buFont typeface="Arial" panose="020B0604020202020204" pitchFamily="34" charset="0"/>
+                  <a:buChar char="•"/>
+                </a:pPr>
+                <a:r>
+                  <a:rPr lang="en-AU" sz="2000" dirty="0"/>
+                  <a:t>Dip at 650 MeV may be caused by negative interference between the </a:t>
+                </a:r>
+                <a14:m>
+                  <m:oMath xmlns:m="http://schemas.openxmlformats.org/officeDocument/2006/math">
+                    <m:sSub>
+                      <m:sSubPr>
+                        <m:ctrlPr>
+                          <a:rPr lang="en-AU" sz="2000" b="0" i="1" smtClean="0">
+                            <a:latin typeface="Cambria Math" panose="02040503050406030204" pitchFamily="18" charset="0"/>
+                          </a:rPr>
+                        </m:ctrlPr>
+                      </m:sSubPr>
+                      <m:e>
+                        <m:r>
+                          <a:rPr lang="en-AU" sz="2000" b="0" i="1" smtClean="0">
+                            <a:latin typeface="Cambria Math" panose="02040503050406030204" pitchFamily="18" charset="0"/>
+                          </a:rPr>
+                          <m:t>𝑎</m:t>
+                        </m:r>
+                      </m:e>
+                      <m:sub>
+                        <m:r>
+                          <a:rPr lang="en-AU" sz="2000" b="0" i="1" smtClean="0">
+                            <a:latin typeface="Cambria Math" panose="02040503050406030204" pitchFamily="18" charset="0"/>
+                          </a:rPr>
+                          <m:t>0</m:t>
+                        </m:r>
+                      </m:sub>
+                    </m:sSub>
+                  </m:oMath>
+                </a14:m>
+                <a:r>
+                  <a:rPr lang="en-AU" sz="2000" dirty="0"/>
+                  <a:t>-</a:t>
+                </a:r>
+                <a14:m>
+                  <m:oMath xmlns:m="http://schemas.openxmlformats.org/officeDocument/2006/math">
+                    <m:r>
+                      <a:rPr lang="en-AU" sz="2000" b="0" i="1" dirty="0" smtClean="0">
+                        <a:latin typeface="Cambria Math" panose="02040503050406030204" pitchFamily="18" charset="0"/>
+                      </a:rPr>
+                      <m:t>𝜂</m:t>
+                    </m:r>
+                  </m:oMath>
+                </a14:m>
+                <a:r>
+                  <a:rPr lang="en-AU" sz="2000" dirty="0"/>
+                  <a:t> and </a:t>
+                </a:r>
+                <a14:m>
+                  <m:oMath xmlns:m="http://schemas.openxmlformats.org/officeDocument/2006/math">
+                    <m:sSub>
+                      <m:sSubPr>
+                        <m:ctrlPr>
+                          <a:rPr lang="en-AU" sz="2000" b="0" i="1" smtClean="0">
+                            <a:latin typeface="Cambria Math" panose="02040503050406030204" pitchFamily="18" charset="0"/>
+                          </a:rPr>
+                        </m:ctrlPr>
+                      </m:sSubPr>
+                      <m:e>
+                        <m:r>
+                          <a:rPr lang="en-AU" sz="2000" b="0" i="1" smtClean="0">
+                            <a:latin typeface="Cambria Math" panose="02040503050406030204" pitchFamily="18" charset="0"/>
+                          </a:rPr>
+                          <m:t>𝑎</m:t>
+                        </m:r>
+                      </m:e>
+                      <m:sub>
+                        <m:r>
+                          <a:rPr lang="en-AU" sz="2000" b="0" i="1" smtClean="0">
+                            <a:latin typeface="Cambria Math" panose="02040503050406030204" pitchFamily="18" charset="0"/>
+                          </a:rPr>
+                          <m:t>0</m:t>
+                        </m:r>
+                      </m:sub>
+                    </m:sSub>
+                  </m:oMath>
+                </a14:m>
+                <a:r>
+                  <a:rPr lang="en-AU" sz="2000" dirty="0"/>
+                  <a:t>-</a:t>
+                </a:r>
+                <a14:m>
+                  <m:oMath xmlns:m="http://schemas.openxmlformats.org/officeDocument/2006/math">
+                    <m:r>
+                      <a:rPr lang="en-AU" sz="2000" b="0" i="1" dirty="0" smtClean="0">
+                        <a:latin typeface="Cambria Math" panose="02040503050406030204" pitchFamily="18" charset="0"/>
+                      </a:rPr>
+                      <m:t>𝜂</m:t>
+                    </m:r>
+                    <m:r>
+                      <a:rPr lang="en-AU" sz="2000" b="0" i="1" dirty="0" smtClean="0">
+                        <a:latin typeface="Cambria Math" panose="02040503050406030204" pitchFamily="18" charset="0"/>
+                      </a:rPr>
+                      <m:t>′</m:t>
+                    </m:r>
+                  </m:oMath>
+                </a14:m>
+                <a:r>
+                  <a:rPr lang="en-AU" sz="2000" dirty="0"/>
+                  <a:t> terms</a:t>
+                </a:r>
+              </a:p>
+              <a:p>
+                <a:pPr marL="285750" indent="-285750">
+                  <a:buFont typeface="Arial" panose="020B0604020202020204" pitchFamily="34" charset="0"/>
+                  <a:buChar char="•"/>
+                </a:pPr>
+                <a:r>
+                  <a:rPr lang="en-AU" sz="2000" dirty="0"/>
+                  <a:t>May/may not be model dependent</a:t>
+                </a:r>
+              </a:p>
+            </p:txBody>
+          </p:sp>
+        </mc:Choice>
+        <mc:Fallback>
+          <p:sp>
+            <p:nvSpPr>
+              <p:cNvPr id="5" name="TextBox 4">
+                <a:extLst>
+                  <a:ext uri="{FF2B5EF4-FFF2-40B4-BE49-F238E27FC236}">
+                    <a16:creationId xmlns:a16="http://schemas.microsoft.com/office/drawing/2014/main" id="{8E1AC157-D6DE-7A62-CB4A-E7CAC90BF762}"/>
+                  </a:ext>
+                </a:extLst>
+              </p:cNvPr>
+              <p:cNvSpPr txBox="1">
+                <a:spLocks noRot="1" noChangeAspect="1" noMove="1" noResize="1" noEditPoints="1" noAdjustHandles="1" noChangeArrowheads="1" noChangeShapeType="1" noTextEdit="1"/>
+              </p:cNvSpPr>
+              <p:nvPr/>
+            </p:nvSpPr>
+            <p:spPr>
+              <a:xfrm>
+                <a:off x="731256" y="5066245"/>
+                <a:ext cx="11170763" cy="1323439"/>
+              </a:xfrm>
+              <a:prstGeom prst="rect">
+                <a:avLst/>
+              </a:prstGeom>
+              <a:blipFill>
+                <a:blip r:embed="rId3"/>
+                <a:stretch>
+                  <a:fillRect l="-491" t="-2304" b="-7373"/>
+                </a:stretch>
+              </a:blipFill>
+            </p:spPr>
+            <p:txBody>
+              <a:bodyPr/>
+              <a:lstStyle/>
+              <a:p>
+                <a:r>
+                  <a:rPr lang="en-AU">
+                    <a:noFill/>
+                  </a:rPr>
+                  <a:t> </a:t>
+                </a:r>
+              </a:p>
+            </p:txBody>
+          </p:sp>
+        </mc:Fallback>
+      </mc:AlternateContent>
+    </p:spTree>
+    <p:extLst>
+      <p:ext uri="{BB962C8B-B14F-4D97-AF65-F5344CB8AC3E}">
+        <p14:creationId xmlns:p14="http://schemas.microsoft.com/office/powerpoint/2010/main" val="204394979"/>
+      </p:ext>
+    </p:extLst>
+  </p:cSld>
+  <p:clrMapOvr>
+    <a:masterClrMapping/>
+  </p:clrMapOvr>
+</p:sld>
+</file>
+
+<file path=ppt/slides/slide7.xml><?xml version="1.0" encoding="utf-8"?>
+<p:sld xmlns:a="http://schemas.openxmlformats.org/drawingml/2006/main" xmlns:r="http://schemas.openxmlformats.org/officeDocument/2006/relationships" xmlns:p="http://schemas.openxmlformats.org/presentationml/2006/main">
+  <p:cSld>
+    <p:spTree>
+      <p:nvGrpSpPr>
+        <p:cNvPr id="1" name=""/>
+        <p:cNvGrpSpPr/>
+        <p:nvPr/>
+      </p:nvGrpSpPr>
+      <p:grpSpPr>
+        <a:xfrm>
+          <a:off x="0" y="0"/>
+          <a:ext cx="0" cy="0"/>
+          <a:chOff x="0" y="0"/>
+          <a:chExt cx="0" cy="0"/>
+        </a:xfrm>
+      </p:grpSpPr>
+      <p:sp>
+        <p:nvSpPr>
+          <p:cNvPr id="2" name="Title 1">
+            <a:extLst>
+              <a:ext uri="{FF2B5EF4-FFF2-40B4-BE49-F238E27FC236}">
                 <a16:creationId xmlns:a16="http://schemas.microsoft.com/office/drawing/2014/main" id="{19492284-1373-3F1E-E059-E31866FACDD7}"/>
               </a:ext>
             </a:extLst>
@@ -10322,7 +12775,7 @@
 </p:sld>
 </file>
 
-<file path=ppt/slides/slide7.xml><?xml version="1.0" encoding="utf-8"?>
+<file path=ppt/slides/slide8.xml><?xml version="1.0" encoding="utf-8"?>
 <p:sld xmlns:a="http://schemas.openxmlformats.org/drawingml/2006/main" xmlns:r="http://schemas.openxmlformats.org/officeDocument/2006/relationships" xmlns:p="http://schemas.openxmlformats.org/presentationml/2006/main">
   <p:cSld>
     <p:spTree>
@@ -10554,7 +13007,7 @@
 </p:sld>
 </file>
 
-<file path=ppt/slides/slide8.xml><?xml version="1.0" encoding="utf-8"?>
+<file path=ppt/slides/slide9.xml><?xml version="1.0" encoding="utf-8"?>
 <p:sld xmlns:a="http://schemas.openxmlformats.org/drawingml/2006/main" xmlns:r="http://schemas.openxmlformats.org/officeDocument/2006/relationships" xmlns:p="http://schemas.openxmlformats.org/presentationml/2006/main">
   <p:cSld>
     <p:spTree>
@@ -11328,2119 +13781,6 @@
     <p:extLst>
       <p:ext uri="{BB962C8B-B14F-4D97-AF65-F5344CB8AC3E}">
         <p14:creationId xmlns:p14="http://schemas.microsoft.com/office/powerpoint/2010/main" val="2927900761"/>
-      </p:ext>
-    </p:extLst>
-  </p:cSld>
-  <p:clrMapOvr>
-    <a:masterClrMapping/>
-  </p:clrMapOvr>
-</p:sld>
-</file>
-
-<file path=ppt/slides/slide9.xml><?xml version="1.0" encoding="utf-8"?>
-<p:sld xmlns:a="http://schemas.openxmlformats.org/drawingml/2006/main" xmlns:r="http://schemas.openxmlformats.org/officeDocument/2006/relationships" xmlns:p="http://schemas.openxmlformats.org/presentationml/2006/main">
-  <p:cSld>
-    <p:spTree>
-      <p:nvGrpSpPr>
-        <p:cNvPr id="1" name=""/>
-        <p:cNvGrpSpPr/>
-        <p:nvPr/>
-      </p:nvGrpSpPr>
-      <p:grpSpPr>
-        <a:xfrm>
-          <a:off x="0" y="0"/>
-          <a:ext cx="0" cy="0"/>
-          <a:chOff x="0" y="0"/>
-          <a:chExt cx="0" cy="0"/>
-        </a:xfrm>
-      </p:grpSpPr>
-      <p:sp>
-        <p:nvSpPr>
-          <p:cNvPr id="2" name="Title 1">
-            <a:extLst>
-              <a:ext uri="{FF2B5EF4-FFF2-40B4-BE49-F238E27FC236}">
-                <a16:creationId xmlns:a16="http://schemas.microsoft.com/office/drawing/2014/main" id="{C031A75E-9A22-B5E6-4C87-D6265CDC5810}"/>
-              </a:ext>
-            </a:extLst>
-          </p:cNvPr>
-          <p:cNvSpPr>
-            <a:spLocks noGrp="1"/>
-          </p:cNvSpPr>
-          <p:nvPr>
-            <p:ph type="title"/>
-          </p:nvPr>
-        </p:nvSpPr>
-        <p:spPr/>
-        <p:txBody>
-          <a:bodyPr/>
-          <a:lstStyle/>
-          <a:p>
-            <a:r>
-              <a:rPr lang="en-AU" b="1" dirty="0"/>
-              <a:t>Link Between Branching Ratio, Coupling Strength and Mass of ALP</a:t>
-            </a:r>
-          </a:p>
-        </p:txBody>
-      </p:sp>
-      <mc:AlternateContent xmlns:mc="http://schemas.openxmlformats.org/markup-compatibility/2006" xmlns:a14="http://schemas.microsoft.com/office/drawing/2010/main">
-        <mc:Choice Requires="a14">
-          <p:sp>
-            <p:nvSpPr>
-              <p:cNvPr id="3" name="Content Placeholder 2">
-                <a:extLst>
-                  <a:ext uri="{FF2B5EF4-FFF2-40B4-BE49-F238E27FC236}">
-                    <a16:creationId xmlns:a16="http://schemas.microsoft.com/office/drawing/2014/main" id="{82478C4D-36D7-B03B-DB92-4BCFE01B6A3A}"/>
-                  </a:ext>
-                </a:extLst>
-              </p:cNvPr>
-              <p:cNvSpPr>
-                <a:spLocks noGrp="1"/>
-              </p:cNvSpPr>
-              <p:nvPr>
-                <p:ph idx="1"/>
-              </p:nvPr>
-            </p:nvSpPr>
-            <p:spPr>
-              <a:xfrm>
-                <a:off x="838200" y="1800686"/>
-                <a:ext cx="10515600" cy="4351338"/>
-              </a:xfrm>
-            </p:spPr>
-            <p:txBody>
-              <a:bodyPr>
-                <a:normAutofit fontScale="92500" lnSpcReduction="10000"/>
-              </a:bodyPr>
-              <a:lstStyle/>
-              <a:p>
-                <a:pPr marL="0" indent="0">
-                  <a:buNone/>
-                </a:pPr>
-                <a14:m>
-                  <m:oMathPara xmlns:m="http://schemas.openxmlformats.org/officeDocument/2006/math">
-                    <m:oMathParaPr>
-                      <m:jc m:val="centerGroup"/>
-                    </m:oMathParaPr>
-                    <m:oMath xmlns:m="http://schemas.openxmlformats.org/officeDocument/2006/math">
-                      <m:r>
-                        <a:rPr lang="en-AU" b="0" i="1" smtClean="0">
-                          <a:latin typeface="Cambria Math" panose="02040503050406030204" pitchFamily="18" charset="0"/>
-                        </a:rPr>
-                        <m:t>𝐵𝑅</m:t>
-                      </m:r>
-                      <m:d>
-                        <m:dPr>
-                          <m:ctrlPr>
-                            <a:rPr lang="en-AU" b="0" i="1" smtClean="0">
-                              <a:latin typeface="Cambria Math" panose="02040503050406030204" pitchFamily="18" charset="0"/>
-                            </a:rPr>
-                          </m:ctrlPr>
-                        </m:dPr>
-                        <m:e>
-                          <m:sSup>
-                            <m:sSupPr>
-                              <m:ctrlPr>
-                                <a:rPr lang="en-AU" b="0" i="1" smtClean="0">
-                                  <a:latin typeface="Cambria Math" panose="02040503050406030204" pitchFamily="18" charset="0"/>
-                                </a:rPr>
-                              </m:ctrlPr>
-                            </m:sSupPr>
-                            <m:e>
-                              <m:r>
-                                <a:rPr lang="en-AU" b="0" i="1" smtClean="0">
-                                  <a:latin typeface="Cambria Math" panose="02040503050406030204" pitchFamily="18" charset="0"/>
-                                </a:rPr>
-                                <m:t>𝐵</m:t>
-                              </m:r>
-                            </m:e>
-                            <m:sup>
-                              <m:r>
-                                <a:rPr lang="en-AU" b="0" i="1" smtClean="0">
-                                  <a:latin typeface="Cambria Math" panose="02040503050406030204" pitchFamily="18" charset="0"/>
-                                </a:rPr>
-                                <m:t>0</m:t>
-                              </m:r>
-                            </m:sup>
-                          </m:sSup>
-                          <m:r>
-                            <a:rPr lang="en-AU" b="0" i="1" smtClean="0">
-                              <a:latin typeface="Cambria Math" panose="02040503050406030204" pitchFamily="18" charset="0"/>
-                            </a:rPr>
-                            <m:t>→</m:t>
-                          </m:r>
-                          <m:sSup>
-                            <m:sSupPr>
-                              <m:ctrlPr>
-                                <a:rPr lang="en-AU" b="0" i="1" smtClean="0">
-                                  <a:latin typeface="Cambria Math" panose="02040503050406030204" pitchFamily="18" charset="0"/>
-                                </a:rPr>
-                              </m:ctrlPr>
-                            </m:sSupPr>
-                            <m:e>
-                              <m:r>
-                                <a:rPr lang="en-AU" b="0" i="1" smtClean="0">
-                                  <a:latin typeface="Cambria Math" panose="02040503050406030204" pitchFamily="18" charset="0"/>
-                                </a:rPr>
-                                <m:t>𝐾</m:t>
-                              </m:r>
-                            </m:e>
-                            <m:sup>
-                              <m:r>
-                                <a:rPr lang="en-AU" b="0" i="1" smtClean="0">
-                                  <a:latin typeface="Cambria Math" panose="02040503050406030204" pitchFamily="18" charset="0"/>
-                                </a:rPr>
-                                <m:t>∗</m:t>
-                              </m:r>
-                            </m:sup>
-                          </m:sSup>
-                          <m:sSub>
-                            <m:sSubPr>
-                              <m:ctrlPr>
-                                <a:rPr lang="en-AU" b="0" i="1" smtClean="0">
-                                  <a:latin typeface="Cambria Math" panose="02040503050406030204" pitchFamily="18" charset="0"/>
-                                </a:rPr>
-                              </m:ctrlPr>
-                            </m:sSubPr>
-                            <m:e>
-                              <m:r>
-                                <a:rPr lang="en-AU" b="0" i="1" smtClean="0">
-                                  <a:latin typeface="Cambria Math" panose="02040503050406030204" pitchFamily="18" charset="0"/>
-                                </a:rPr>
-                                <m:t>𝑎</m:t>
-                              </m:r>
-                            </m:e>
-                            <m:sub>
-                              <m:r>
-                                <a:rPr lang="en-AU" b="0" i="1" smtClean="0">
-                                  <a:latin typeface="Cambria Math" panose="02040503050406030204" pitchFamily="18" charset="0"/>
-                                </a:rPr>
-                                <m:t>0</m:t>
-                              </m:r>
-                            </m:sub>
-                          </m:sSub>
-                          <m:r>
-                            <a:rPr lang="en-AU" b="0" i="1" smtClean="0">
-                              <a:latin typeface="Cambria Math" panose="02040503050406030204" pitchFamily="18" charset="0"/>
-                            </a:rPr>
-                            <m:t>, </m:t>
-                          </m:r>
-                          <m:sSub>
-                            <m:sSubPr>
-                              <m:ctrlPr>
-                                <a:rPr lang="en-AU" b="0" i="1" smtClean="0">
-                                  <a:latin typeface="Cambria Math" panose="02040503050406030204" pitchFamily="18" charset="0"/>
-                                </a:rPr>
-                              </m:ctrlPr>
-                            </m:sSubPr>
-                            <m:e>
-                              <m:r>
-                                <a:rPr lang="en-AU" b="0" i="1" smtClean="0">
-                                  <a:latin typeface="Cambria Math" panose="02040503050406030204" pitchFamily="18" charset="0"/>
-                                </a:rPr>
-                                <m:t>𝑎</m:t>
-                              </m:r>
-                            </m:e>
-                            <m:sub>
-                              <m:r>
-                                <a:rPr lang="en-AU" b="0" i="1" smtClean="0">
-                                  <a:latin typeface="Cambria Math" panose="02040503050406030204" pitchFamily="18" charset="0"/>
-                                </a:rPr>
-                                <m:t>0</m:t>
-                              </m:r>
-                            </m:sub>
-                          </m:sSub>
-                          <m:r>
-                            <a:rPr lang="en-AU" b="0" i="1" smtClean="0">
-                              <a:latin typeface="Cambria Math" panose="02040503050406030204" pitchFamily="18" charset="0"/>
-                            </a:rPr>
-                            <m:t>→</m:t>
-                          </m:r>
-                          <m:r>
-                            <a:rPr lang="en-AU" b="0" i="1" smtClean="0">
-                              <a:latin typeface="Cambria Math" panose="02040503050406030204" pitchFamily="18" charset="0"/>
-                            </a:rPr>
-                            <m:t>𝛾𝛾</m:t>
-                          </m:r>
-                        </m:e>
-                      </m:d>
-                      <m:r>
-                        <a:rPr lang="en-AU" b="0" i="1" smtClean="0">
-                          <a:latin typeface="Cambria Math" panose="02040503050406030204" pitchFamily="18" charset="0"/>
-                        </a:rPr>
-                        <m:t>=</m:t>
-                      </m:r>
-                      <m:r>
-                        <m:rPr>
-                          <m:sty m:val="p"/>
-                        </m:rPr>
-                        <a:rPr lang="en-AU" b="0" i="0" smtClean="0">
-                          <a:latin typeface="Cambria Math" panose="02040503050406030204" pitchFamily="18" charset="0"/>
-                        </a:rPr>
-                        <m:t>Γ</m:t>
-                      </m:r>
-                      <m:d>
-                        <m:dPr>
-                          <m:ctrlPr>
-                            <a:rPr lang="en-AU" b="0" i="1" smtClean="0">
-                              <a:latin typeface="Cambria Math" panose="02040503050406030204" pitchFamily="18" charset="0"/>
-                            </a:rPr>
-                          </m:ctrlPr>
-                        </m:dPr>
-                        <m:e>
-                          <m:sSup>
-                            <m:sSupPr>
-                              <m:ctrlPr>
-                                <a:rPr lang="en-AU" b="0" i="1" smtClean="0">
-                                  <a:latin typeface="Cambria Math" panose="02040503050406030204" pitchFamily="18" charset="0"/>
-                                </a:rPr>
-                              </m:ctrlPr>
-                            </m:sSupPr>
-                            <m:e>
-                              <m:r>
-                                <a:rPr lang="en-AU" b="0" i="1" smtClean="0">
-                                  <a:latin typeface="Cambria Math" panose="02040503050406030204" pitchFamily="18" charset="0"/>
-                                </a:rPr>
-                                <m:t>𝐵</m:t>
-                              </m:r>
-                            </m:e>
-                            <m:sup>
-                              <m:r>
-                                <a:rPr lang="en-AU" b="0" i="1" smtClean="0">
-                                  <a:latin typeface="Cambria Math" panose="02040503050406030204" pitchFamily="18" charset="0"/>
-                                </a:rPr>
-                                <m:t>0</m:t>
-                              </m:r>
-                            </m:sup>
-                          </m:sSup>
-                          <m:r>
-                            <a:rPr lang="en-AU" b="0" i="1" smtClean="0">
-                              <a:latin typeface="Cambria Math" panose="02040503050406030204" pitchFamily="18" charset="0"/>
-                            </a:rPr>
-                            <m:t>→</m:t>
-                          </m:r>
-                          <m:sSup>
-                            <m:sSupPr>
-                              <m:ctrlPr>
-                                <a:rPr lang="en-AU" b="0" i="1" smtClean="0">
-                                  <a:latin typeface="Cambria Math" panose="02040503050406030204" pitchFamily="18" charset="0"/>
-                                </a:rPr>
-                              </m:ctrlPr>
-                            </m:sSupPr>
-                            <m:e>
-                              <m:r>
-                                <a:rPr lang="en-AU" b="0" i="1" smtClean="0">
-                                  <a:latin typeface="Cambria Math" panose="02040503050406030204" pitchFamily="18" charset="0"/>
-                                </a:rPr>
-                                <m:t>𝐾</m:t>
-                              </m:r>
-                            </m:e>
-                            <m:sup>
-                              <m:r>
-                                <a:rPr lang="en-AU" b="0" i="1" smtClean="0">
-                                  <a:latin typeface="Cambria Math" panose="02040503050406030204" pitchFamily="18" charset="0"/>
-                                </a:rPr>
-                                <m:t>∗</m:t>
-                              </m:r>
-                            </m:sup>
-                          </m:sSup>
-                          <m:sSub>
-                            <m:sSubPr>
-                              <m:ctrlPr>
-                                <a:rPr lang="en-AU" b="0" i="1" smtClean="0">
-                                  <a:latin typeface="Cambria Math" panose="02040503050406030204" pitchFamily="18" charset="0"/>
-                                </a:rPr>
-                              </m:ctrlPr>
-                            </m:sSubPr>
-                            <m:e>
-                              <m:r>
-                                <a:rPr lang="en-AU" b="0" i="1" smtClean="0">
-                                  <a:latin typeface="Cambria Math" panose="02040503050406030204" pitchFamily="18" charset="0"/>
-                                </a:rPr>
-                                <m:t>𝑎</m:t>
-                              </m:r>
-                            </m:e>
-                            <m:sub>
-                              <m:r>
-                                <a:rPr lang="en-AU" b="0" i="1" smtClean="0">
-                                  <a:latin typeface="Cambria Math" panose="02040503050406030204" pitchFamily="18" charset="0"/>
-                                </a:rPr>
-                                <m:t>0</m:t>
-                              </m:r>
-                            </m:sub>
-                          </m:sSub>
-                        </m:e>
-                      </m:d>
-                      <m:sSub>
-                        <m:sSubPr>
-                          <m:ctrlPr>
-                            <a:rPr lang="en-AU" b="0" i="1" smtClean="0">
-                              <a:latin typeface="Cambria Math" panose="02040503050406030204" pitchFamily="18" charset="0"/>
-                            </a:rPr>
-                          </m:ctrlPr>
-                        </m:sSubPr>
-                        <m:e>
-                          <m:r>
-                            <a:rPr lang="en-AU" b="0" i="1" smtClean="0">
-                              <a:latin typeface="Cambria Math" panose="02040503050406030204" pitchFamily="18" charset="0"/>
-                            </a:rPr>
-                            <m:t>𝜏</m:t>
-                          </m:r>
-                        </m:e>
-                        <m:sub>
-                          <m:sSup>
-                            <m:sSupPr>
-                              <m:ctrlPr>
-                                <a:rPr lang="en-AU" b="0" i="1" smtClean="0">
-                                  <a:latin typeface="Cambria Math" panose="02040503050406030204" pitchFamily="18" charset="0"/>
-                                </a:rPr>
-                              </m:ctrlPr>
-                            </m:sSupPr>
-                            <m:e>
-                              <m:r>
-                                <a:rPr lang="en-AU" b="0" i="1" smtClean="0">
-                                  <a:latin typeface="Cambria Math" panose="02040503050406030204" pitchFamily="18" charset="0"/>
-                                </a:rPr>
-                                <m:t>𝐵</m:t>
-                              </m:r>
-                            </m:e>
-                            <m:sup>
-                              <m:r>
-                                <a:rPr lang="en-AU" b="0" i="1" smtClean="0">
-                                  <a:latin typeface="Cambria Math" panose="02040503050406030204" pitchFamily="18" charset="0"/>
-                                </a:rPr>
-                                <m:t>0</m:t>
-                              </m:r>
-                            </m:sup>
-                          </m:sSup>
-                        </m:sub>
-                      </m:sSub>
-                      <m:r>
-                        <m:rPr>
-                          <m:sty m:val="p"/>
-                        </m:rPr>
-                        <a:rPr lang="en-AU" b="0" i="0" smtClean="0">
-                          <a:latin typeface="Cambria Math" panose="02040503050406030204" pitchFamily="18" charset="0"/>
-                        </a:rPr>
-                        <m:t>Γ</m:t>
-                      </m:r>
-                      <m:d>
-                        <m:dPr>
-                          <m:ctrlPr>
-                            <a:rPr lang="en-AU" b="0" i="1" smtClean="0">
-                              <a:latin typeface="Cambria Math" panose="02040503050406030204" pitchFamily="18" charset="0"/>
-                            </a:rPr>
-                          </m:ctrlPr>
-                        </m:dPr>
-                        <m:e>
-                          <m:sSub>
-                            <m:sSubPr>
-                              <m:ctrlPr>
-                                <a:rPr lang="en-AU" b="0" i="1" smtClean="0">
-                                  <a:latin typeface="Cambria Math" panose="02040503050406030204" pitchFamily="18" charset="0"/>
-                                </a:rPr>
-                              </m:ctrlPr>
-                            </m:sSubPr>
-                            <m:e>
-                              <m:r>
-                                <a:rPr lang="en-AU" b="0" i="1" smtClean="0">
-                                  <a:latin typeface="Cambria Math" panose="02040503050406030204" pitchFamily="18" charset="0"/>
-                                </a:rPr>
-                                <m:t>𝑎</m:t>
-                              </m:r>
-                            </m:e>
-                            <m:sub>
-                              <m:r>
-                                <a:rPr lang="en-AU" b="0" i="1" smtClean="0">
-                                  <a:latin typeface="Cambria Math" panose="02040503050406030204" pitchFamily="18" charset="0"/>
-                                </a:rPr>
-                                <m:t>0</m:t>
-                              </m:r>
-                            </m:sub>
-                          </m:sSub>
-                          <m:r>
-                            <a:rPr lang="en-AU" b="0" i="1" smtClean="0">
-                              <a:latin typeface="Cambria Math" panose="02040503050406030204" pitchFamily="18" charset="0"/>
-                            </a:rPr>
-                            <m:t>→</m:t>
-                          </m:r>
-                          <m:r>
-                            <a:rPr lang="en-AU" b="0" i="1" smtClean="0">
-                              <a:latin typeface="Cambria Math" panose="02040503050406030204" pitchFamily="18" charset="0"/>
-                            </a:rPr>
-                            <m:t>𝛾𝛾</m:t>
-                          </m:r>
-                        </m:e>
-                      </m:d>
-                      <m:sSub>
-                        <m:sSubPr>
-                          <m:ctrlPr>
-                            <a:rPr lang="en-AU" b="0" i="1" smtClean="0">
-                              <a:latin typeface="Cambria Math" panose="02040503050406030204" pitchFamily="18" charset="0"/>
-                            </a:rPr>
-                          </m:ctrlPr>
-                        </m:sSubPr>
-                        <m:e>
-                          <m:r>
-                            <a:rPr lang="en-AU" b="0" i="1" smtClean="0">
-                              <a:latin typeface="Cambria Math" panose="02040503050406030204" pitchFamily="18" charset="0"/>
-                            </a:rPr>
-                            <m:t>𝜏</m:t>
-                          </m:r>
-                        </m:e>
-                        <m:sub>
-                          <m:sSub>
-                            <m:sSubPr>
-                              <m:ctrlPr>
-                                <a:rPr lang="en-AU" b="0" i="1" smtClean="0">
-                                  <a:latin typeface="Cambria Math" panose="02040503050406030204" pitchFamily="18" charset="0"/>
-                                </a:rPr>
-                              </m:ctrlPr>
-                            </m:sSubPr>
-                            <m:e>
-                              <m:r>
-                                <a:rPr lang="en-AU" b="0" i="1" smtClean="0">
-                                  <a:latin typeface="Cambria Math" panose="02040503050406030204" pitchFamily="18" charset="0"/>
-                                </a:rPr>
-                                <m:t>𝑎</m:t>
-                              </m:r>
-                            </m:e>
-                            <m:sub>
-                              <m:r>
-                                <a:rPr lang="en-AU" b="0" i="1" smtClean="0">
-                                  <a:latin typeface="Cambria Math" panose="02040503050406030204" pitchFamily="18" charset="0"/>
-                                </a:rPr>
-                                <m:t>0</m:t>
-                              </m:r>
-                            </m:sub>
-                          </m:sSub>
-                        </m:sub>
-                      </m:sSub>
-                    </m:oMath>
-                  </m:oMathPara>
-                </a14:m>
-                <a:endParaRPr lang="en-AU" b="0" dirty="0"/>
-              </a:p>
-              <a:p>
-                <a:pPr marL="0" indent="0">
-                  <a:buNone/>
-                </a:pPr>
-                <a14:m>
-                  <m:oMathPara xmlns:m="http://schemas.openxmlformats.org/officeDocument/2006/math">
-                    <m:oMathParaPr>
-                      <m:jc m:val="centerGroup"/>
-                    </m:oMathParaPr>
-                    <m:oMath xmlns:m="http://schemas.openxmlformats.org/officeDocument/2006/math">
-                      <m:r>
-                        <a:rPr lang="en-AU" b="0" i="1" smtClean="0">
-                          <a:latin typeface="Cambria Math" panose="02040503050406030204" pitchFamily="18" charset="0"/>
-                        </a:rPr>
-                        <m:t>=</m:t>
-                      </m:r>
-                      <m:d>
-                        <m:dPr>
-                          <m:ctrlPr>
-                            <a:rPr lang="en-AU" b="0" i="1" smtClean="0">
-                              <a:latin typeface="Cambria Math" panose="02040503050406030204" pitchFamily="18" charset="0"/>
-                            </a:rPr>
-                          </m:ctrlPr>
-                        </m:dPr>
-                        <m:e>
-                          <m:f>
-                            <m:fPr>
-                              <m:ctrlPr>
-                                <a:rPr lang="en-AU" b="0" i="1" smtClean="0">
-                                  <a:latin typeface="Cambria Math" panose="02040503050406030204" pitchFamily="18" charset="0"/>
-                                </a:rPr>
-                              </m:ctrlPr>
-                            </m:fPr>
-                            <m:num>
-                              <m:sSubSup>
-                                <m:sSubSupPr>
-                                  <m:ctrlPr>
-                                    <a:rPr lang="en-AU" b="0" i="1" smtClean="0">
-                                      <a:latin typeface="Cambria Math" panose="02040503050406030204" pitchFamily="18" charset="0"/>
-                                    </a:rPr>
-                                  </m:ctrlPr>
-                                </m:sSubSupPr>
-                                <m:e>
-                                  <m:r>
-                                    <a:rPr lang="en-AU" b="0" i="1" smtClean="0">
-                                      <a:latin typeface="Cambria Math" panose="02040503050406030204" pitchFamily="18" charset="0"/>
-                                    </a:rPr>
-                                    <m:t>𝑀</m:t>
-                                  </m:r>
-                                </m:e>
-                                <m:sub>
-                                  <m:r>
-                                    <a:rPr lang="en-AU" b="0" i="1" smtClean="0">
-                                      <a:latin typeface="Cambria Math" panose="02040503050406030204" pitchFamily="18" charset="0"/>
-                                    </a:rPr>
-                                    <m:t>𝐵</m:t>
-                                  </m:r>
-                                </m:sub>
-                                <m:sup>
-                                  <m:r>
-                                    <a:rPr lang="en-AU" b="0" i="1" smtClean="0">
-                                      <a:latin typeface="Cambria Math" panose="02040503050406030204" pitchFamily="18" charset="0"/>
-                                    </a:rPr>
-                                    <m:t>3</m:t>
-                                  </m:r>
-                                </m:sup>
-                              </m:sSubSup>
-                            </m:num>
-                            <m:den>
-                              <m:r>
-                                <a:rPr lang="en-AU" b="0" i="1" smtClean="0">
-                                  <a:latin typeface="Cambria Math" panose="02040503050406030204" pitchFamily="18" charset="0"/>
-                                </a:rPr>
-                                <m:t>64</m:t>
-                              </m:r>
-                              <m:r>
-                                <a:rPr lang="en-AU" b="0" i="1" smtClean="0">
-                                  <a:latin typeface="Cambria Math" panose="02040503050406030204" pitchFamily="18" charset="0"/>
-                                </a:rPr>
-                                <m:t>𝜋</m:t>
-                              </m:r>
-                            </m:den>
-                          </m:f>
-                          <m:sSup>
-                            <m:sSupPr>
-                              <m:ctrlPr>
-                                <a:rPr lang="en-AU" b="0" i="1" smtClean="0">
-                                  <a:latin typeface="Cambria Math" panose="02040503050406030204" pitchFamily="18" charset="0"/>
-                                </a:rPr>
-                              </m:ctrlPr>
-                            </m:sSupPr>
-                            <m:e>
-                              <m:d>
-                                <m:dPr>
-                                  <m:begChr m:val="|"/>
-                                  <m:endChr m:val="|"/>
-                                  <m:ctrlPr>
-                                    <a:rPr lang="en-AU" b="0" i="1" smtClean="0">
-                                      <a:latin typeface="Cambria Math" panose="02040503050406030204" pitchFamily="18" charset="0"/>
-                                    </a:rPr>
-                                  </m:ctrlPr>
-                                </m:dPr>
-                                <m:e>
-                                  <m:sSub>
-                                    <m:sSubPr>
-                                      <m:ctrlPr>
-                                        <a:rPr lang="en-AU" b="0" i="1" smtClean="0">
-                                          <a:latin typeface="Cambria Math" panose="02040503050406030204" pitchFamily="18" charset="0"/>
-                                        </a:rPr>
-                                      </m:ctrlPr>
-                                    </m:sSubPr>
-                                    <m:e>
-                                      <m:r>
-                                        <a:rPr lang="en-AU" b="0" i="1" smtClean="0">
-                                          <a:latin typeface="Cambria Math" panose="02040503050406030204" pitchFamily="18" charset="0"/>
-                                        </a:rPr>
-                                        <m:t>𝑔</m:t>
-                                      </m:r>
-                                    </m:e>
-                                    <m:sub>
-                                      <m:r>
-                                        <a:rPr lang="en-AU" b="0" i="1" smtClean="0">
-                                          <a:latin typeface="Cambria Math" panose="02040503050406030204" pitchFamily="18" charset="0"/>
-                                        </a:rPr>
-                                        <m:t>𝑎𝑏𝑠</m:t>
-                                      </m:r>
-                                    </m:sub>
-                                  </m:sSub>
-                                </m:e>
-                              </m:d>
-                            </m:e>
-                            <m:sup>
-                              <m:r>
-                                <a:rPr lang="en-AU" b="0" i="1" smtClean="0">
-                                  <a:latin typeface="Cambria Math" panose="02040503050406030204" pitchFamily="18" charset="0"/>
-                                </a:rPr>
-                                <m:t>2</m:t>
-                              </m:r>
-                            </m:sup>
-                          </m:sSup>
-                          <m:sSubSup>
-                            <m:sSubSupPr>
-                              <m:ctrlPr>
-                                <a:rPr lang="en-AU" b="0" i="1" smtClean="0">
-                                  <a:latin typeface="Cambria Math" panose="02040503050406030204" pitchFamily="18" charset="0"/>
-                                </a:rPr>
-                              </m:ctrlPr>
-                            </m:sSubSupPr>
-                            <m:e>
-                              <m:r>
-                                <a:rPr lang="en-AU" b="0" i="1" smtClean="0">
-                                  <a:latin typeface="Cambria Math" panose="02040503050406030204" pitchFamily="18" charset="0"/>
-                                </a:rPr>
-                                <m:t>𝐴</m:t>
-                              </m:r>
-                            </m:e>
-                            <m:sub>
-                              <m:r>
-                                <a:rPr lang="en-AU" b="0" i="1" smtClean="0">
-                                  <a:latin typeface="Cambria Math" panose="02040503050406030204" pitchFamily="18" charset="0"/>
-                                </a:rPr>
-                                <m:t>0</m:t>
-                              </m:r>
-                            </m:sub>
-                            <m:sup>
-                              <m:r>
-                                <a:rPr lang="en-AU" b="0" i="1" smtClean="0">
-                                  <a:latin typeface="Cambria Math" panose="02040503050406030204" pitchFamily="18" charset="0"/>
-                                </a:rPr>
-                                <m:t>2</m:t>
-                              </m:r>
-                            </m:sup>
-                          </m:sSubSup>
-                          <m:d>
-                            <m:dPr>
-                              <m:ctrlPr>
-                                <a:rPr lang="en-AU" b="0" i="1" smtClean="0">
-                                  <a:latin typeface="Cambria Math" panose="02040503050406030204" pitchFamily="18" charset="0"/>
-                                </a:rPr>
-                              </m:ctrlPr>
-                            </m:dPr>
-                            <m:e>
-                              <m:sSubSup>
-                                <m:sSubSupPr>
-                                  <m:ctrlPr>
-                                    <a:rPr lang="en-AU" b="0" i="1" smtClean="0">
-                                      <a:latin typeface="Cambria Math" panose="02040503050406030204" pitchFamily="18" charset="0"/>
-                                    </a:rPr>
-                                  </m:ctrlPr>
-                                </m:sSubSupPr>
-                                <m:e>
-                                  <m:r>
-                                    <a:rPr lang="en-AU" b="0" i="1" smtClean="0">
-                                      <a:latin typeface="Cambria Math" panose="02040503050406030204" pitchFamily="18" charset="0"/>
-                                    </a:rPr>
-                                    <m:t>𝑀</m:t>
-                                  </m:r>
-                                </m:e>
-                                <m:sub>
-                                  <m:r>
-                                    <a:rPr lang="en-AU" b="0" i="1" smtClean="0">
-                                      <a:latin typeface="Cambria Math" panose="02040503050406030204" pitchFamily="18" charset="0"/>
-                                    </a:rPr>
-                                    <m:t>𝑎</m:t>
-                                  </m:r>
-                                </m:sub>
-                                <m:sup>
-                                  <m:r>
-                                    <a:rPr lang="en-AU" b="0" i="1" smtClean="0">
-                                      <a:latin typeface="Cambria Math" panose="02040503050406030204" pitchFamily="18" charset="0"/>
-                                    </a:rPr>
-                                    <m:t>2</m:t>
-                                  </m:r>
-                                </m:sup>
-                              </m:sSubSup>
-                            </m:e>
-                          </m:d>
-                          <m:sSubSup>
-                            <m:sSubSupPr>
-                              <m:ctrlPr>
-                                <a:rPr lang="en-AU" b="0" i="1" smtClean="0">
-                                  <a:latin typeface="Cambria Math" panose="02040503050406030204" pitchFamily="18" charset="0"/>
-                                </a:rPr>
-                              </m:ctrlPr>
-                            </m:sSubSupPr>
-                            <m:e>
-                              <m:r>
-                                <a:rPr lang="en-AU" b="0" i="1" smtClean="0">
-                                  <a:latin typeface="Cambria Math" panose="02040503050406030204" pitchFamily="18" charset="0"/>
-                                </a:rPr>
-                                <m:t>𝜆</m:t>
-                              </m:r>
-                            </m:e>
-                            <m:sub>
-                              <m:sSup>
-                                <m:sSupPr>
-                                  <m:ctrlPr>
-                                    <a:rPr lang="en-AU" b="0" i="1" smtClean="0">
-                                      <a:latin typeface="Cambria Math" panose="02040503050406030204" pitchFamily="18" charset="0"/>
-                                    </a:rPr>
-                                  </m:ctrlPr>
-                                </m:sSupPr>
-                                <m:e>
-                                  <m:r>
-                                    <a:rPr lang="en-AU" b="0" i="1" smtClean="0">
-                                      <a:latin typeface="Cambria Math" panose="02040503050406030204" pitchFamily="18" charset="0"/>
-                                    </a:rPr>
-                                    <m:t>𝐾</m:t>
-                                  </m:r>
-                                </m:e>
-                                <m:sup>
-                                  <m:r>
-                                    <a:rPr lang="en-AU" b="0" i="1" smtClean="0">
-                                      <a:latin typeface="Cambria Math" panose="02040503050406030204" pitchFamily="18" charset="0"/>
-                                    </a:rPr>
-                                    <m:t>∗</m:t>
-                                  </m:r>
-                                </m:sup>
-                              </m:sSup>
-                              <m:r>
-                                <a:rPr lang="en-AU" b="0" i="1" smtClean="0">
-                                  <a:latin typeface="Cambria Math" panose="02040503050406030204" pitchFamily="18" charset="0"/>
-                                </a:rPr>
-                                <m:t>𝑎</m:t>
-                              </m:r>
-                            </m:sub>
-                            <m:sup>
-                              <m:f>
-                                <m:fPr>
-                                  <m:ctrlPr>
-                                    <a:rPr lang="en-AU" b="0" i="1" smtClean="0">
-                                      <a:latin typeface="Cambria Math" panose="02040503050406030204" pitchFamily="18" charset="0"/>
-                                    </a:rPr>
-                                  </m:ctrlPr>
-                                </m:fPr>
-                                <m:num>
-                                  <m:r>
-                                    <a:rPr lang="en-AU" b="0" i="1" smtClean="0">
-                                      <a:latin typeface="Cambria Math" panose="02040503050406030204" pitchFamily="18" charset="0"/>
-                                    </a:rPr>
-                                    <m:t>3</m:t>
-                                  </m:r>
-                                </m:num>
-                                <m:den>
-                                  <m:r>
-                                    <a:rPr lang="en-AU" b="0" i="1" smtClean="0">
-                                      <a:latin typeface="Cambria Math" panose="02040503050406030204" pitchFamily="18" charset="0"/>
-                                    </a:rPr>
-                                    <m:t>2</m:t>
-                                  </m:r>
-                                </m:den>
-                              </m:f>
-                            </m:sup>
-                          </m:sSubSup>
-                        </m:e>
-                      </m:d>
-                      <m:sSub>
-                        <m:sSubPr>
-                          <m:ctrlPr>
-                            <a:rPr lang="en-AU" b="0" i="1" smtClean="0">
-                              <a:latin typeface="Cambria Math" panose="02040503050406030204" pitchFamily="18" charset="0"/>
-                            </a:rPr>
-                          </m:ctrlPr>
-                        </m:sSubPr>
-                        <m:e>
-                          <m:r>
-                            <a:rPr lang="en-AU" b="0" i="1" smtClean="0">
-                              <a:latin typeface="Cambria Math" panose="02040503050406030204" pitchFamily="18" charset="0"/>
-                            </a:rPr>
-                            <m:t>𝜏</m:t>
-                          </m:r>
-                        </m:e>
-                        <m:sub>
-                          <m:sSub>
-                            <m:sSubPr>
-                              <m:ctrlPr>
-                                <a:rPr lang="en-AU" b="0" i="1" smtClean="0">
-                                  <a:latin typeface="Cambria Math" panose="02040503050406030204" pitchFamily="18" charset="0"/>
-                                </a:rPr>
-                              </m:ctrlPr>
-                            </m:sSubPr>
-                            <m:e>
-                              <m:r>
-                                <a:rPr lang="en-AU" b="0" i="1" smtClean="0">
-                                  <a:latin typeface="Cambria Math" panose="02040503050406030204" pitchFamily="18" charset="0"/>
-                                </a:rPr>
-                                <m:t>𝐵</m:t>
-                              </m:r>
-                            </m:e>
-                            <m:sub>
-                              <m:r>
-                                <a:rPr lang="en-AU" b="0" i="1" smtClean="0">
-                                  <a:latin typeface="Cambria Math" panose="02040503050406030204" pitchFamily="18" charset="0"/>
-                                </a:rPr>
-                                <m:t>0</m:t>
-                              </m:r>
-                            </m:sub>
-                          </m:sSub>
-                        </m:sub>
-                      </m:sSub>
-                      <m:d>
-                        <m:dPr>
-                          <m:ctrlPr>
-                            <a:rPr lang="en-AU" b="0" i="1" smtClean="0">
-                              <a:latin typeface="Cambria Math" panose="02040503050406030204" pitchFamily="18" charset="0"/>
-                            </a:rPr>
-                          </m:ctrlPr>
-                        </m:dPr>
-                        <m:e>
-                          <m:f>
-                            <m:fPr>
-                              <m:ctrlPr>
-                                <a:rPr lang="en-AU" b="0" i="1" smtClean="0">
-                                  <a:latin typeface="Cambria Math" panose="02040503050406030204" pitchFamily="18" charset="0"/>
-                                </a:rPr>
-                              </m:ctrlPr>
-                            </m:fPr>
-                            <m:num>
-                              <m:r>
-                                <a:rPr lang="en-AU" b="0" i="1" smtClean="0">
-                                  <a:latin typeface="Cambria Math" panose="02040503050406030204" pitchFamily="18" charset="0"/>
-                                </a:rPr>
-                                <m:t>4</m:t>
-                              </m:r>
-                              <m:r>
-                                <a:rPr lang="en-AU" b="0" i="1" smtClean="0">
-                                  <a:latin typeface="Cambria Math" panose="02040503050406030204" pitchFamily="18" charset="0"/>
-                                </a:rPr>
-                                <m:t>𝜋𝛼</m:t>
-                              </m:r>
-                              <m:sSubSup>
-                                <m:sSubSupPr>
-                                  <m:ctrlPr>
-                                    <a:rPr lang="en-AU" b="0" i="1" smtClean="0">
-                                      <a:latin typeface="Cambria Math" panose="02040503050406030204" pitchFamily="18" charset="0"/>
-                                    </a:rPr>
-                                  </m:ctrlPr>
-                                </m:sSubSupPr>
-                                <m:e>
-                                  <m:r>
-                                    <a:rPr lang="en-AU" b="0" i="1" smtClean="0">
-                                      <a:latin typeface="Cambria Math" panose="02040503050406030204" pitchFamily="18" charset="0"/>
-                                    </a:rPr>
-                                    <m:t>𝑀</m:t>
-                                  </m:r>
-                                </m:e>
-                                <m:sub>
-                                  <m:r>
-                                    <a:rPr lang="en-AU" b="0" i="1" smtClean="0">
-                                      <a:latin typeface="Cambria Math" panose="02040503050406030204" pitchFamily="18" charset="0"/>
-                                    </a:rPr>
-                                    <m:t>𝑎</m:t>
-                                  </m:r>
-                                </m:sub>
-                                <m:sup>
-                                  <m:r>
-                                    <a:rPr lang="en-AU" b="0" i="1" smtClean="0">
-                                      <a:latin typeface="Cambria Math" panose="02040503050406030204" pitchFamily="18" charset="0"/>
-                                    </a:rPr>
-                                    <m:t>3</m:t>
-                                  </m:r>
-                                </m:sup>
-                              </m:sSubSup>
-                            </m:num>
-                            <m:den>
-                              <m:sSup>
-                                <m:sSupPr>
-                                  <m:ctrlPr>
-                                    <a:rPr lang="en-AU" b="0" i="1" smtClean="0">
-                                      <a:latin typeface="Cambria Math" panose="02040503050406030204" pitchFamily="18" charset="0"/>
-                                    </a:rPr>
-                                  </m:ctrlPr>
-                                </m:sSupPr>
-                                <m:e>
-                                  <m:r>
-                                    <m:rPr>
-                                      <m:sty m:val="p"/>
-                                    </m:rPr>
-                                    <a:rPr lang="en-AU" b="0" i="0" smtClean="0">
-                                      <a:latin typeface="Cambria Math" panose="02040503050406030204" pitchFamily="18" charset="0"/>
-                                    </a:rPr>
-                                    <m:t>Λ</m:t>
-                                  </m:r>
-                                </m:e>
-                                <m:sup>
-                                  <m:r>
-                                    <a:rPr lang="en-AU" b="0" i="1" smtClean="0">
-                                      <a:latin typeface="Cambria Math" panose="02040503050406030204" pitchFamily="18" charset="0"/>
-                                    </a:rPr>
-                                    <m:t>2</m:t>
-                                  </m:r>
-                                </m:sup>
-                              </m:sSup>
-                            </m:den>
-                          </m:f>
-                          <m:sSup>
-                            <m:sSupPr>
-                              <m:ctrlPr>
-                                <a:rPr lang="en-AU" b="0" i="1" smtClean="0">
-                                  <a:latin typeface="Cambria Math" panose="02040503050406030204" pitchFamily="18" charset="0"/>
-                                </a:rPr>
-                              </m:ctrlPr>
-                            </m:sSupPr>
-                            <m:e>
-                              <m:d>
-                                <m:dPr>
-                                  <m:begChr m:val="|"/>
-                                  <m:endChr m:val="|"/>
-                                  <m:ctrlPr>
-                                    <a:rPr lang="en-AU" b="0" i="1" smtClean="0">
-                                      <a:latin typeface="Cambria Math" panose="02040503050406030204" pitchFamily="18" charset="0"/>
-                                    </a:rPr>
-                                  </m:ctrlPr>
-                                </m:dPr>
-                                <m:e>
-                                  <m:sSubSup>
-                                    <m:sSubSupPr>
-                                      <m:ctrlPr>
-                                        <a:rPr lang="en-AU" b="0" i="1" smtClean="0">
-                                          <a:latin typeface="Cambria Math" panose="02040503050406030204" pitchFamily="18" charset="0"/>
-                                        </a:rPr>
-                                      </m:ctrlPr>
-                                    </m:sSubSupPr>
-                                    <m:e>
-                                      <m:r>
-                                        <a:rPr lang="en-AU" b="0" i="1" smtClean="0">
-                                          <a:latin typeface="Cambria Math" panose="02040503050406030204" pitchFamily="18" charset="0"/>
-                                        </a:rPr>
-                                        <m:t>𝐶</m:t>
-                                      </m:r>
-                                    </m:e>
-                                    <m:sub>
-                                      <m:r>
-                                        <a:rPr lang="en-AU" b="0" i="1" smtClean="0">
-                                          <a:latin typeface="Cambria Math" panose="02040503050406030204" pitchFamily="18" charset="0"/>
-                                        </a:rPr>
-                                        <m:t>𝑒𝑓𝑓</m:t>
-                                      </m:r>
-                                    </m:sub>
-                                    <m:sup>
-                                      <m:r>
-                                        <a:rPr lang="en-AU" b="0" i="1" smtClean="0">
-                                          <a:latin typeface="Cambria Math" panose="02040503050406030204" pitchFamily="18" charset="0"/>
-                                        </a:rPr>
-                                        <m:t>𝛾𝛾</m:t>
-                                      </m:r>
-                                    </m:sup>
-                                  </m:sSubSup>
-                                </m:e>
-                              </m:d>
-                            </m:e>
-                            <m:sup>
-                              <m:r>
-                                <a:rPr lang="en-AU" b="0" i="1" smtClean="0">
-                                  <a:latin typeface="Cambria Math" panose="02040503050406030204" pitchFamily="18" charset="0"/>
-                                </a:rPr>
-                                <m:t>2</m:t>
-                              </m:r>
-                            </m:sup>
-                          </m:sSup>
-                        </m:e>
-                      </m:d>
-                      <m:sSub>
-                        <m:sSubPr>
-                          <m:ctrlPr>
-                            <a:rPr lang="en-AU" b="0" i="1" smtClean="0">
-                              <a:latin typeface="Cambria Math" panose="02040503050406030204" pitchFamily="18" charset="0"/>
-                            </a:rPr>
-                          </m:ctrlPr>
-                        </m:sSubPr>
-                        <m:e>
-                          <m:r>
-                            <a:rPr lang="en-AU" b="0" i="1" smtClean="0">
-                              <a:latin typeface="Cambria Math" panose="02040503050406030204" pitchFamily="18" charset="0"/>
-                            </a:rPr>
-                            <m:t>𝜏</m:t>
-                          </m:r>
-                        </m:e>
-                        <m:sub>
-                          <m:sSub>
-                            <m:sSubPr>
-                              <m:ctrlPr>
-                                <a:rPr lang="en-AU" b="0" i="1" smtClean="0">
-                                  <a:latin typeface="Cambria Math" panose="02040503050406030204" pitchFamily="18" charset="0"/>
-                                </a:rPr>
-                              </m:ctrlPr>
-                            </m:sSubPr>
-                            <m:e>
-                              <m:r>
-                                <a:rPr lang="en-AU" b="0" i="1" smtClean="0">
-                                  <a:latin typeface="Cambria Math" panose="02040503050406030204" pitchFamily="18" charset="0"/>
-                                </a:rPr>
-                                <m:t>𝑎</m:t>
-                              </m:r>
-                            </m:e>
-                            <m:sub>
-                              <m:r>
-                                <a:rPr lang="en-AU" b="0" i="1" smtClean="0">
-                                  <a:latin typeface="Cambria Math" panose="02040503050406030204" pitchFamily="18" charset="0"/>
-                                </a:rPr>
-                                <m:t>0</m:t>
-                              </m:r>
-                            </m:sub>
-                          </m:sSub>
-                        </m:sub>
-                      </m:sSub>
-                    </m:oMath>
-                  </m:oMathPara>
-                </a14:m>
-                <a:endParaRPr lang="en-AU" dirty="0"/>
-              </a:p>
-              <a:p>
-                <a:pPr marL="0" indent="0">
-                  <a:buNone/>
-                </a:pPr>
-                <a14:m>
-                  <m:oMathPara xmlns:m="http://schemas.openxmlformats.org/officeDocument/2006/math">
-                    <m:oMathParaPr>
-                      <m:jc m:val="centerGroup"/>
-                    </m:oMathParaPr>
-                    <m:oMath xmlns:m="http://schemas.openxmlformats.org/officeDocument/2006/math">
-                      <m:r>
-                        <a:rPr lang="en-AU" b="0" i="1" smtClean="0">
-                          <a:latin typeface="Cambria Math" panose="02040503050406030204" pitchFamily="18" charset="0"/>
-                        </a:rPr>
-                        <m:t>=</m:t>
-                      </m:r>
-                      <m:d>
-                        <m:dPr>
-                          <m:ctrlPr>
-                            <a:rPr lang="en-AU" b="0" i="1" smtClean="0">
-                              <a:latin typeface="Cambria Math" panose="02040503050406030204" pitchFamily="18" charset="0"/>
-                            </a:rPr>
-                          </m:ctrlPr>
-                        </m:dPr>
-                        <m:e>
-                          <m:f>
-                            <m:fPr>
-                              <m:ctrlPr>
-                                <a:rPr lang="en-AU" b="0" i="1" smtClean="0">
-                                  <a:latin typeface="Cambria Math" panose="02040503050406030204" pitchFamily="18" charset="0"/>
-                                </a:rPr>
-                              </m:ctrlPr>
-                            </m:fPr>
-                            <m:num>
-                              <m:sSubSup>
-                                <m:sSubSupPr>
-                                  <m:ctrlPr>
-                                    <a:rPr lang="en-AU" b="0" i="1" smtClean="0">
-                                      <a:latin typeface="Cambria Math" panose="02040503050406030204" pitchFamily="18" charset="0"/>
-                                    </a:rPr>
-                                  </m:ctrlPr>
-                                </m:sSubSupPr>
-                                <m:e>
-                                  <m:r>
-                                    <a:rPr lang="en-AU" b="0" i="1" smtClean="0">
-                                      <a:latin typeface="Cambria Math" panose="02040503050406030204" pitchFamily="18" charset="0"/>
-                                    </a:rPr>
-                                    <m:t>𝑀</m:t>
-                                  </m:r>
-                                </m:e>
-                                <m:sub>
-                                  <m:r>
-                                    <a:rPr lang="en-AU" b="0" i="1" smtClean="0">
-                                      <a:latin typeface="Cambria Math" panose="02040503050406030204" pitchFamily="18" charset="0"/>
-                                    </a:rPr>
-                                    <m:t>𝐵</m:t>
-                                  </m:r>
-                                </m:sub>
-                                <m:sup>
-                                  <m:r>
-                                    <a:rPr lang="en-AU" b="0" i="1" smtClean="0">
-                                      <a:latin typeface="Cambria Math" panose="02040503050406030204" pitchFamily="18" charset="0"/>
-                                    </a:rPr>
-                                    <m:t>3</m:t>
-                                  </m:r>
-                                </m:sup>
-                              </m:sSubSup>
-                            </m:num>
-                            <m:den>
-                              <m:r>
-                                <a:rPr lang="en-AU" b="0" i="1" smtClean="0">
-                                  <a:latin typeface="Cambria Math" panose="02040503050406030204" pitchFamily="18" charset="0"/>
-                                </a:rPr>
-                                <m:t>16</m:t>
-                              </m:r>
-                            </m:den>
-                          </m:f>
-                          <m:sSup>
-                            <m:sSupPr>
-                              <m:ctrlPr>
-                                <a:rPr lang="en-AU" b="0" i="1" smtClean="0">
-                                  <a:latin typeface="Cambria Math" panose="02040503050406030204" pitchFamily="18" charset="0"/>
-                                </a:rPr>
-                              </m:ctrlPr>
-                            </m:sSupPr>
-                            <m:e>
-                              <m:d>
-                                <m:dPr>
-                                  <m:begChr m:val="|"/>
-                                  <m:endChr m:val="|"/>
-                                  <m:ctrlPr>
-                                    <a:rPr lang="en-AU" b="0" i="1" smtClean="0">
-                                      <a:latin typeface="Cambria Math" panose="02040503050406030204" pitchFamily="18" charset="0"/>
-                                    </a:rPr>
-                                  </m:ctrlPr>
-                                </m:dPr>
-                                <m:e>
-                                  <m:sSub>
-                                    <m:sSubPr>
-                                      <m:ctrlPr>
-                                        <a:rPr lang="en-AU" b="0" i="1" smtClean="0">
-                                          <a:latin typeface="Cambria Math" panose="02040503050406030204" pitchFamily="18" charset="0"/>
-                                        </a:rPr>
-                                      </m:ctrlPr>
-                                    </m:sSubPr>
-                                    <m:e>
-                                      <m:r>
-                                        <a:rPr lang="en-AU" b="0" i="1" smtClean="0">
-                                          <a:latin typeface="Cambria Math" panose="02040503050406030204" pitchFamily="18" charset="0"/>
-                                        </a:rPr>
-                                        <m:t>𝑔</m:t>
-                                      </m:r>
-                                    </m:e>
-                                    <m:sub>
-                                      <m:r>
-                                        <a:rPr lang="en-AU" b="0" i="1" smtClean="0">
-                                          <a:latin typeface="Cambria Math" panose="02040503050406030204" pitchFamily="18" charset="0"/>
-                                        </a:rPr>
-                                        <m:t>𝑎𝑏𝑠</m:t>
-                                      </m:r>
-                                    </m:sub>
-                                  </m:sSub>
-                                </m:e>
-                              </m:d>
-                            </m:e>
-                            <m:sup>
-                              <m:r>
-                                <a:rPr lang="en-AU" b="0" i="1" smtClean="0">
-                                  <a:latin typeface="Cambria Math" panose="02040503050406030204" pitchFamily="18" charset="0"/>
-                                </a:rPr>
-                                <m:t>2</m:t>
-                              </m:r>
-                            </m:sup>
-                          </m:sSup>
-                          <m:sSubSup>
-                            <m:sSubSupPr>
-                              <m:ctrlPr>
-                                <a:rPr lang="en-AU" b="0" i="1" smtClean="0">
-                                  <a:latin typeface="Cambria Math" panose="02040503050406030204" pitchFamily="18" charset="0"/>
-                                </a:rPr>
-                              </m:ctrlPr>
-                            </m:sSubSupPr>
-                            <m:e>
-                              <m:r>
-                                <a:rPr lang="en-AU" b="0" i="1" smtClean="0">
-                                  <a:latin typeface="Cambria Math" panose="02040503050406030204" pitchFamily="18" charset="0"/>
-                                </a:rPr>
-                                <m:t>𝐴</m:t>
-                              </m:r>
-                            </m:e>
-                            <m:sub>
-                              <m:r>
-                                <a:rPr lang="en-AU" b="0" i="1" smtClean="0">
-                                  <a:latin typeface="Cambria Math" panose="02040503050406030204" pitchFamily="18" charset="0"/>
-                                </a:rPr>
-                                <m:t>0</m:t>
-                              </m:r>
-                            </m:sub>
-                            <m:sup>
-                              <m:r>
-                                <a:rPr lang="en-AU" b="0" i="1" smtClean="0">
-                                  <a:latin typeface="Cambria Math" panose="02040503050406030204" pitchFamily="18" charset="0"/>
-                                </a:rPr>
-                                <m:t>2</m:t>
-                              </m:r>
-                            </m:sup>
-                          </m:sSubSup>
-                          <m:d>
-                            <m:dPr>
-                              <m:ctrlPr>
-                                <a:rPr lang="en-AU" b="0" i="1" smtClean="0">
-                                  <a:latin typeface="Cambria Math" panose="02040503050406030204" pitchFamily="18" charset="0"/>
-                                </a:rPr>
-                              </m:ctrlPr>
-                            </m:dPr>
-                            <m:e>
-                              <m:sSubSup>
-                                <m:sSubSupPr>
-                                  <m:ctrlPr>
-                                    <a:rPr lang="en-AU" b="0" i="1" smtClean="0">
-                                      <a:latin typeface="Cambria Math" panose="02040503050406030204" pitchFamily="18" charset="0"/>
-                                    </a:rPr>
-                                  </m:ctrlPr>
-                                </m:sSubSupPr>
-                                <m:e>
-                                  <m:r>
-                                    <a:rPr lang="en-AU" b="0" i="1" smtClean="0">
-                                      <a:latin typeface="Cambria Math" panose="02040503050406030204" pitchFamily="18" charset="0"/>
-                                    </a:rPr>
-                                    <m:t>𝑀</m:t>
-                                  </m:r>
-                                </m:e>
-                                <m:sub>
-                                  <m:r>
-                                    <a:rPr lang="en-AU" b="0" i="1" smtClean="0">
-                                      <a:latin typeface="Cambria Math" panose="02040503050406030204" pitchFamily="18" charset="0"/>
-                                    </a:rPr>
-                                    <m:t>𝑎</m:t>
-                                  </m:r>
-                                </m:sub>
-                                <m:sup>
-                                  <m:r>
-                                    <a:rPr lang="en-AU" b="0" i="1" smtClean="0">
-                                      <a:latin typeface="Cambria Math" panose="02040503050406030204" pitchFamily="18" charset="0"/>
-                                    </a:rPr>
-                                    <m:t>2</m:t>
-                                  </m:r>
-                                </m:sup>
-                              </m:sSubSup>
-                            </m:e>
-                          </m:d>
-                          <m:sSubSup>
-                            <m:sSubSupPr>
-                              <m:ctrlPr>
-                                <a:rPr lang="en-AU" b="0" i="1" smtClean="0">
-                                  <a:latin typeface="Cambria Math" panose="02040503050406030204" pitchFamily="18" charset="0"/>
-                                </a:rPr>
-                              </m:ctrlPr>
-                            </m:sSubSupPr>
-                            <m:e>
-                              <m:r>
-                                <a:rPr lang="en-AU" b="0" i="1" smtClean="0">
-                                  <a:latin typeface="Cambria Math" panose="02040503050406030204" pitchFamily="18" charset="0"/>
-                                </a:rPr>
-                                <m:t>𝜆</m:t>
-                              </m:r>
-                            </m:e>
-                            <m:sub>
-                              <m:sSup>
-                                <m:sSupPr>
-                                  <m:ctrlPr>
-                                    <a:rPr lang="en-AU" b="0" i="1" smtClean="0">
-                                      <a:latin typeface="Cambria Math" panose="02040503050406030204" pitchFamily="18" charset="0"/>
-                                    </a:rPr>
-                                  </m:ctrlPr>
-                                </m:sSupPr>
-                                <m:e>
-                                  <m:r>
-                                    <a:rPr lang="en-AU" b="0" i="1" smtClean="0">
-                                      <a:latin typeface="Cambria Math" panose="02040503050406030204" pitchFamily="18" charset="0"/>
-                                    </a:rPr>
-                                    <m:t>𝐾</m:t>
-                                  </m:r>
-                                </m:e>
-                                <m:sup>
-                                  <m:r>
-                                    <a:rPr lang="en-AU" b="0" i="1" smtClean="0">
-                                      <a:latin typeface="Cambria Math" panose="02040503050406030204" pitchFamily="18" charset="0"/>
-                                    </a:rPr>
-                                    <m:t>∗</m:t>
-                                  </m:r>
-                                </m:sup>
-                              </m:sSup>
-                              <m:r>
-                                <a:rPr lang="en-AU" b="0" i="1" smtClean="0">
-                                  <a:latin typeface="Cambria Math" panose="02040503050406030204" pitchFamily="18" charset="0"/>
-                                </a:rPr>
-                                <m:t>𝑎</m:t>
-                              </m:r>
-                            </m:sub>
-                            <m:sup>
-                              <m:f>
-                                <m:fPr>
-                                  <m:ctrlPr>
-                                    <a:rPr lang="en-AU" b="0" i="1" smtClean="0">
-                                      <a:latin typeface="Cambria Math" panose="02040503050406030204" pitchFamily="18" charset="0"/>
-                                    </a:rPr>
-                                  </m:ctrlPr>
-                                </m:fPr>
-                                <m:num>
-                                  <m:r>
-                                    <a:rPr lang="en-AU" b="0" i="1" smtClean="0">
-                                      <a:latin typeface="Cambria Math" panose="02040503050406030204" pitchFamily="18" charset="0"/>
-                                    </a:rPr>
-                                    <m:t>3</m:t>
-                                  </m:r>
-                                </m:num>
-                                <m:den>
-                                  <m:r>
-                                    <a:rPr lang="en-AU" b="0" i="1" smtClean="0">
-                                      <a:latin typeface="Cambria Math" panose="02040503050406030204" pitchFamily="18" charset="0"/>
-                                    </a:rPr>
-                                    <m:t>2</m:t>
-                                  </m:r>
-                                </m:den>
-                              </m:f>
-                            </m:sup>
-                          </m:sSubSup>
-                        </m:e>
-                      </m:d>
-                      <m:sSub>
-                        <m:sSubPr>
-                          <m:ctrlPr>
-                            <a:rPr lang="en-AU" b="0" i="1" smtClean="0">
-                              <a:latin typeface="Cambria Math" panose="02040503050406030204" pitchFamily="18" charset="0"/>
-                            </a:rPr>
-                          </m:ctrlPr>
-                        </m:sSubPr>
-                        <m:e>
-                          <m:r>
-                            <a:rPr lang="en-AU" b="0" i="1" smtClean="0">
-                              <a:latin typeface="Cambria Math" panose="02040503050406030204" pitchFamily="18" charset="0"/>
-                            </a:rPr>
-                            <m:t>𝜏</m:t>
-                          </m:r>
-                        </m:e>
-                        <m:sub>
-                          <m:sSup>
-                            <m:sSupPr>
-                              <m:ctrlPr>
-                                <a:rPr lang="en-AU" b="0" i="1" smtClean="0">
-                                  <a:latin typeface="Cambria Math" panose="02040503050406030204" pitchFamily="18" charset="0"/>
-                                </a:rPr>
-                              </m:ctrlPr>
-                            </m:sSupPr>
-                            <m:e>
-                              <m:r>
-                                <a:rPr lang="en-AU" b="0" i="1" smtClean="0">
-                                  <a:latin typeface="Cambria Math" panose="02040503050406030204" pitchFamily="18" charset="0"/>
-                                </a:rPr>
-                                <m:t>𝐵</m:t>
-                              </m:r>
-                            </m:e>
-                            <m:sup>
-                              <m:r>
-                                <a:rPr lang="en-AU" b="0" i="1" smtClean="0">
-                                  <a:latin typeface="Cambria Math" panose="02040503050406030204" pitchFamily="18" charset="0"/>
-                                </a:rPr>
-                                <m:t>0</m:t>
-                              </m:r>
-                            </m:sup>
-                          </m:sSup>
-                        </m:sub>
-                      </m:sSub>
-                      <m:d>
-                        <m:dPr>
-                          <m:ctrlPr>
-                            <a:rPr lang="en-AU" b="0" i="1" smtClean="0">
-                              <a:latin typeface="Cambria Math" panose="02040503050406030204" pitchFamily="18" charset="0"/>
-                            </a:rPr>
-                          </m:ctrlPr>
-                        </m:dPr>
-                        <m:e>
-                          <m:f>
-                            <m:fPr>
-                              <m:ctrlPr>
-                                <a:rPr lang="en-AU" b="0" i="1" smtClean="0">
-                                  <a:latin typeface="Cambria Math" panose="02040503050406030204" pitchFamily="18" charset="0"/>
-                                </a:rPr>
-                              </m:ctrlPr>
-                            </m:fPr>
-                            <m:num>
-                              <m:sSubSup>
-                                <m:sSubSupPr>
-                                  <m:ctrlPr>
-                                    <a:rPr lang="en-AU" b="0" i="1" smtClean="0">
-                                      <a:latin typeface="Cambria Math" panose="02040503050406030204" pitchFamily="18" charset="0"/>
-                                    </a:rPr>
-                                  </m:ctrlPr>
-                                </m:sSubSupPr>
-                                <m:e>
-                                  <m:r>
-                                    <a:rPr lang="en-AU" b="0" i="1" smtClean="0">
-                                      <a:latin typeface="Cambria Math" panose="02040503050406030204" pitchFamily="18" charset="0"/>
-                                    </a:rPr>
-                                    <m:t>𝑀</m:t>
-                                  </m:r>
-                                </m:e>
-                                <m:sub>
-                                  <m:r>
-                                    <a:rPr lang="en-AU" b="0" i="1" smtClean="0">
-                                      <a:latin typeface="Cambria Math" panose="02040503050406030204" pitchFamily="18" charset="0"/>
-                                    </a:rPr>
-                                    <m:t>𝑎</m:t>
-                                  </m:r>
-                                </m:sub>
-                                <m:sup>
-                                  <m:r>
-                                    <a:rPr lang="en-AU" b="0" i="1" smtClean="0">
-                                      <a:latin typeface="Cambria Math" panose="02040503050406030204" pitchFamily="18" charset="0"/>
-                                    </a:rPr>
-                                    <m:t>3</m:t>
-                                  </m:r>
-                                </m:sup>
-                              </m:sSubSup>
-                              <m:r>
-                                <a:rPr lang="en-AU" b="0" i="1" smtClean="0">
-                                  <a:latin typeface="Cambria Math" panose="02040503050406030204" pitchFamily="18" charset="0"/>
-                                </a:rPr>
-                                <m:t>𝛼</m:t>
-                              </m:r>
-                            </m:num>
-                            <m:den>
-                              <m:sSup>
-                                <m:sSupPr>
-                                  <m:ctrlPr>
-                                    <a:rPr lang="en-AU" b="0" i="1" smtClean="0">
-                                      <a:latin typeface="Cambria Math" panose="02040503050406030204" pitchFamily="18" charset="0"/>
-                                    </a:rPr>
-                                  </m:ctrlPr>
-                                </m:sSupPr>
-                                <m:e>
-                                  <m:r>
-                                    <m:rPr>
-                                      <m:sty m:val="p"/>
-                                    </m:rPr>
-                                    <a:rPr lang="en-AU" b="0" i="0" smtClean="0">
-                                      <a:latin typeface="Cambria Math" panose="02040503050406030204" pitchFamily="18" charset="0"/>
-                                    </a:rPr>
-                                    <m:t>Λ</m:t>
-                                  </m:r>
-                                </m:e>
-                                <m:sup>
-                                  <m:r>
-                                    <a:rPr lang="en-AU" b="0" i="1" smtClean="0">
-                                      <a:latin typeface="Cambria Math" panose="02040503050406030204" pitchFamily="18" charset="0"/>
-                                    </a:rPr>
-                                    <m:t>2</m:t>
-                                  </m:r>
-                                </m:sup>
-                              </m:sSup>
-                            </m:den>
-                          </m:f>
-                          <m:sSup>
-                            <m:sSupPr>
-                              <m:ctrlPr>
-                                <a:rPr lang="en-AU" b="0" i="1" smtClean="0">
-                                  <a:latin typeface="Cambria Math" panose="02040503050406030204" pitchFamily="18" charset="0"/>
-                                </a:rPr>
-                              </m:ctrlPr>
-                            </m:sSupPr>
-                            <m:e>
-                              <m:d>
-                                <m:dPr>
-                                  <m:begChr m:val="|"/>
-                                  <m:endChr m:val="|"/>
-                                  <m:ctrlPr>
-                                    <a:rPr lang="en-AU" b="0" i="1" smtClean="0">
-                                      <a:latin typeface="Cambria Math" panose="02040503050406030204" pitchFamily="18" charset="0"/>
-                                    </a:rPr>
-                                  </m:ctrlPr>
-                                </m:dPr>
-                                <m:e>
-                                  <m:sSubSup>
-                                    <m:sSubSupPr>
-                                      <m:ctrlPr>
-                                        <a:rPr lang="en-AU" b="0" i="1" smtClean="0">
-                                          <a:latin typeface="Cambria Math" panose="02040503050406030204" pitchFamily="18" charset="0"/>
-                                        </a:rPr>
-                                      </m:ctrlPr>
-                                    </m:sSubSupPr>
-                                    <m:e>
-                                      <m:r>
-                                        <a:rPr lang="en-AU" b="0" i="1" smtClean="0">
-                                          <a:latin typeface="Cambria Math" panose="02040503050406030204" pitchFamily="18" charset="0"/>
-                                        </a:rPr>
-                                        <m:t>𝐶</m:t>
-                                      </m:r>
-                                    </m:e>
-                                    <m:sub>
-                                      <m:r>
-                                        <a:rPr lang="en-AU" b="0" i="1" smtClean="0">
-                                          <a:latin typeface="Cambria Math" panose="02040503050406030204" pitchFamily="18" charset="0"/>
-                                        </a:rPr>
-                                        <m:t>𝑒𝑓𝑓</m:t>
-                                      </m:r>
-                                    </m:sub>
-                                    <m:sup>
-                                      <m:r>
-                                        <a:rPr lang="en-AU" b="0" i="1" smtClean="0">
-                                          <a:latin typeface="Cambria Math" panose="02040503050406030204" pitchFamily="18" charset="0"/>
-                                        </a:rPr>
-                                        <m:t>𝛾𝛾</m:t>
-                                      </m:r>
-                                    </m:sup>
-                                  </m:sSubSup>
-                                </m:e>
-                              </m:d>
-                            </m:e>
-                            <m:sup>
-                              <m:r>
-                                <a:rPr lang="en-AU" b="0" i="1" smtClean="0">
-                                  <a:latin typeface="Cambria Math" panose="02040503050406030204" pitchFamily="18" charset="0"/>
-                                </a:rPr>
-                                <m:t>2</m:t>
-                              </m:r>
-                            </m:sup>
-                          </m:sSup>
-                        </m:e>
-                      </m:d>
-                      <m:sSub>
-                        <m:sSubPr>
-                          <m:ctrlPr>
-                            <a:rPr lang="en-AU" b="0" i="1" smtClean="0">
-                              <a:latin typeface="Cambria Math" panose="02040503050406030204" pitchFamily="18" charset="0"/>
-                            </a:rPr>
-                          </m:ctrlPr>
-                        </m:sSubPr>
-                        <m:e>
-                          <m:r>
-                            <a:rPr lang="en-AU" b="0" i="1" smtClean="0">
-                              <a:latin typeface="Cambria Math" panose="02040503050406030204" pitchFamily="18" charset="0"/>
-                            </a:rPr>
-                            <m:t>𝜏</m:t>
-                          </m:r>
-                        </m:e>
-                        <m:sub>
-                          <m:sSub>
-                            <m:sSubPr>
-                              <m:ctrlPr>
-                                <a:rPr lang="en-AU" b="0" i="1" smtClean="0">
-                                  <a:latin typeface="Cambria Math" panose="02040503050406030204" pitchFamily="18" charset="0"/>
-                                </a:rPr>
-                              </m:ctrlPr>
-                            </m:sSubPr>
-                            <m:e>
-                              <m:r>
-                                <a:rPr lang="en-AU" b="0" i="1" smtClean="0">
-                                  <a:latin typeface="Cambria Math" panose="02040503050406030204" pitchFamily="18" charset="0"/>
-                                </a:rPr>
-                                <m:t>𝑎</m:t>
-                              </m:r>
-                            </m:e>
-                            <m:sub>
-                              <m:r>
-                                <a:rPr lang="en-AU" b="0" i="1" smtClean="0">
-                                  <a:latin typeface="Cambria Math" panose="02040503050406030204" pitchFamily="18" charset="0"/>
-                                </a:rPr>
-                                <m:t>0</m:t>
-                              </m:r>
-                            </m:sub>
-                          </m:sSub>
-                        </m:sub>
-                      </m:sSub>
-                    </m:oMath>
-                  </m:oMathPara>
-                </a14:m>
-                <a:endParaRPr lang="en-AU" b="0" dirty="0"/>
-              </a:p>
-              <a:p>
-                <a:pPr marL="0" indent="0">
-                  <a:buNone/>
-                </a:pPr>
-                <a:r>
-                  <a:rPr lang="en-AU" dirty="0"/>
-                  <a:t>Here: </a:t>
-                </a:r>
-              </a:p>
-              <a:p>
-                <a:pPr marL="0" indent="0">
-                  <a:buNone/>
-                </a:pPr>
-                <a14:m>
-                  <m:oMathPara xmlns:m="http://schemas.openxmlformats.org/officeDocument/2006/math">
-                    <m:oMathParaPr>
-                      <m:jc m:val="centerGroup"/>
-                    </m:oMathParaPr>
-                    <m:oMath xmlns:m="http://schemas.openxmlformats.org/officeDocument/2006/math">
-                      <m:sSub>
-                        <m:sSubPr>
-                          <m:ctrlPr>
-                            <a:rPr lang="en-AU" b="0" i="1" smtClean="0">
-                              <a:latin typeface="Cambria Math" panose="02040503050406030204" pitchFamily="18" charset="0"/>
-                            </a:rPr>
-                          </m:ctrlPr>
-                        </m:sSubPr>
-                        <m:e>
-                          <m:r>
-                            <a:rPr lang="en-AU" b="0" i="1" smtClean="0">
-                              <a:latin typeface="Cambria Math" panose="02040503050406030204" pitchFamily="18" charset="0"/>
-                            </a:rPr>
-                            <m:t>𝜆</m:t>
-                          </m:r>
-                        </m:e>
-                        <m:sub>
-                          <m:sSup>
-                            <m:sSupPr>
-                              <m:ctrlPr>
-                                <a:rPr lang="en-AU" b="0" i="1" smtClean="0">
-                                  <a:latin typeface="Cambria Math" panose="02040503050406030204" pitchFamily="18" charset="0"/>
-                                </a:rPr>
-                              </m:ctrlPr>
-                            </m:sSupPr>
-                            <m:e>
-                              <m:r>
-                                <a:rPr lang="en-AU" b="0" i="1" smtClean="0">
-                                  <a:latin typeface="Cambria Math" panose="02040503050406030204" pitchFamily="18" charset="0"/>
-                                </a:rPr>
-                                <m:t>𝐾</m:t>
-                              </m:r>
-                            </m:e>
-                            <m:sup>
-                              <m:r>
-                                <a:rPr lang="en-AU" b="0" i="1" smtClean="0">
-                                  <a:latin typeface="Cambria Math" panose="02040503050406030204" pitchFamily="18" charset="0"/>
-                                </a:rPr>
-                                <m:t>∗</m:t>
-                              </m:r>
-                            </m:sup>
-                          </m:sSup>
-                          <m:r>
-                            <a:rPr lang="en-AU" b="0" i="1" smtClean="0">
-                              <a:latin typeface="Cambria Math" panose="02040503050406030204" pitchFamily="18" charset="0"/>
-                            </a:rPr>
-                            <m:t>𝑎</m:t>
-                          </m:r>
-                        </m:sub>
-                      </m:sSub>
-                      <m:r>
-                        <a:rPr lang="en-AU" b="0" i="1" smtClean="0">
-                          <a:latin typeface="Cambria Math" panose="02040503050406030204" pitchFamily="18" charset="0"/>
-                        </a:rPr>
-                        <m:t>=</m:t>
-                      </m:r>
-                      <m:d>
-                        <m:dPr>
-                          <m:begChr m:val="["/>
-                          <m:endChr m:val="]"/>
-                          <m:ctrlPr>
-                            <a:rPr lang="en-AU" b="0" i="1" smtClean="0">
-                              <a:latin typeface="Cambria Math" panose="02040503050406030204" pitchFamily="18" charset="0"/>
-                            </a:rPr>
-                          </m:ctrlPr>
-                        </m:dPr>
-                        <m:e>
-                          <m:r>
-                            <a:rPr lang="en-AU" b="0" i="1" smtClean="0">
-                              <a:latin typeface="Cambria Math" panose="02040503050406030204" pitchFamily="18" charset="0"/>
-                            </a:rPr>
-                            <m:t>1−</m:t>
-                          </m:r>
-                          <m:f>
-                            <m:fPr>
-                              <m:ctrlPr>
-                                <a:rPr lang="en-AU" b="0" i="1" smtClean="0">
-                                  <a:latin typeface="Cambria Math" panose="02040503050406030204" pitchFamily="18" charset="0"/>
-                                </a:rPr>
-                              </m:ctrlPr>
-                            </m:fPr>
-                            <m:num>
-                              <m:sSup>
-                                <m:sSupPr>
-                                  <m:ctrlPr>
-                                    <a:rPr lang="en-AU" b="0" i="1" smtClean="0">
-                                      <a:latin typeface="Cambria Math" panose="02040503050406030204" pitchFamily="18" charset="0"/>
-                                    </a:rPr>
-                                  </m:ctrlPr>
-                                </m:sSupPr>
-                                <m:e>
-                                  <m:d>
-                                    <m:dPr>
-                                      <m:ctrlPr>
-                                        <a:rPr lang="en-AU" b="0" i="1" smtClean="0">
-                                          <a:latin typeface="Cambria Math" panose="02040503050406030204" pitchFamily="18" charset="0"/>
-                                        </a:rPr>
-                                      </m:ctrlPr>
-                                    </m:dPr>
-                                    <m:e>
-                                      <m:sSub>
-                                        <m:sSubPr>
-                                          <m:ctrlPr>
-                                            <a:rPr lang="en-AU" b="0" i="1" smtClean="0">
-                                              <a:latin typeface="Cambria Math" panose="02040503050406030204" pitchFamily="18" charset="0"/>
-                                            </a:rPr>
-                                          </m:ctrlPr>
-                                        </m:sSubPr>
-                                        <m:e>
-                                          <m:r>
-                                            <a:rPr lang="en-AU" b="0" i="1" smtClean="0">
-                                              <a:latin typeface="Cambria Math" panose="02040503050406030204" pitchFamily="18" charset="0"/>
-                                            </a:rPr>
-                                            <m:t>𝑀</m:t>
-                                          </m:r>
-                                        </m:e>
-                                        <m:sub>
-                                          <m:r>
-                                            <a:rPr lang="en-AU" b="0" i="1" smtClean="0">
-                                              <a:latin typeface="Cambria Math" panose="02040503050406030204" pitchFamily="18" charset="0"/>
-                                            </a:rPr>
-                                            <m:t>𝑎</m:t>
-                                          </m:r>
-                                        </m:sub>
-                                      </m:sSub>
-                                      <m:r>
-                                        <a:rPr lang="en-AU" b="0" i="1" smtClean="0">
-                                          <a:latin typeface="Cambria Math" panose="02040503050406030204" pitchFamily="18" charset="0"/>
-                                        </a:rPr>
-                                        <m:t>+</m:t>
-                                      </m:r>
-                                      <m:sSub>
-                                        <m:sSubPr>
-                                          <m:ctrlPr>
-                                            <a:rPr lang="en-AU" b="0" i="1" smtClean="0">
-                                              <a:latin typeface="Cambria Math" panose="02040503050406030204" pitchFamily="18" charset="0"/>
-                                            </a:rPr>
-                                          </m:ctrlPr>
-                                        </m:sSubPr>
-                                        <m:e>
-                                          <m:r>
-                                            <a:rPr lang="en-AU" b="0" i="1" smtClean="0">
-                                              <a:latin typeface="Cambria Math" panose="02040503050406030204" pitchFamily="18" charset="0"/>
-                                            </a:rPr>
-                                            <m:t>𝑀</m:t>
-                                          </m:r>
-                                        </m:e>
-                                        <m:sub>
-                                          <m:sSup>
-                                            <m:sSupPr>
-                                              <m:ctrlPr>
-                                                <a:rPr lang="en-AU" b="0" i="1" smtClean="0">
-                                                  <a:latin typeface="Cambria Math" panose="02040503050406030204" pitchFamily="18" charset="0"/>
-                                                </a:rPr>
-                                              </m:ctrlPr>
-                                            </m:sSupPr>
-                                            <m:e>
-                                              <m:r>
-                                                <a:rPr lang="en-AU" b="0" i="1" smtClean="0">
-                                                  <a:latin typeface="Cambria Math" panose="02040503050406030204" pitchFamily="18" charset="0"/>
-                                                </a:rPr>
-                                                <m:t>𝐾</m:t>
-                                              </m:r>
-                                            </m:e>
-                                            <m:sup>
-                                              <m:r>
-                                                <a:rPr lang="en-AU" b="0" i="1" smtClean="0">
-                                                  <a:latin typeface="Cambria Math" panose="02040503050406030204" pitchFamily="18" charset="0"/>
-                                                </a:rPr>
-                                                <m:t>∗</m:t>
-                                              </m:r>
-                                            </m:sup>
-                                          </m:sSup>
-                                        </m:sub>
-                                      </m:sSub>
-                                    </m:e>
-                                  </m:d>
-                                </m:e>
-                                <m:sup>
-                                  <m:r>
-                                    <a:rPr lang="en-AU" b="0" i="1" smtClean="0">
-                                      <a:latin typeface="Cambria Math" panose="02040503050406030204" pitchFamily="18" charset="0"/>
-                                    </a:rPr>
-                                    <m:t>2</m:t>
-                                  </m:r>
-                                </m:sup>
-                              </m:sSup>
-                            </m:num>
-                            <m:den>
-                              <m:sSubSup>
-                                <m:sSubSupPr>
-                                  <m:ctrlPr>
-                                    <a:rPr lang="en-AU" b="0" i="1" smtClean="0">
-                                      <a:latin typeface="Cambria Math" panose="02040503050406030204" pitchFamily="18" charset="0"/>
-                                    </a:rPr>
-                                  </m:ctrlPr>
-                                </m:sSubSupPr>
-                                <m:e>
-                                  <m:r>
-                                    <a:rPr lang="en-AU" b="0" i="1" smtClean="0">
-                                      <a:latin typeface="Cambria Math" panose="02040503050406030204" pitchFamily="18" charset="0"/>
-                                    </a:rPr>
-                                    <m:t>𝑀</m:t>
-                                  </m:r>
-                                </m:e>
-                                <m:sub>
-                                  <m:r>
-                                    <a:rPr lang="en-AU" b="0" i="1" smtClean="0">
-                                      <a:latin typeface="Cambria Math" panose="02040503050406030204" pitchFamily="18" charset="0"/>
-                                    </a:rPr>
-                                    <m:t>𝐵</m:t>
-                                  </m:r>
-                                </m:sub>
-                                <m:sup>
-                                  <m:r>
-                                    <a:rPr lang="en-AU" b="0" i="1" smtClean="0">
-                                      <a:latin typeface="Cambria Math" panose="02040503050406030204" pitchFamily="18" charset="0"/>
-                                    </a:rPr>
-                                    <m:t>2</m:t>
-                                  </m:r>
-                                </m:sup>
-                              </m:sSubSup>
-                            </m:den>
-                          </m:f>
-                        </m:e>
-                      </m:d>
-                      <m:d>
-                        <m:dPr>
-                          <m:begChr m:val="["/>
-                          <m:endChr m:val="]"/>
-                          <m:ctrlPr>
-                            <a:rPr lang="en-AU" b="0" i="1" smtClean="0">
-                              <a:latin typeface="Cambria Math" panose="02040503050406030204" pitchFamily="18" charset="0"/>
-                            </a:rPr>
-                          </m:ctrlPr>
-                        </m:dPr>
-                        <m:e>
-                          <m:r>
-                            <a:rPr lang="en-AU" b="0" i="1" smtClean="0">
-                              <a:latin typeface="Cambria Math" panose="02040503050406030204" pitchFamily="18" charset="0"/>
-                            </a:rPr>
-                            <m:t>1−</m:t>
-                          </m:r>
-                          <m:f>
-                            <m:fPr>
-                              <m:ctrlPr>
-                                <a:rPr lang="en-AU" b="0" i="1" smtClean="0">
-                                  <a:latin typeface="Cambria Math" panose="02040503050406030204" pitchFamily="18" charset="0"/>
-                                </a:rPr>
-                              </m:ctrlPr>
-                            </m:fPr>
-                            <m:num>
-                              <m:sSup>
-                                <m:sSupPr>
-                                  <m:ctrlPr>
-                                    <a:rPr lang="en-AU" b="0" i="1" smtClean="0">
-                                      <a:latin typeface="Cambria Math" panose="02040503050406030204" pitchFamily="18" charset="0"/>
-                                    </a:rPr>
-                                  </m:ctrlPr>
-                                </m:sSupPr>
-                                <m:e>
-                                  <m:d>
-                                    <m:dPr>
-                                      <m:ctrlPr>
-                                        <a:rPr lang="en-AU" b="0" i="1" smtClean="0">
-                                          <a:latin typeface="Cambria Math" panose="02040503050406030204" pitchFamily="18" charset="0"/>
-                                        </a:rPr>
-                                      </m:ctrlPr>
-                                    </m:dPr>
-                                    <m:e>
-                                      <m:sSub>
-                                        <m:sSubPr>
-                                          <m:ctrlPr>
-                                            <a:rPr lang="en-AU" b="0" i="1" smtClean="0">
-                                              <a:latin typeface="Cambria Math" panose="02040503050406030204" pitchFamily="18" charset="0"/>
-                                            </a:rPr>
-                                          </m:ctrlPr>
-                                        </m:sSubPr>
-                                        <m:e>
-                                          <m:r>
-                                            <a:rPr lang="en-AU" b="0" i="1" smtClean="0">
-                                              <a:latin typeface="Cambria Math" panose="02040503050406030204" pitchFamily="18" charset="0"/>
-                                            </a:rPr>
-                                            <m:t>𝑀</m:t>
-                                          </m:r>
-                                        </m:e>
-                                        <m:sub>
-                                          <m:r>
-                                            <a:rPr lang="en-AU" b="0" i="1" smtClean="0">
-                                              <a:latin typeface="Cambria Math" panose="02040503050406030204" pitchFamily="18" charset="0"/>
-                                            </a:rPr>
-                                            <m:t>𝑎</m:t>
-                                          </m:r>
-                                        </m:sub>
-                                      </m:sSub>
-                                      <m:r>
-                                        <a:rPr lang="en-AU" b="0" i="1" smtClean="0">
-                                          <a:latin typeface="Cambria Math" panose="02040503050406030204" pitchFamily="18" charset="0"/>
-                                        </a:rPr>
-                                        <m:t>−</m:t>
-                                      </m:r>
-                                      <m:sSub>
-                                        <m:sSubPr>
-                                          <m:ctrlPr>
-                                            <a:rPr lang="en-AU" b="0" i="1" smtClean="0">
-                                              <a:latin typeface="Cambria Math" panose="02040503050406030204" pitchFamily="18" charset="0"/>
-                                            </a:rPr>
-                                          </m:ctrlPr>
-                                        </m:sSubPr>
-                                        <m:e>
-                                          <m:r>
-                                            <a:rPr lang="en-AU" b="0" i="1" smtClean="0">
-                                              <a:latin typeface="Cambria Math" panose="02040503050406030204" pitchFamily="18" charset="0"/>
-                                            </a:rPr>
-                                            <m:t>𝑀</m:t>
-                                          </m:r>
-                                        </m:e>
-                                        <m:sub>
-                                          <m:sSup>
-                                            <m:sSupPr>
-                                              <m:ctrlPr>
-                                                <a:rPr lang="en-AU" b="0" i="1" smtClean="0">
-                                                  <a:latin typeface="Cambria Math" panose="02040503050406030204" pitchFamily="18" charset="0"/>
-                                                </a:rPr>
-                                              </m:ctrlPr>
-                                            </m:sSupPr>
-                                            <m:e>
-                                              <m:r>
-                                                <a:rPr lang="en-AU" b="0" i="1" smtClean="0">
-                                                  <a:latin typeface="Cambria Math" panose="02040503050406030204" pitchFamily="18" charset="0"/>
-                                                </a:rPr>
-                                                <m:t>𝐾</m:t>
-                                              </m:r>
-                                            </m:e>
-                                            <m:sup>
-                                              <m:r>
-                                                <a:rPr lang="en-AU" b="0" i="1" smtClean="0">
-                                                  <a:latin typeface="Cambria Math" panose="02040503050406030204" pitchFamily="18" charset="0"/>
-                                                </a:rPr>
-                                                <m:t>∗</m:t>
-                                              </m:r>
-                                            </m:sup>
-                                          </m:sSup>
-                                        </m:sub>
-                                      </m:sSub>
-                                    </m:e>
-                                  </m:d>
-                                </m:e>
-                                <m:sup>
-                                  <m:r>
-                                    <a:rPr lang="en-AU" b="0" i="1" smtClean="0">
-                                      <a:latin typeface="Cambria Math" panose="02040503050406030204" pitchFamily="18" charset="0"/>
-                                    </a:rPr>
-                                    <m:t>2</m:t>
-                                  </m:r>
-                                </m:sup>
-                              </m:sSup>
-                            </m:num>
-                            <m:den>
-                              <m:sSubSup>
-                                <m:sSubSupPr>
-                                  <m:ctrlPr>
-                                    <a:rPr lang="en-AU" b="0" i="1" smtClean="0">
-                                      <a:latin typeface="Cambria Math" panose="02040503050406030204" pitchFamily="18" charset="0"/>
-                                    </a:rPr>
-                                  </m:ctrlPr>
-                                </m:sSubSupPr>
-                                <m:e>
-                                  <m:r>
-                                    <a:rPr lang="en-AU" b="0" i="1" smtClean="0">
-                                      <a:latin typeface="Cambria Math" panose="02040503050406030204" pitchFamily="18" charset="0"/>
-                                    </a:rPr>
-                                    <m:t>𝑀</m:t>
-                                  </m:r>
-                                </m:e>
-                                <m:sub>
-                                  <m:r>
-                                    <a:rPr lang="en-AU" b="0" i="1" smtClean="0">
-                                      <a:latin typeface="Cambria Math" panose="02040503050406030204" pitchFamily="18" charset="0"/>
-                                    </a:rPr>
-                                    <m:t>𝐵</m:t>
-                                  </m:r>
-                                </m:sub>
-                                <m:sup>
-                                  <m:r>
-                                    <a:rPr lang="en-AU" b="0" i="1" smtClean="0">
-                                      <a:latin typeface="Cambria Math" panose="02040503050406030204" pitchFamily="18" charset="0"/>
-                                    </a:rPr>
-                                    <m:t>2</m:t>
-                                  </m:r>
-                                </m:sup>
-                              </m:sSubSup>
-                            </m:den>
-                          </m:f>
-                        </m:e>
-                      </m:d>
-                    </m:oMath>
-                  </m:oMathPara>
-                </a14:m>
-                <a:endParaRPr lang="en-AU" dirty="0"/>
-              </a:p>
-              <a:p>
-                <a:pPr marL="0" indent="0">
-                  <a:buNone/>
-                </a:pPr>
-                <a:r>
-                  <a:rPr lang="en-AU" dirty="0"/>
-                  <a:t>And </a:t>
-                </a:r>
-                <a14:m>
-                  <m:oMath xmlns:m="http://schemas.openxmlformats.org/officeDocument/2006/math">
-                    <m:sSub>
-                      <m:sSubPr>
-                        <m:ctrlPr>
-                          <a:rPr lang="en-AU" b="0" i="1" smtClean="0">
-                            <a:latin typeface="Cambria Math" panose="02040503050406030204" pitchFamily="18" charset="0"/>
-                          </a:rPr>
-                        </m:ctrlPr>
-                      </m:sSubPr>
-                      <m:e>
-                        <m:r>
-                          <a:rPr lang="en-AU" b="0" i="1" smtClean="0">
-                            <a:latin typeface="Cambria Math" panose="02040503050406030204" pitchFamily="18" charset="0"/>
-                          </a:rPr>
-                          <m:t>𝐴</m:t>
-                        </m:r>
-                      </m:e>
-                      <m:sub>
-                        <m:r>
-                          <a:rPr lang="en-AU" b="0" i="1" smtClean="0">
-                            <a:latin typeface="Cambria Math" panose="02040503050406030204" pitchFamily="18" charset="0"/>
-                          </a:rPr>
-                          <m:t>0</m:t>
-                        </m:r>
-                      </m:sub>
-                    </m:sSub>
-                  </m:oMath>
-                </a14:m>
-                <a:r>
-                  <a:rPr lang="en-AU" dirty="0"/>
-                  <a:t> is the form factor of the pseudoscalar current (see next slide)</a:t>
-                </a:r>
-              </a:p>
-              <a:p>
-                <a:pPr marL="0" indent="0">
-                  <a:buNone/>
-                </a:pPr>
-                <a:r>
-                  <a:rPr lang="en-AU" dirty="0"/>
-                  <a:t>(Source: </a:t>
-                </a:r>
-                <a:r>
-                  <a:rPr lang="en-AU" dirty="0">
-                    <a:hlinkClick r:id="rId2"/>
-                  </a:rPr>
-                  <a:t>https://arxiv.org/abs/1611.09355</a:t>
-                </a:r>
-                <a:r>
-                  <a:rPr lang="en-AU" dirty="0"/>
-                  <a:t>) </a:t>
-                </a:r>
-              </a:p>
-            </p:txBody>
-          </p:sp>
-        </mc:Choice>
-        <mc:Fallback xmlns="">
-          <p:sp>
-            <p:nvSpPr>
-              <p:cNvPr id="3" name="Content Placeholder 2">
-                <a:extLst>
-                  <a:ext uri="{FF2B5EF4-FFF2-40B4-BE49-F238E27FC236}">
-                    <a16:creationId xmlns:a16="http://schemas.microsoft.com/office/drawing/2014/main" id="{82478C4D-36D7-B03B-DB92-4BCFE01B6A3A}"/>
-                  </a:ext>
-                </a:extLst>
-              </p:cNvPr>
-              <p:cNvSpPr>
-                <a:spLocks noGrp="1" noRot="1" noChangeAspect="1" noMove="1" noResize="1" noEditPoints="1" noAdjustHandles="1" noChangeArrowheads="1" noChangeShapeType="1" noTextEdit="1"/>
-              </p:cNvSpPr>
-              <p:nvPr>
-                <p:ph idx="1"/>
-              </p:nvPr>
-            </p:nvSpPr>
-            <p:spPr>
-              <a:xfrm>
-                <a:off x="838200" y="1800686"/>
-                <a:ext cx="10515600" cy="4351338"/>
-              </a:xfrm>
-              <a:blipFill>
-                <a:blip r:embed="rId3"/>
-                <a:stretch>
-                  <a:fillRect l="-1043" b="-1961"/>
-                </a:stretch>
-              </a:blipFill>
-            </p:spPr>
-            <p:txBody>
-              <a:bodyPr/>
-              <a:lstStyle/>
-              <a:p>
-                <a:r>
-                  <a:rPr lang="en-AU">
-                    <a:noFill/>
-                  </a:rPr>
-                  <a:t> </a:t>
-                </a:r>
-              </a:p>
-            </p:txBody>
-          </p:sp>
-        </mc:Fallback>
-      </mc:AlternateContent>
-    </p:spTree>
-    <p:extLst>
-      <p:ext uri="{BB962C8B-B14F-4D97-AF65-F5344CB8AC3E}">
-        <p14:creationId xmlns:p14="http://schemas.microsoft.com/office/powerpoint/2010/main" val="659846700"/>
       </p:ext>
     </p:extLst>
   </p:cSld>

</xml_diff>

<commit_message>
Downloaded FeynGame and edited Ch 1 of lit rev
</commit_message>
<xml_diff>
--- a/Research_Project/LHCb Starterkit/MSc Research Project Progress 31 Aug 2022 [Autosaved].pptx
+++ b/Research_Project/LHCb Starterkit/MSc Research Project Progress 31 Aug 2022 [Autosaved].pptx
@@ -5,7 +5,7 @@
     <p:sldMasterId id="2147483648" r:id="rId1"/>
   </p:sldMasterIdLst>
   <p:notesMasterIdLst>
-    <p:notesMasterId r:id="rId14"/>
+    <p:notesMasterId r:id="rId15"/>
   </p:notesMasterIdLst>
   <p:sldIdLst>
     <p:sldId id="256" r:id="rId2"/>
@@ -20,6 +20,7 @@
     <p:sldId id="264" r:id="rId11"/>
     <p:sldId id="265" r:id="rId12"/>
     <p:sldId id="266" r:id="rId13"/>
+    <p:sldId id="268" r:id="rId14"/>
   </p:sldIdLst>
   <p:sldSz cx="12192000" cy="6858000"/>
   <p:notesSz cx="6858000" cy="9144000"/>
@@ -208,7 +209,7 @@
           <a:p>
             <a:fld id="{FC50BE67-3C8E-4570-A99E-8EC5CD30FB7F}" type="datetimeFigureOut">
               <a:rPr lang="en-AU" smtClean="0"/>
-              <a:t>15/11/2022</a:t>
+              <a:t>17/11/2022</a:t>
             </a:fld>
             <a:endParaRPr lang="en-AU"/>
           </a:p>
@@ -709,7 +710,7 @@
           <a:p>
             <a:fld id="{6D79F432-8B29-4E94-9828-C190BA0C460D}" type="datetimeFigureOut">
               <a:rPr lang="en-AU" smtClean="0"/>
-              <a:t>15/11/2022</a:t>
+              <a:t>17/11/2022</a:t>
             </a:fld>
             <a:endParaRPr lang="en-AU"/>
           </a:p>
@@ -909,7 +910,7 @@
           <a:p>
             <a:fld id="{6D79F432-8B29-4E94-9828-C190BA0C460D}" type="datetimeFigureOut">
               <a:rPr lang="en-AU" smtClean="0"/>
-              <a:t>15/11/2022</a:t>
+              <a:t>17/11/2022</a:t>
             </a:fld>
             <a:endParaRPr lang="en-AU"/>
           </a:p>
@@ -1119,7 +1120,7 @@
           <a:p>
             <a:fld id="{6D79F432-8B29-4E94-9828-C190BA0C460D}" type="datetimeFigureOut">
               <a:rPr lang="en-AU" smtClean="0"/>
-              <a:t>15/11/2022</a:t>
+              <a:t>17/11/2022</a:t>
             </a:fld>
             <a:endParaRPr lang="en-AU"/>
           </a:p>
@@ -1319,7 +1320,7 @@
           <a:p>
             <a:fld id="{6D79F432-8B29-4E94-9828-C190BA0C460D}" type="datetimeFigureOut">
               <a:rPr lang="en-AU" smtClean="0"/>
-              <a:t>15/11/2022</a:t>
+              <a:t>17/11/2022</a:t>
             </a:fld>
             <a:endParaRPr lang="en-AU"/>
           </a:p>
@@ -1595,7 +1596,7 @@
           <a:p>
             <a:fld id="{6D79F432-8B29-4E94-9828-C190BA0C460D}" type="datetimeFigureOut">
               <a:rPr lang="en-AU" smtClean="0"/>
-              <a:t>15/11/2022</a:t>
+              <a:t>17/11/2022</a:t>
             </a:fld>
             <a:endParaRPr lang="en-AU"/>
           </a:p>
@@ -1863,7 +1864,7 @@
           <a:p>
             <a:fld id="{6D79F432-8B29-4E94-9828-C190BA0C460D}" type="datetimeFigureOut">
               <a:rPr lang="en-AU" smtClean="0"/>
-              <a:t>15/11/2022</a:t>
+              <a:t>17/11/2022</a:t>
             </a:fld>
             <a:endParaRPr lang="en-AU"/>
           </a:p>
@@ -2278,7 +2279,7 @@
           <a:p>
             <a:fld id="{6D79F432-8B29-4E94-9828-C190BA0C460D}" type="datetimeFigureOut">
               <a:rPr lang="en-AU" smtClean="0"/>
-              <a:t>15/11/2022</a:t>
+              <a:t>17/11/2022</a:t>
             </a:fld>
             <a:endParaRPr lang="en-AU"/>
           </a:p>
@@ -2420,7 +2421,7 @@
           <a:p>
             <a:fld id="{6D79F432-8B29-4E94-9828-C190BA0C460D}" type="datetimeFigureOut">
               <a:rPr lang="en-AU" smtClean="0"/>
-              <a:t>15/11/2022</a:t>
+              <a:t>17/11/2022</a:t>
             </a:fld>
             <a:endParaRPr lang="en-AU"/>
           </a:p>
@@ -2533,7 +2534,7 @@
           <a:p>
             <a:fld id="{6D79F432-8B29-4E94-9828-C190BA0C460D}" type="datetimeFigureOut">
               <a:rPr lang="en-AU" smtClean="0"/>
-              <a:t>15/11/2022</a:t>
+              <a:t>17/11/2022</a:t>
             </a:fld>
             <a:endParaRPr lang="en-AU"/>
           </a:p>
@@ -2846,7 +2847,7 @@
           <a:p>
             <a:fld id="{6D79F432-8B29-4E94-9828-C190BA0C460D}" type="datetimeFigureOut">
               <a:rPr lang="en-AU" smtClean="0"/>
-              <a:t>15/11/2022</a:t>
+              <a:t>17/11/2022</a:t>
             </a:fld>
             <a:endParaRPr lang="en-AU"/>
           </a:p>
@@ -3135,7 +3136,7 @@
           <a:p>
             <a:fld id="{6D79F432-8B29-4E94-9828-C190BA0C460D}" type="datetimeFigureOut">
               <a:rPr lang="en-AU" smtClean="0"/>
-              <a:t>15/11/2022</a:t>
+              <a:t>17/11/2022</a:t>
             </a:fld>
             <a:endParaRPr lang="en-AU"/>
           </a:p>
@@ -3378,7 +3379,7 @@
           <a:p>
             <a:fld id="{6D79F432-8B29-4E94-9828-C190BA0C460D}" type="datetimeFigureOut">
               <a:rPr lang="en-AU" smtClean="0"/>
-              <a:t>15/11/2022</a:t>
+              <a:t>17/11/2022</a:t>
             </a:fld>
             <a:endParaRPr lang="en-AU"/>
           </a:p>
@@ -7863,6 +7864,458 @@
     <p:extLst>
       <p:ext uri="{BB962C8B-B14F-4D97-AF65-F5344CB8AC3E}">
         <p14:creationId xmlns:p14="http://schemas.microsoft.com/office/powerpoint/2010/main" val="1763656324"/>
+      </p:ext>
+    </p:extLst>
+  </p:cSld>
+  <p:clrMapOvr>
+    <a:masterClrMapping/>
+  </p:clrMapOvr>
+</p:sld>
+</file>
+
+<file path=ppt/slides/slide13.xml><?xml version="1.0" encoding="utf-8"?>
+<p:sld xmlns:a="http://schemas.openxmlformats.org/drawingml/2006/main" xmlns:r="http://schemas.openxmlformats.org/officeDocument/2006/relationships" xmlns:p="http://schemas.openxmlformats.org/presentationml/2006/main">
+  <p:cSld>
+    <p:spTree>
+      <p:nvGrpSpPr>
+        <p:cNvPr id="1" name=""/>
+        <p:cNvGrpSpPr/>
+        <p:nvPr/>
+      </p:nvGrpSpPr>
+      <p:grpSpPr>
+        <a:xfrm>
+          <a:off x="0" y="0"/>
+          <a:ext cx="0" cy="0"/>
+          <a:chOff x="0" y="0"/>
+          <a:chExt cx="0" cy="0"/>
+        </a:xfrm>
+      </p:grpSpPr>
+      <p:sp>
+        <p:nvSpPr>
+          <p:cNvPr id="2" name="Title 1">
+            <a:extLst>
+              <a:ext uri="{FF2B5EF4-FFF2-40B4-BE49-F238E27FC236}">
+                <a16:creationId xmlns:a16="http://schemas.microsoft.com/office/drawing/2014/main" id="{29981D7D-AB0F-6CC0-C0FE-51E6BDF5655F}"/>
+              </a:ext>
+            </a:extLst>
+          </p:cNvPr>
+          <p:cNvSpPr>
+            <a:spLocks noGrp="1"/>
+          </p:cNvSpPr>
+          <p:nvPr>
+            <p:ph type="title"/>
+          </p:nvPr>
+        </p:nvSpPr>
+        <p:spPr/>
+        <p:txBody>
+          <a:bodyPr/>
+          <a:lstStyle/>
+          <a:p>
+            <a:r>
+              <a:rPr lang="en-AU" b="1" dirty="0"/>
+              <a:t>Objectives Set in Previous Meeting (9/11/2022)</a:t>
+            </a:r>
+            <a:endParaRPr lang="en-AU" dirty="0"/>
+          </a:p>
+        </p:txBody>
+      </p:sp>
+      <mc:AlternateContent xmlns:mc="http://schemas.openxmlformats.org/markup-compatibility/2006">
+        <mc:Choice xmlns:a14="http://schemas.microsoft.com/office/drawing/2010/main" Requires="a14">
+          <p:sp>
+            <p:nvSpPr>
+              <p:cNvPr id="3" name="Content Placeholder 2">
+                <a:extLst>
+                  <a:ext uri="{FF2B5EF4-FFF2-40B4-BE49-F238E27FC236}">
+                    <a16:creationId xmlns:a16="http://schemas.microsoft.com/office/drawing/2014/main" id="{DCC25412-023F-0D56-6E4C-1D3E41FB833E}"/>
+                  </a:ext>
+                </a:extLst>
+              </p:cNvPr>
+              <p:cNvSpPr>
+                <a:spLocks noGrp="1"/>
+              </p:cNvSpPr>
+              <p:nvPr>
+                <p:ph idx="1"/>
+              </p:nvPr>
+            </p:nvSpPr>
+            <p:spPr>
+              <a:xfrm>
+                <a:off x="266307" y="1863332"/>
+                <a:ext cx="11925693" cy="4351338"/>
+              </a:xfrm>
+            </p:spPr>
+            <p:txBody>
+              <a:bodyPr/>
+              <a:lstStyle/>
+              <a:p>
+                <a:pPr marL="514350" indent="-514350">
+                  <a:buAutoNum type="arabicPeriod"/>
+                </a:pPr>
+                <a:r>
+                  <a:rPr lang="en-AU" b="1" dirty="0">
+                    <a:solidFill>
+                      <a:srgbClr val="00B050"/>
+                    </a:solidFill>
+                  </a:rPr>
+                  <a:t>Find plot of BR = </a:t>
+                </a:r>
+                <a14:m>
+                  <m:oMath xmlns:m="http://schemas.openxmlformats.org/officeDocument/2006/math">
+                    <m:sSup>
+                      <m:sSupPr>
+                        <m:ctrlPr>
+                          <a:rPr lang="en-AU" b="1" i="1" smtClean="0">
+                            <a:solidFill>
+                              <a:srgbClr val="00B050"/>
+                            </a:solidFill>
+                            <a:latin typeface="Cambria Math" panose="02040503050406030204" pitchFamily="18" charset="0"/>
+                          </a:rPr>
+                        </m:ctrlPr>
+                      </m:sSupPr>
+                      <m:e>
+                        <m:r>
+                          <a:rPr lang="en-AU" b="1" i="1" smtClean="0">
+                            <a:solidFill>
+                              <a:srgbClr val="00B050"/>
+                            </a:solidFill>
+                            <a:latin typeface="Cambria Math" panose="02040503050406030204" pitchFamily="18" charset="0"/>
+                          </a:rPr>
+                          <m:t>𝟏𝟎</m:t>
+                        </m:r>
+                      </m:e>
+                      <m:sup>
+                        <m:r>
+                          <a:rPr lang="en-AU" b="1" i="1" smtClean="0">
+                            <a:solidFill>
+                              <a:srgbClr val="00B050"/>
+                            </a:solidFill>
+                            <a:latin typeface="Cambria Math" panose="02040503050406030204" pitchFamily="18" charset="0"/>
+                          </a:rPr>
+                          <m:t>−</m:t>
+                        </m:r>
+                        <m:r>
+                          <a:rPr lang="en-AU" b="1" i="1" smtClean="0">
+                            <a:solidFill>
+                              <a:srgbClr val="00B050"/>
+                            </a:solidFill>
+                            <a:latin typeface="Cambria Math" panose="02040503050406030204" pitchFamily="18" charset="0"/>
+                          </a:rPr>
+                          <m:t>𝟕</m:t>
+                        </m:r>
+                      </m:sup>
+                    </m:sSup>
+                  </m:oMath>
+                </a14:m>
+                <a:r>
+                  <a:rPr lang="en-AU" b="1" dirty="0">
+                    <a:solidFill>
+                      <a:srgbClr val="00B050"/>
+                    </a:solidFill>
+                  </a:rPr>
+                  <a:t> on </a:t>
+                </a:r>
+                <a14:m>
+                  <m:oMath xmlns:m="http://schemas.openxmlformats.org/officeDocument/2006/math">
+                    <m:sSub>
+                      <m:sSubPr>
+                        <m:ctrlPr>
+                          <a:rPr lang="en-AU" b="1" i="1" smtClean="0">
+                            <a:solidFill>
+                              <a:srgbClr val="00B050"/>
+                            </a:solidFill>
+                            <a:latin typeface="Cambria Math" panose="02040503050406030204" pitchFamily="18" charset="0"/>
+                          </a:rPr>
+                        </m:ctrlPr>
+                      </m:sSubPr>
+                      <m:e>
+                        <m:r>
+                          <a:rPr lang="en-AU" b="1" i="1" smtClean="0">
+                            <a:solidFill>
+                              <a:srgbClr val="00B050"/>
+                            </a:solidFill>
+                            <a:latin typeface="Cambria Math" panose="02040503050406030204" pitchFamily="18" charset="0"/>
+                          </a:rPr>
+                          <m:t>𝒎</m:t>
+                        </m:r>
+                      </m:e>
+                      <m:sub>
+                        <m:r>
+                          <a:rPr lang="en-AU" b="1" i="1" smtClean="0">
+                            <a:solidFill>
+                              <a:srgbClr val="00B050"/>
+                            </a:solidFill>
+                            <a:latin typeface="Cambria Math" panose="02040503050406030204" pitchFamily="18" charset="0"/>
+                          </a:rPr>
+                          <m:t>𝒂</m:t>
+                        </m:r>
+                      </m:sub>
+                    </m:sSub>
+                  </m:oMath>
+                </a14:m>
+                <a:r>
+                  <a:rPr lang="en-AU" b="1" dirty="0">
+                    <a:solidFill>
+                      <a:srgbClr val="00B050"/>
+                    </a:solidFill>
+                  </a:rPr>
+                  <a:t> vs </a:t>
+                </a:r>
+                <a14:m>
+                  <m:oMath xmlns:m="http://schemas.openxmlformats.org/officeDocument/2006/math">
+                    <m:sSub>
+                      <m:sSubPr>
+                        <m:ctrlPr>
+                          <a:rPr lang="en-AU" b="1" i="1" smtClean="0">
+                            <a:solidFill>
+                              <a:srgbClr val="00B050"/>
+                            </a:solidFill>
+                            <a:latin typeface="Cambria Math" panose="02040503050406030204" pitchFamily="18" charset="0"/>
+                          </a:rPr>
+                        </m:ctrlPr>
+                      </m:sSubPr>
+                      <m:e>
+                        <m:r>
+                          <a:rPr lang="en-AU" b="1" i="1" smtClean="0">
+                            <a:solidFill>
+                              <a:srgbClr val="00B050"/>
+                            </a:solidFill>
+                            <a:latin typeface="Cambria Math" panose="02040503050406030204" pitchFamily="18" charset="0"/>
+                          </a:rPr>
+                          <m:t>𝒈</m:t>
+                        </m:r>
+                      </m:e>
+                      <m:sub>
+                        <m:r>
+                          <a:rPr lang="en-AU" b="1" i="1" smtClean="0">
+                            <a:solidFill>
+                              <a:srgbClr val="00B050"/>
+                            </a:solidFill>
+                            <a:latin typeface="Cambria Math" panose="02040503050406030204" pitchFamily="18" charset="0"/>
+                          </a:rPr>
+                          <m:t>𝒂𝑾</m:t>
+                        </m:r>
+                      </m:sub>
+                    </m:sSub>
+                  </m:oMath>
+                </a14:m>
+                <a:r>
+                  <a:rPr lang="en-AU" b="1" dirty="0">
+                    <a:solidFill>
+                      <a:srgbClr val="00B050"/>
+                    </a:solidFill>
+                  </a:rPr>
+                  <a:t> plot</a:t>
+                </a:r>
+              </a:p>
+              <a:p>
+                <a:pPr marL="514350" indent="-514350">
+                  <a:buAutoNum type="arabicPeriod"/>
+                </a:pPr>
+                <a:r>
+                  <a:rPr lang="en-AU" b="1" dirty="0">
+                    <a:solidFill>
+                      <a:srgbClr val="FFC000"/>
+                    </a:solidFill>
+                  </a:rPr>
+                  <a:t>Read diphoton resonance searches paper </a:t>
+                </a:r>
+              </a:p>
+              <a:p>
+                <a:pPr marL="514350" indent="-514350">
+                  <a:buAutoNum type="arabicPeriod"/>
+                </a:pPr>
+                <a:r>
+                  <a:rPr lang="en-AU" b="1" dirty="0">
+                    <a:solidFill>
+                      <a:srgbClr val="FFC000"/>
+                    </a:solidFill>
+                  </a:rPr>
+                  <a:t>Determine width of exclusion regions for </a:t>
+                </a:r>
+                <a14:m>
+                  <m:oMath xmlns:m="http://schemas.openxmlformats.org/officeDocument/2006/math">
+                    <m:sSup>
+                      <m:sSupPr>
+                        <m:ctrlPr>
+                          <a:rPr lang="en-AU" b="1" i="1" smtClean="0">
+                            <a:solidFill>
+                              <a:srgbClr val="FFC000"/>
+                            </a:solidFill>
+                            <a:latin typeface="Cambria Math" panose="02040503050406030204" pitchFamily="18" charset="0"/>
+                          </a:rPr>
+                        </m:ctrlPr>
+                      </m:sSupPr>
+                      <m:e>
+                        <m:r>
+                          <a:rPr lang="en-AU" b="1" i="1" smtClean="0">
+                            <a:solidFill>
+                              <a:srgbClr val="FFC000"/>
+                            </a:solidFill>
+                            <a:latin typeface="Cambria Math" panose="02040503050406030204" pitchFamily="18" charset="0"/>
+                          </a:rPr>
+                          <m:t>𝝅</m:t>
+                        </m:r>
+                      </m:e>
+                      <m:sup>
+                        <m:r>
+                          <a:rPr lang="en-AU" b="1" i="1" smtClean="0">
+                            <a:solidFill>
+                              <a:srgbClr val="FFC000"/>
+                            </a:solidFill>
+                            <a:latin typeface="Cambria Math" panose="02040503050406030204" pitchFamily="18" charset="0"/>
+                          </a:rPr>
+                          <m:t>𝟎</m:t>
+                        </m:r>
+                      </m:sup>
+                    </m:sSup>
+                    <m:r>
+                      <a:rPr lang="en-AU" b="1" i="1" smtClean="0">
+                        <a:solidFill>
+                          <a:srgbClr val="FFC000"/>
+                        </a:solidFill>
+                        <a:latin typeface="Cambria Math" panose="02040503050406030204" pitchFamily="18" charset="0"/>
+                      </a:rPr>
+                      <m:t>, </m:t>
+                    </m:r>
+                    <m:r>
+                      <a:rPr lang="en-AU" b="1" i="1" smtClean="0">
+                        <a:solidFill>
+                          <a:srgbClr val="FFC000"/>
+                        </a:solidFill>
+                        <a:latin typeface="Cambria Math" panose="02040503050406030204" pitchFamily="18" charset="0"/>
+                      </a:rPr>
+                      <m:t>𝜼</m:t>
+                    </m:r>
+                  </m:oMath>
+                </a14:m>
+                <a:r>
+                  <a:rPr lang="en-AU" b="1" dirty="0">
+                    <a:solidFill>
+                      <a:srgbClr val="FFC000"/>
+                    </a:solidFill>
+                  </a:rPr>
+                  <a:t> and </a:t>
+                </a:r>
+                <a14:m>
+                  <m:oMath xmlns:m="http://schemas.openxmlformats.org/officeDocument/2006/math">
+                    <m:sSup>
+                      <m:sSupPr>
+                        <m:ctrlPr>
+                          <a:rPr lang="en-AU" b="1" i="1" smtClean="0">
+                            <a:solidFill>
+                              <a:srgbClr val="FFC000"/>
+                            </a:solidFill>
+                            <a:latin typeface="Cambria Math" panose="02040503050406030204" pitchFamily="18" charset="0"/>
+                          </a:rPr>
+                        </m:ctrlPr>
+                      </m:sSupPr>
+                      <m:e>
+                        <m:r>
+                          <a:rPr lang="en-AU" b="1" i="1" smtClean="0">
+                            <a:solidFill>
+                              <a:srgbClr val="FFC000"/>
+                            </a:solidFill>
+                            <a:latin typeface="Cambria Math" panose="02040503050406030204" pitchFamily="18" charset="0"/>
+                          </a:rPr>
+                          <m:t>𝜼</m:t>
+                        </m:r>
+                      </m:e>
+                      <m:sup>
+                        <m:r>
+                          <a:rPr lang="en-AU" b="1" i="1" smtClean="0">
+                            <a:solidFill>
+                              <a:srgbClr val="FFC000"/>
+                            </a:solidFill>
+                            <a:latin typeface="Cambria Math" panose="02040503050406030204" pitchFamily="18" charset="0"/>
+                          </a:rPr>
+                          <m:t>′</m:t>
+                        </m:r>
+                      </m:sup>
+                    </m:sSup>
+                  </m:oMath>
+                </a14:m>
+                <a:r>
+                  <a:rPr lang="en-AU" b="1" dirty="0">
+                    <a:solidFill>
+                      <a:srgbClr val="FFC000"/>
+                    </a:solidFill>
+                  </a:rPr>
+                  <a:t> backgrounds</a:t>
+                </a:r>
+              </a:p>
+              <a:p>
+                <a:pPr marL="514350" indent="-514350">
+                  <a:buAutoNum type="arabicPeriod"/>
+                </a:pPr>
+                <a:r>
+                  <a:rPr lang="en-AU" b="1" dirty="0">
+                    <a:solidFill>
+                      <a:srgbClr val="FFC000"/>
+                    </a:solidFill>
+                  </a:rPr>
+                  <a:t>Literature Review (in progress)</a:t>
+                </a:r>
+              </a:p>
+              <a:p>
+                <a:pPr marL="0" indent="0">
+                  <a:buNone/>
+                </a:pPr>
+                <a:endParaRPr lang="en-AU" b="1" dirty="0">
+                  <a:solidFill>
+                    <a:srgbClr val="FFC000"/>
+                  </a:solidFill>
+                </a:endParaRPr>
+              </a:p>
+            </p:txBody>
+          </p:sp>
+        </mc:Choice>
+        <mc:Fallback>
+          <p:sp>
+            <p:nvSpPr>
+              <p:cNvPr id="3" name="Content Placeholder 2">
+                <a:extLst>
+                  <a:ext uri="{FF2B5EF4-FFF2-40B4-BE49-F238E27FC236}">
+                    <a16:creationId xmlns:a16="http://schemas.microsoft.com/office/drawing/2014/main" id="{DCC25412-023F-0D56-6E4C-1D3E41FB833E}"/>
+                  </a:ext>
+                </a:extLst>
+              </p:cNvPr>
+              <p:cNvSpPr>
+                <a:spLocks noGrp="1" noRot="1" noChangeAspect="1" noMove="1" noResize="1" noEditPoints="1" noAdjustHandles="1" noChangeArrowheads="1" noChangeShapeType="1" noTextEdit="1"/>
+              </p:cNvSpPr>
+              <p:nvPr>
+                <p:ph idx="1"/>
+              </p:nvPr>
+            </p:nvSpPr>
+            <p:spPr>
+              <a:xfrm>
+                <a:off x="266307" y="1863332"/>
+                <a:ext cx="11925693" cy="4351338"/>
+              </a:xfrm>
+              <a:blipFill>
+                <a:blip r:embed="rId2"/>
+                <a:stretch>
+                  <a:fillRect l="-1074" t="-2384"/>
+                </a:stretch>
+              </a:blipFill>
+            </p:spPr>
+            <p:txBody>
+              <a:bodyPr/>
+              <a:lstStyle/>
+              <a:p>
+                <a:r>
+                  <a:rPr lang="en-AU">
+                    <a:noFill/>
+                  </a:rPr>
+                  <a:t> </a:t>
+                </a:r>
+              </a:p>
+            </p:txBody>
+          </p:sp>
+        </mc:Fallback>
+      </mc:AlternateContent>
+    </p:spTree>
+    <p:extLst>
+      <p:ext uri="{BB962C8B-B14F-4D97-AF65-F5344CB8AC3E}">
+        <p14:creationId xmlns:p14="http://schemas.microsoft.com/office/powerpoint/2010/main" val="3326739308"/>
       </p:ext>
     </p:extLst>
   </p:cSld>
@@ -12389,7 +12842,7 @@
         </p:blipFill>
         <p:spPr>
           <a:xfrm>
-            <a:off x="2207911" y="468316"/>
+            <a:off x="2179631" y="588895"/>
             <a:ext cx="7420992" cy="4412025"/>
           </a:xfrm>
           <a:prstGeom prst="rect">
@@ -12397,8 +12850,8 @@
           </a:prstGeom>
         </p:spPr>
       </p:pic>
-      <mc:AlternateContent xmlns:mc="http://schemas.openxmlformats.org/markup-compatibility/2006">
-        <mc:Choice xmlns:a14="http://schemas.microsoft.com/office/drawing/2010/main" Requires="a14">
+      <mc:AlternateContent xmlns:mc="http://schemas.openxmlformats.org/markup-compatibility/2006" xmlns:a14="http://schemas.microsoft.com/office/drawing/2010/main">
+        <mc:Choice Requires="a14">
           <p:sp>
             <p:nvSpPr>
               <p:cNvPr id="5" name="TextBox 4">
@@ -12604,7 +13057,7 @@
             </p:txBody>
           </p:sp>
         </mc:Choice>
-        <mc:Fallback>
+        <mc:Fallback xmlns="">
           <p:sp>
             <p:nvSpPr>
               <p:cNvPr id="5" name="TextBox 4">

</xml_diff>

<commit_message>
Updated research project progress ppt
</commit_message>
<xml_diff>
--- a/Research_Project/LHCb Starterkit/MSc Research Project Progress 31 Aug 2022 [Autosaved].pptx
+++ b/Research_Project/LHCb Starterkit/MSc Research Project Progress 31 Aug 2022 [Autosaved].pptx
@@ -5,7 +5,7 @@
     <p:sldMasterId id="2147483648" r:id="rId1"/>
   </p:sldMasterIdLst>
   <p:notesMasterIdLst>
-    <p:notesMasterId r:id="rId15"/>
+    <p:notesMasterId r:id="rId16"/>
   </p:notesMasterIdLst>
   <p:sldIdLst>
     <p:sldId id="256" r:id="rId2"/>
@@ -21,6 +21,7 @@
     <p:sldId id="265" r:id="rId12"/>
     <p:sldId id="266" r:id="rId13"/>
     <p:sldId id="268" r:id="rId14"/>
+    <p:sldId id="269" r:id="rId15"/>
   </p:sldIdLst>
   <p:sldSz cx="12192000" cy="6858000"/>
   <p:notesSz cx="6858000" cy="9144000"/>
@@ -209,7 +210,7 @@
           <a:p>
             <a:fld id="{FC50BE67-3C8E-4570-A99E-8EC5CD30FB7F}" type="datetimeFigureOut">
               <a:rPr lang="en-AU" smtClean="0"/>
-              <a:t>17/11/2022</a:t>
+              <a:t>20/11/2022</a:t>
             </a:fld>
             <a:endParaRPr lang="en-AU"/>
           </a:p>
@@ -710,7 +711,7 @@
           <a:p>
             <a:fld id="{6D79F432-8B29-4E94-9828-C190BA0C460D}" type="datetimeFigureOut">
               <a:rPr lang="en-AU" smtClean="0"/>
-              <a:t>17/11/2022</a:t>
+              <a:t>20/11/2022</a:t>
             </a:fld>
             <a:endParaRPr lang="en-AU"/>
           </a:p>
@@ -910,7 +911,7 @@
           <a:p>
             <a:fld id="{6D79F432-8B29-4E94-9828-C190BA0C460D}" type="datetimeFigureOut">
               <a:rPr lang="en-AU" smtClean="0"/>
-              <a:t>17/11/2022</a:t>
+              <a:t>20/11/2022</a:t>
             </a:fld>
             <a:endParaRPr lang="en-AU"/>
           </a:p>
@@ -1120,7 +1121,7 @@
           <a:p>
             <a:fld id="{6D79F432-8B29-4E94-9828-C190BA0C460D}" type="datetimeFigureOut">
               <a:rPr lang="en-AU" smtClean="0"/>
-              <a:t>17/11/2022</a:t>
+              <a:t>20/11/2022</a:t>
             </a:fld>
             <a:endParaRPr lang="en-AU"/>
           </a:p>
@@ -1320,7 +1321,7 @@
           <a:p>
             <a:fld id="{6D79F432-8B29-4E94-9828-C190BA0C460D}" type="datetimeFigureOut">
               <a:rPr lang="en-AU" smtClean="0"/>
-              <a:t>17/11/2022</a:t>
+              <a:t>20/11/2022</a:t>
             </a:fld>
             <a:endParaRPr lang="en-AU"/>
           </a:p>
@@ -1596,7 +1597,7 @@
           <a:p>
             <a:fld id="{6D79F432-8B29-4E94-9828-C190BA0C460D}" type="datetimeFigureOut">
               <a:rPr lang="en-AU" smtClean="0"/>
-              <a:t>17/11/2022</a:t>
+              <a:t>20/11/2022</a:t>
             </a:fld>
             <a:endParaRPr lang="en-AU"/>
           </a:p>
@@ -1864,7 +1865,7 @@
           <a:p>
             <a:fld id="{6D79F432-8B29-4E94-9828-C190BA0C460D}" type="datetimeFigureOut">
               <a:rPr lang="en-AU" smtClean="0"/>
-              <a:t>17/11/2022</a:t>
+              <a:t>20/11/2022</a:t>
             </a:fld>
             <a:endParaRPr lang="en-AU"/>
           </a:p>
@@ -2279,7 +2280,7 @@
           <a:p>
             <a:fld id="{6D79F432-8B29-4E94-9828-C190BA0C460D}" type="datetimeFigureOut">
               <a:rPr lang="en-AU" smtClean="0"/>
-              <a:t>17/11/2022</a:t>
+              <a:t>20/11/2022</a:t>
             </a:fld>
             <a:endParaRPr lang="en-AU"/>
           </a:p>
@@ -2421,7 +2422,7 @@
           <a:p>
             <a:fld id="{6D79F432-8B29-4E94-9828-C190BA0C460D}" type="datetimeFigureOut">
               <a:rPr lang="en-AU" smtClean="0"/>
-              <a:t>17/11/2022</a:t>
+              <a:t>20/11/2022</a:t>
             </a:fld>
             <a:endParaRPr lang="en-AU"/>
           </a:p>
@@ -2534,7 +2535,7 @@
           <a:p>
             <a:fld id="{6D79F432-8B29-4E94-9828-C190BA0C460D}" type="datetimeFigureOut">
               <a:rPr lang="en-AU" smtClean="0"/>
-              <a:t>17/11/2022</a:t>
+              <a:t>20/11/2022</a:t>
             </a:fld>
             <a:endParaRPr lang="en-AU"/>
           </a:p>
@@ -2847,7 +2848,7 @@
           <a:p>
             <a:fld id="{6D79F432-8B29-4E94-9828-C190BA0C460D}" type="datetimeFigureOut">
               <a:rPr lang="en-AU" smtClean="0"/>
-              <a:t>17/11/2022</a:t>
+              <a:t>20/11/2022</a:t>
             </a:fld>
             <a:endParaRPr lang="en-AU"/>
           </a:p>
@@ -3136,7 +3137,7 @@
           <a:p>
             <a:fld id="{6D79F432-8B29-4E94-9828-C190BA0C460D}" type="datetimeFigureOut">
               <a:rPr lang="en-AU" smtClean="0"/>
-              <a:t>17/11/2022</a:t>
+              <a:t>20/11/2022</a:t>
             </a:fld>
             <a:endParaRPr lang="en-AU"/>
           </a:p>
@@ -3379,7 +3380,7 @@
           <a:p>
             <a:fld id="{6D79F432-8B29-4E94-9828-C190BA0C460D}" type="datetimeFigureOut">
               <a:rPr lang="en-AU" smtClean="0"/>
-              <a:t>17/11/2022</a:t>
+              <a:t>20/11/2022</a:t>
             </a:fld>
             <a:endParaRPr lang="en-AU"/>
           </a:p>
@@ -7944,7 +7945,9 @@
               </a:xfrm>
             </p:spPr>
             <p:txBody>
-              <a:bodyPr/>
+              <a:bodyPr>
+                <a:normAutofit/>
+              </a:bodyPr>
               <a:lstStyle/>
               <a:p>
                 <a:pPr marL="514350" indent="-514350">
@@ -8105,18 +8108,13 @@
                   </a:rPr>
                   <a:t> plot</a:t>
                 </a:r>
-              </a:p>
-              <a:p>
-                <a:pPr marL="514350" indent="-514350">
-                  <a:buAutoNum type="arabicPeriod"/>
-                </a:pPr>
                 <a:r>
                   <a:rPr lang="en-AU" b="1" dirty="0">
                     <a:solidFill>
                       <a:srgbClr val="FFC000"/>
                     </a:solidFill>
                   </a:rPr>
-                  <a:t>Read diphoton resonance searches paper </a:t>
+                  <a:t> </a:t>
                 </a:r>
               </a:p>
               <a:p>
@@ -8126,144 +8124,11 @@
                 <a:r>
                   <a:rPr lang="en-AU" b="1" dirty="0">
                     <a:solidFill>
-                      <a:srgbClr val="FFC000"/>
-                    </a:solidFill>
-                  </a:rPr>
-                  <a:t>Determine width of exclusion regions for </a:t>
-                </a:r>
-                <a14:m>
-                  <m:oMath xmlns:m="http://schemas.openxmlformats.org/officeDocument/2006/math">
-                    <m:sSup>
-                      <m:sSupPr>
-                        <m:ctrlPr>
-                          <a:rPr lang="en-AU" b="1" i="1" smtClean="0">
-                            <a:solidFill>
-                              <a:srgbClr val="FFC000"/>
-                            </a:solidFill>
-                            <a:latin typeface="Cambria Math" panose="02040503050406030204" pitchFamily="18" charset="0"/>
-                          </a:rPr>
-                        </m:ctrlPr>
-                      </m:sSupPr>
-                      <m:e>
-                        <m:r>
-                          <a:rPr lang="en-AU" b="1" i="1" smtClean="0">
-                            <a:solidFill>
-                              <a:srgbClr val="FFC000"/>
-                            </a:solidFill>
-                            <a:latin typeface="Cambria Math" panose="02040503050406030204" pitchFamily="18" charset="0"/>
-                          </a:rPr>
-                          <m:t>𝝅</m:t>
-                        </m:r>
-                      </m:e>
-                      <m:sup>
-                        <m:r>
-                          <a:rPr lang="en-AU" b="1" i="1" smtClean="0">
-                            <a:solidFill>
-                              <a:srgbClr val="FFC000"/>
-                            </a:solidFill>
-                            <a:latin typeface="Cambria Math" panose="02040503050406030204" pitchFamily="18" charset="0"/>
-                          </a:rPr>
-                          <m:t>𝟎</m:t>
-                        </m:r>
-                      </m:sup>
-                    </m:sSup>
-                    <m:r>
-                      <a:rPr lang="en-AU" b="1" i="1" smtClean="0">
-                        <a:solidFill>
-                          <a:srgbClr val="FFC000"/>
-                        </a:solidFill>
-                        <a:latin typeface="Cambria Math" panose="02040503050406030204" pitchFamily="18" charset="0"/>
-                      </a:rPr>
-                      <m:t>, </m:t>
-                    </m:r>
-                    <m:r>
-                      <a:rPr lang="en-AU" b="1" i="1" smtClean="0">
-                        <a:solidFill>
-                          <a:srgbClr val="FFC000"/>
-                        </a:solidFill>
-                        <a:latin typeface="Cambria Math" panose="02040503050406030204" pitchFamily="18" charset="0"/>
-                      </a:rPr>
-                      <m:t>𝜼</m:t>
-                    </m:r>
-                  </m:oMath>
-                </a14:m>
-                <a:r>
-                  <a:rPr lang="en-AU" b="1" dirty="0">
-                    <a:solidFill>
-                      <a:srgbClr val="FFC000"/>
-                    </a:solidFill>
-                  </a:rPr>
-                  <a:t> and </a:t>
-                </a:r>
-                <a14:m>
-                  <m:oMath xmlns:m="http://schemas.openxmlformats.org/officeDocument/2006/math">
-                    <m:sSup>
-                      <m:sSupPr>
-                        <m:ctrlPr>
-                          <a:rPr lang="en-AU" b="1" i="1" smtClean="0">
-                            <a:solidFill>
-                              <a:srgbClr val="FFC000"/>
-                            </a:solidFill>
-                            <a:latin typeface="Cambria Math" panose="02040503050406030204" pitchFamily="18" charset="0"/>
-                          </a:rPr>
-                        </m:ctrlPr>
-                      </m:sSupPr>
-                      <m:e>
-                        <m:r>
-                          <a:rPr lang="en-AU" b="1" i="1" smtClean="0">
-                            <a:solidFill>
-                              <a:srgbClr val="FFC000"/>
-                            </a:solidFill>
-                            <a:latin typeface="Cambria Math" panose="02040503050406030204" pitchFamily="18" charset="0"/>
-                          </a:rPr>
-                          <m:t>𝜼</m:t>
-                        </m:r>
-                      </m:e>
-                      <m:sup>
-                        <m:r>
-                          <a:rPr lang="en-AU" b="1" i="1" smtClean="0">
-                            <a:solidFill>
-                              <a:srgbClr val="FFC000"/>
-                            </a:solidFill>
-                            <a:latin typeface="Cambria Math" panose="02040503050406030204" pitchFamily="18" charset="0"/>
-                          </a:rPr>
-                          <m:t>′</m:t>
-                        </m:r>
-                      </m:sup>
-                    </m:sSup>
-                  </m:oMath>
-                </a14:m>
-                <a:r>
-                  <a:rPr lang="en-AU" b="1" dirty="0">
-                    <a:solidFill>
-                      <a:srgbClr val="FFC000"/>
-                    </a:solidFill>
-                  </a:rPr>
-                  <a:t> backgrounds</a:t>
-                </a:r>
-              </a:p>
-              <a:p>
-                <a:pPr marL="514350" indent="-514350">
-                  <a:buAutoNum type="arabicPeriod"/>
-                </a:pPr>
-                <a:r>
-                  <a:rPr lang="en-AU" b="1" dirty="0">
-                    <a:solidFill>
-                      <a:srgbClr val="FFC000"/>
+                      <a:srgbClr val="00B050"/>
                     </a:solidFill>
                   </a:rPr>
                   <a:t>Literature Review (in progress)</a:t>
                 </a:r>
-              </a:p>
-              <a:p>
-                <a:pPr marL="0" indent="0">
-                  <a:buNone/>
-                </a:pPr>
-                <a:endParaRPr lang="en-AU" b="1" dirty="0">
-                  <a:solidFill>
-                    <a:srgbClr val="FFC000"/>
-                  </a:solidFill>
-                </a:endParaRPr>
               </a:p>
             </p:txBody>
           </p:sp>
@@ -8316,6 +8181,418 @@
     <p:extLst>
       <p:ext uri="{BB962C8B-B14F-4D97-AF65-F5344CB8AC3E}">
         <p14:creationId xmlns:p14="http://schemas.microsoft.com/office/powerpoint/2010/main" val="3326739308"/>
+      </p:ext>
+    </p:extLst>
+  </p:cSld>
+  <p:clrMapOvr>
+    <a:masterClrMapping/>
+  </p:clrMapOvr>
+</p:sld>
+</file>
+
+<file path=ppt/slides/slide14.xml><?xml version="1.0" encoding="utf-8"?>
+<p:sld xmlns:a="http://schemas.openxmlformats.org/drawingml/2006/main" xmlns:r="http://schemas.openxmlformats.org/officeDocument/2006/relationships" xmlns:p="http://schemas.openxmlformats.org/presentationml/2006/main">
+  <p:cSld>
+    <p:spTree>
+      <p:nvGrpSpPr>
+        <p:cNvPr id="1" name=""/>
+        <p:cNvGrpSpPr/>
+        <p:nvPr/>
+      </p:nvGrpSpPr>
+      <p:grpSpPr>
+        <a:xfrm>
+          <a:off x="0" y="0"/>
+          <a:ext cx="0" cy="0"/>
+          <a:chOff x="0" y="0"/>
+          <a:chExt cx="0" cy="0"/>
+        </a:xfrm>
+      </p:grpSpPr>
+      <p:sp>
+        <p:nvSpPr>
+          <p:cNvPr id="2" name="Title 1">
+            <a:extLst>
+              <a:ext uri="{FF2B5EF4-FFF2-40B4-BE49-F238E27FC236}">
+                <a16:creationId xmlns:a16="http://schemas.microsoft.com/office/drawing/2014/main" id="{F75D4DB2-071E-7D4E-45B4-442072517FF6}"/>
+              </a:ext>
+            </a:extLst>
+          </p:cNvPr>
+          <p:cNvSpPr>
+            <a:spLocks noGrp="1"/>
+          </p:cNvSpPr>
+          <p:nvPr>
+            <p:ph type="title"/>
+          </p:nvPr>
+        </p:nvSpPr>
+        <p:spPr>
+          <a:xfrm>
+            <a:off x="838200" y="365125"/>
+            <a:ext cx="10993016" cy="1325563"/>
+          </a:xfrm>
+        </p:spPr>
+        <p:txBody>
+          <a:bodyPr/>
+          <a:lstStyle/>
+          <a:p>
+            <a:r>
+              <a:rPr lang="en-AU" b="1" dirty="0"/>
+              <a:t>Objectives Set in Previous Meeting (16/09/2022)</a:t>
+            </a:r>
+          </a:p>
+        </p:txBody>
+      </p:sp>
+      <mc:AlternateContent xmlns:mc="http://schemas.openxmlformats.org/markup-compatibility/2006">
+        <mc:Choice xmlns:a14="http://schemas.microsoft.com/office/drawing/2010/main" Requires="a14">
+          <p:sp>
+            <p:nvSpPr>
+              <p:cNvPr id="3" name="Content Placeholder 2">
+                <a:extLst>
+                  <a:ext uri="{FF2B5EF4-FFF2-40B4-BE49-F238E27FC236}">
+                    <a16:creationId xmlns:a16="http://schemas.microsoft.com/office/drawing/2014/main" id="{916E8F10-B28B-781C-AF3E-1D898AA31019}"/>
+                  </a:ext>
+                </a:extLst>
+              </p:cNvPr>
+              <p:cNvSpPr>
+                <a:spLocks noGrp="1"/>
+              </p:cNvSpPr>
+              <p:nvPr>
+                <p:ph idx="1"/>
+              </p:nvPr>
+            </p:nvSpPr>
+            <p:spPr/>
+            <p:txBody>
+              <a:bodyPr>
+                <a:normAutofit fontScale="92500" lnSpcReduction="20000"/>
+              </a:bodyPr>
+              <a:lstStyle/>
+              <a:p>
+                <a:pPr marL="514350" indent="-514350">
+                  <a:buAutoNum type="arabicPeriod"/>
+                </a:pPr>
+                <a:r>
+                  <a:rPr lang="en-AU" b="1" dirty="0">
+                    <a:solidFill>
+                      <a:srgbClr val="00B050"/>
+                    </a:solidFill>
+                  </a:rPr>
+                  <a:t>Determine </a:t>
+                </a:r>
+                <a14:m>
+                  <m:oMath xmlns:m="http://schemas.openxmlformats.org/officeDocument/2006/math">
+                    <m:sSup>
+                      <m:sSupPr>
+                        <m:ctrlPr>
+                          <a:rPr lang="en-AU" b="1" i="1" smtClean="0">
+                            <a:solidFill>
+                              <a:srgbClr val="00B050"/>
+                            </a:solidFill>
+                            <a:latin typeface="Cambria Math" panose="02040503050406030204" pitchFamily="18" charset="0"/>
+                          </a:rPr>
+                        </m:ctrlPr>
+                      </m:sSupPr>
+                      <m:e>
+                        <m:r>
+                          <a:rPr lang="en-AU" b="1" i="1" smtClean="0">
+                            <a:solidFill>
+                              <a:srgbClr val="00B050"/>
+                            </a:solidFill>
+                            <a:latin typeface="Cambria Math" panose="02040503050406030204" pitchFamily="18" charset="0"/>
+                          </a:rPr>
+                          <m:t>𝝅</m:t>
+                        </m:r>
+                      </m:e>
+                      <m:sup>
+                        <m:r>
+                          <a:rPr lang="en-AU" b="1" i="1" smtClean="0">
+                            <a:solidFill>
+                              <a:srgbClr val="00B050"/>
+                            </a:solidFill>
+                            <a:latin typeface="Cambria Math" panose="02040503050406030204" pitchFamily="18" charset="0"/>
+                          </a:rPr>
+                          <m:t>𝟎</m:t>
+                        </m:r>
+                      </m:sup>
+                    </m:sSup>
+                  </m:oMath>
+                </a14:m>
+                <a:r>
+                  <a:rPr lang="en-AU" b="1" dirty="0">
+                    <a:solidFill>
+                      <a:srgbClr val="00B050"/>
+                    </a:solidFill>
+                  </a:rPr>
+                  <a:t> mass resolution from ECAL performance paper</a:t>
+                </a:r>
+              </a:p>
+              <a:p>
+                <a:r>
+                  <a:rPr lang="en-AU" dirty="0"/>
+                  <a:t>Mass resolution obtained for the radiative decay </a:t>
+                </a:r>
+                <a14:m>
+                  <m:oMath xmlns:m="http://schemas.openxmlformats.org/officeDocument/2006/math">
+                    <m:r>
+                      <a:rPr lang="en-AU" b="0" i="1" smtClean="0">
+                        <a:latin typeface="Cambria Math" panose="02040503050406030204" pitchFamily="18" charset="0"/>
+                      </a:rPr>
+                      <m:t>𝐵</m:t>
+                    </m:r>
+                    <m:r>
+                      <a:rPr lang="en-AU" b="0" i="1" smtClean="0">
+                        <a:latin typeface="Cambria Math" panose="02040503050406030204" pitchFamily="18" charset="0"/>
+                      </a:rPr>
+                      <m:t>→</m:t>
+                    </m:r>
+                    <m:sSup>
+                      <m:sSupPr>
+                        <m:ctrlPr>
+                          <a:rPr lang="en-AU" b="0" i="1" smtClean="0">
+                            <a:latin typeface="Cambria Math" panose="02040503050406030204" pitchFamily="18" charset="0"/>
+                          </a:rPr>
+                        </m:ctrlPr>
+                      </m:sSupPr>
+                      <m:e>
+                        <m:r>
+                          <a:rPr lang="en-AU" b="0" i="1" smtClean="0">
+                            <a:latin typeface="Cambria Math" panose="02040503050406030204" pitchFamily="18" charset="0"/>
+                          </a:rPr>
+                          <m:t>𝐾</m:t>
+                        </m:r>
+                      </m:e>
+                      <m:sup>
+                        <m:r>
+                          <a:rPr lang="en-AU" b="0" i="1" smtClean="0">
+                            <a:latin typeface="Cambria Math" panose="02040503050406030204" pitchFamily="18" charset="0"/>
+                          </a:rPr>
+                          <m:t>∗</m:t>
+                        </m:r>
+                      </m:sup>
+                    </m:sSup>
+                    <m:r>
+                      <a:rPr lang="en-AU" b="0" i="1" smtClean="0">
+                        <a:latin typeface="Cambria Math" panose="02040503050406030204" pitchFamily="18" charset="0"/>
+                      </a:rPr>
+                      <m:t>𝛾</m:t>
+                    </m:r>
+                  </m:oMath>
+                </a14:m>
+                <a:r>
+                  <a:rPr lang="en-AU" dirty="0"/>
+                  <a:t> is around 90 MeV. This is dominated by the ECAL energy resolution</a:t>
+                </a:r>
+              </a:p>
+              <a:p>
+                <a:r>
+                  <a:rPr lang="en-AU" dirty="0"/>
+                  <a:t>Neutral pions with low transverse energy are mostly reconstructed as a pair of well separated photons from their decays. A mass resolution of 8 MeV is obtained for such neutral pions</a:t>
+                </a:r>
+              </a:p>
+              <a:p>
+                <a:r>
+                  <a:rPr lang="en-AU" dirty="0"/>
+                  <a:t>By contrast, a large fraction of pairs of photons coming from the decay of high energy </a:t>
+                </a:r>
+                <a14:m>
+                  <m:oMath xmlns:m="http://schemas.openxmlformats.org/officeDocument/2006/math">
+                    <m:sSup>
+                      <m:sSupPr>
+                        <m:ctrlPr>
+                          <a:rPr lang="en-AU" b="0" i="1" smtClean="0">
+                            <a:latin typeface="Cambria Math" panose="02040503050406030204" pitchFamily="18" charset="0"/>
+                          </a:rPr>
+                        </m:ctrlPr>
+                      </m:sSupPr>
+                      <m:e>
+                        <m:r>
+                          <a:rPr lang="en-AU" b="0" i="1" smtClean="0">
+                            <a:latin typeface="Cambria Math" panose="02040503050406030204" pitchFamily="18" charset="0"/>
+                          </a:rPr>
+                          <m:t>𝜋</m:t>
+                        </m:r>
+                      </m:e>
+                      <m:sup>
+                        <m:r>
+                          <a:rPr lang="en-AU" b="0" i="1" smtClean="0">
+                            <a:latin typeface="Cambria Math" panose="02040503050406030204" pitchFamily="18" charset="0"/>
+                          </a:rPr>
+                          <m:t>0</m:t>
+                        </m:r>
+                      </m:sup>
+                    </m:sSup>
+                  </m:oMath>
+                </a14:m>
+                <a:r>
+                  <a:rPr lang="en-AU" dirty="0"/>
+                  <a:t> cannot be separated as a pair of cluster within the ECAL granularity (i.e. merged configuration). This appears for </a:t>
+                </a:r>
+                <a14:m>
+                  <m:oMath xmlns:m="http://schemas.openxmlformats.org/officeDocument/2006/math">
+                    <m:sSub>
+                      <m:sSubPr>
+                        <m:ctrlPr>
+                          <a:rPr lang="en-AU" b="0" i="1" smtClean="0">
+                            <a:latin typeface="Cambria Math" panose="02040503050406030204" pitchFamily="18" charset="0"/>
+                          </a:rPr>
+                        </m:ctrlPr>
+                      </m:sSubPr>
+                      <m:e>
+                        <m:r>
+                          <a:rPr lang="en-AU" b="0" i="1" smtClean="0">
+                            <a:latin typeface="Cambria Math" panose="02040503050406030204" pitchFamily="18" charset="0"/>
+                          </a:rPr>
+                          <m:t>𝑝</m:t>
+                        </m:r>
+                      </m:e>
+                      <m:sub>
+                        <m:r>
+                          <a:rPr lang="en-AU" b="0" i="1" smtClean="0">
+                            <a:latin typeface="Cambria Math" panose="02040503050406030204" pitchFamily="18" charset="0"/>
+                          </a:rPr>
+                          <m:t>𝑇</m:t>
+                        </m:r>
+                      </m:sub>
+                    </m:sSub>
+                    <m:d>
+                      <m:dPr>
+                        <m:ctrlPr>
+                          <a:rPr lang="en-AU" b="0" i="1" smtClean="0">
+                            <a:latin typeface="Cambria Math" panose="02040503050406030204" pitchFamily="18" charset="0"/>
+                          </a:rPr>
+                        </m:ctrlPr>
+                      </m:dPr>
+                      <m:e>
+                        <m:sSup>
+                          <m:sSupPr>
+                            <m:ctrlPr>
+                              <a:rPr lang="en-AU" b="0" i="1" smtClean="0">
+                                <a:latin typeface="Cambria Math" panose="02040503050406030204" pitchFamily="18" charset="0"/>
+                              </a:rPr>
+                            </m:ctrlPr>
+                          </m:sSupPr>
+                          <m:e>
+                            <m:r>
+                              <a:rPr lang="en-AU" b="0" i="1" smtClean="0">
+                                <a:latin typeface="Cambria Math" panose="02040503050406030204" pitchFamily="18" charset="0"/>
+                              </a:rPr>
+                              <m:t>𝜋</m:t>
+                            </m:r>
+                          </m:e>
+                          <m:sup>
+                            <m:r>
+                              <a:rPr lang="en-AU" b="0" i="1" smtClean="0">
+                                <a:latin typeface="Cambria Math" panose="02040503050406030204" pitchFamily="18" charset="0"/>
+                              </a:rPr>
+                              <m:t>0</m:t>
+                            </m:r>
+                          </m:sup>
+                        </m:sSup>
+                      </m:e>
+                    </m:d>
+                    <m:r>
+                      <a:rPr lang="en-AU" b="0" i="1" smtClean="0">
+                        <a:latin typeface="Cambria Math" panose="02040503050406030204" pitchFamily="18" charset="0"/>
+                      </a:rPr>
+                      <m:t>&gt;2 </m:t>
+                    </m:r>
+                    <m:r>
+                      <a:rPr lang="en-AU" b="0" i="1" smtClean="0">
+                        <a:latin typeface="Cambria Math" panose="02040503050406030204" pitchFamily="18" charset="0"/>
+                      </a:rPr>
+                      <m:t>𝐺𝑒𝑉</m:t>
+                    </m:r>
+                  </m:oMath>
+                </a14:m>
+                <a:endParaRPr lang="en-AU" b="1" dirty="0">
+                  <a:solidFill>
+                    <a:srgbClr val="FFC000"/>
+                  </a:solidFill>
+                </a:endParaRPr>
+              </a:p>
+              <a:p>
+                <a:pPr marL="0" indent="0">
+                  <a:buNone/>
+                </a:pPr>
+                <a:r>
+                  <a:rPr lang="en-AU" b="1" dirty="0">
+                    <a:solidFill>
+                      <a:srgbClr val="FFC000"/>
+                    </a:solidFill>
+                  </a:rPr>
+                  <a:t>2. Contact Riley to obtain process for requesting data</a:t>
+                </a:r>
+              </a:p>
+              <a:p>
+                <a:r>
+                  <a:rPr lang="en-AU" b="1" dirty="0">
+                    <a:solidFill>
+                      <a:srgbClr val="FFC000"/>
+                    </a:solidFill>
+                  </a:rPr>
+                  <a:t>Need to create new decay file (almost complete)</a:t>
+                </a:r>
+              </a:p>
+              <a:p>
+                <a:r>
+                  <a:rPr lang="en-AU" b="1" dirty="0">
+                    <a:solidFill>
+                      <a:srgbClr val="FFC000"/>
+                    </a:solidFill>
+                  </a:rPr>
+                  <a:t>Submit request to</a:t>
+                </a:r>
+              </a:p>
+              <a:p>
+                <a:pPr marL="0" indent="0">
+                  <a:buNone/>
+                </a:pPr>
+                <a:endParaRPr lang="en-AU" dirty="0"/>
+              </a:p>
+            </p:txBody>
+          </p:sp>
+        </mc:Choice>
+        <mc:Fallback>
+          <p:sp>
+            <p:nvSpPr>
+              <p:cNvPr id="3" name="Content Placeholder 2">
+                <a:extLst>
+                  <a:ext uri="{FF2B5EF4-FFF2-40B4-BE49-F238E27FC236}">
+                    <a16:creationId xmlns:a16="http://schemas.microsoft.com/office/drawing/2014/main" id="{916E8F10-B28B-781C-AF3E-1D898AA31019}"/>
+                  </a:ext>
+                </a:extLst>
+              </p:cNvPr>
+              <p:cNvSpPr>
+                <a:spLocks noGrp="1" noRot="1" noChangeAspect="1" noMove="1" noResize="1" noEditPoints="1" noAdjustHandles="1" noChangeArrowheads="1" noChangeShapeType="1" noTextEdit="1"/>
+              </p:cNvSpPr>
+              <p:nvPr>
+                <p:ph idx="1"/>
+              </p:nvPr>
+            </p:nvSpPr>
+            <p:spPr>
+              <a:blipFill>
+                <a:blip r:embed="rId2"/>
+                <a:stretch>
+                  <a:fillRect l="-1101" t="-3501" b="-420"/>
+                </a:stretch>
+              </a:blipFill>
+            </p:spPr>
+            <p:txBody>
+              <a:bodyPr/>
+              <a:lstStyle/>
+              <a:p>
+                <a:r>
+                  <a:rPr lang="en-AU">
+                    <a:noFill/>
+                  </a:rPr>
+                  <a:t> </a:t>
+                </a:r>
+              </a:p>
+            </p:txBody>
+          </p:sp>
+        </mc:Fallback>
+      </mc:AlternateContent>
+    </p:spTree>
+    <p:extLst>
+      <p:ext uri="{BB962C8B-B14F-4D97-AF65-F5344CB8AC3E}">
+        <p14:creationId xmlns:p14="http://schemas.microsoft.com/office/powerpoint/2010/main" val="2273269764"/>
       </p:ext>
     </p:extLst>
   </p:cSld>

</xml_diff>

<commit_message>
Updated reserch progress ppt
</commit_message>
<xml_diff>
--- a/Research_Project/LHCb Starterkit/MSc Research Project Progress 31 Aug 2022 [Autosaved].pptx
+++ b/Research_Project/LHCb Starterkit/MSc Research Project Progress 31 Aug 2022 [Autosaved].pptx
@@ -210,7 +210,7 @@
           <a:p>
             <a:fld id="{FC50BE67-3C8E-4570-A99E-8EC5CD30FB7F}" type="datetimeFigureOut">
               <a:rPr lang="en-AU" smtClean="0"/>
-              <a:t>20/11/2022</a:t>
+              <a:t>21/11/2022</a:t>
             </a:fld>
             <a:endParaRPr lang="en-AU"/>
           </a:p>
@@ -711,7 +711,7 @@
           <a:p>
             <a:fld id="{6D79F432-8B29-4E94-9828-C190BA0C460D}" type="datetimeFigureOut">
               <a:rPr lang="en-AU" smtClean="0"/>
-              <a:t>20/11/2022</a:t>
+              <a:t>21/11/2022</a:t>
             </a:fld>
             <a:endParaRPr lang="en-AU"/>
           </a:p>
@@ -911,7 +911,7 @@
           <a:p>
             <a:fld id="{6D79F432-8B29-4E94-9828-C190BA0C460D}" type="datetimeFigureOut">
               <a:rPr lang="en-AU" smtClean="0"/>
-              <a:t>20/11/2022</a:t>
+              <a:t>21/11/2022</a:t>
             </a:fld>
             <a:endParaRPr lang="en-AU"/>
           </a:p>
@@ -1121,7 +1121,7 @@
           <a:p>
             <a:fld id="{6D79F432-8B29-4E94-9828-C190BA0C460D}" type="datetimeFigureOut">
               <a:rPr lang="en-AU" smtClean="0"/>
-              <a:t>20/11/2022</a:t>
+              <a:t>21/11/2022</a:t>
             </a:fld>
             <a:endParaRPr lang="en-AU"/>
           </a:p>
@@ -1321,7 +1321,7 @@
           <a:p>
             <a:fld id="{6D79F432-8B29-4E94-9828-C190BA0C460D}" type="datetimeFigureOut">
               <a:rPr lang="en-AU" smtClean="0"/>
-              <a:t>20/11/2022</a:t>
+              <a:t>21/11/2022</a:t>
             </a:fld>
             <a:endParaRPr lang="en-AU"/>
           </a:p>
@@ -1597,7 +1597,7 @@
           <a:p>
             <a:fld id="{6D79F432-8B29-4E94-9828-C190BA0C460D}" type="datetimeFigureOut">
               <a:rPr lang="en-AU" smtClean="0"/>
-              <a:t>20/11/2022</a:t>
+              <a:t>21/11/2022</a:t>
             </a:fld>
             <a:endParaRPr lang="en-AU"/>
           </a:p>
@@ -1865,7 +1865,7 @@
           <a:p>
             <a:fld id="{6D79F432-8B29-4E94-9828-C190BA0C460D}" type="datetimeFigureOut">
               <a:rPr lang="en-AU" smtClean="0"/>
-              <a:t>20/11/2022</a:t>
+              <a:t>21/11/2022</a:t>
             </a:fld>
             <a:endParaRPr lang="en-AU"/>
           </a:p>
@@ -2280,7 +2280,7 @@
           <a:p>
             <a:fld id="{6D79F432-8B29-4E94-9828-C190BA0C460D}" type="datetimeFigureOut">
               <a:rPr lang="en-AU" smtClean="0"/>
-              <a:t>20/11/2022</a:t>
+              <a:t>21/11/2022</a:t>
             </a:fld>
             <a:endParaRPr lang="en-AU"/>
           </a:p>
@@ -2422,7 +2422,7 @@
           <a:p>
             <a:fld id="{6D79F432-8B29-4E94-9828-C190BA0C460D}" type="datetimeFigureOut">
               <a:rPr lang="en-AU" smtClean="0"/>
-              <a:t>20/11/2022</a:t>
+              <a:t>21/11/2022</a:t>
             </a:fld>
             <a:endParaRPr lang="en-AU"/>
           </a:p>
@@ -2535,7 +2535,7 @@
           <a:p>
             <a:fld id="{6D79F432-8B29-4E94-9828-C190BA0C460D}" type="datetimeFigureOut">
               <a:rPr lang="en-AU" smtClean="0"/>
-              <a:t>20/11/2022</a:t>
+              <a:t>21/11/2022</a:t>
             </a:fld>
             <a:endParaRPr lang="en-AU"/>
           </a:p>
@@ -2848,7 +2848,7 @@
           <a:p>
             <a:fld id="{6D79F432-8B29-4E94-9828-C190BA0C460D}" type="datetimeFigureOut">
               <a:rPr lang="en-AU" smtClean="0"/>
-              <a:t>20/11/2022</a:t>
+              <a:t>21/11/2022</a:t>
             </a:fld>
             <a:endParaRPr lang="en-AU"/>
           </a:p>
@@ -3137,7 +3137,7 @@
           <a:p>
             <a:fld id="{6D79F432-8B29-4E94-9828-C190BA0C460D}" type="datetimeFigureOut">
               <a:rPr lang="en-AU" smtClean="0"/>
-              <a:t>20/11/2022</a:t>
+              <a:t>21/11/2022</a:t>
             </a:fld>
             <a:endParaRPr lang="en-AU"/>
           </a:p>
@@ -3380,7 +3380,7 @@
           <a:p>
             <a:fld id="{6D79F432-8B29-4E94-9828-C190BA0C460D}" type="datetimeFigureOut">
               <a:rPr lang="en-AU" smtClean="0"/>
-              <a:t>20/11/2022</a:t>
+              <a:t>21/11/2022</a:t>
             </a:fld>
             <a:endParaRPr lang="en-AU"/>
           </a:p>
@@ -4286,7 +4286,7 @@
           <a:p>
             <a:r>
               <a:rPr lang="en-AU" sz="7200" b="1" dirty="0"/>
-              <a:t>MSc Research Project: Progress (28/9/2022)</a:t>
+              <a:t>MSc Research Project: Progress</a:t>
             </a:r>
           </a:p>
         </p:txBody>
@@ -7920,8 +7920,8 @@
           </a:p>
         </p:txBody>
       </p:sp>
-      <mc:AlternateContent xmlns:mc="http://schemas.openxmlformats.org/markup-compatibility/2006">
-        <mc:Choice xmlns:a14="http://schemas.microsoft.com/office/drawing/2010/main" Requires="a14">
+      <mc:AlternateContent xmlns:mc="http://schemas.openxmlformats.org/markup-compatibility/2006" xmlns:a14="http://schemas.microsoft.com/office/drawing/2010/main">
+        <mc:Choice Requires="a14">
           <p:sp>
             <p:nvSpPr>
               <p:cNvPr id="3" name="Content Placeholder 2">
@@ -8133,7 +8133,7 @@
             </p:txBody>
           </p:sp>
         </mc:Choice>
-        <mc:Fallback>
+        <mc:Fallback xmlns="">
           <p:sp>
             <p:nvSpPr>
               <p:cNvPr id="3" name="Content Placeholder 2">
@@ -8261,7 +8261,7 @@
             <p:spPr/>
             <p:txBody>
               <a:bodyPr>
-                <a:normAutofit fontScale="92500" lnSpcReduction="20000"/>
+                <a:normAutofit fontScale="70000" lnSpcReduction="20000"/>
               </a:bodyPr>
               <a:lstStyle/>
               <a:p>
@@ -8534,10 +8534,62 @@
                 <a:r>
                   <a:rPr lang="en-AU" b="1" dirty="0">
                     <a:solidFill>
-                      <a:srgbClr val="FFC000"/>
+                      <a:srgbClr val="FF0000"/>
                     </a:solidFill>
                   </a:rPr>
-                  <a:t>Submit request to</a:t>
+                  <a:t>Submit request to RDG group once </a:t>
+                </a:r>
+                <a:r>
+                  <a:rPr lang="en-AU" b="1" dirty="0" err="1">
+                    <a:solidFill>
+                      <a:srgbClr val="FF0000"/>
+                    </a:solidFill>
+                  </a:rPr>
+                  <a:t>DecayFile</a:t>
+                </a:r>
+                <a:r>
+                  <a:rPr lang="en-AU" b="1" dirty="0">
+                    <a:solidFill>
+                      <a:srgbClr val="FF0000"/>
+                    </a:solidFill>
+                  </a:rPr>
+                  <a:t> has been approved</a:t>
+                </a:r>
+              </a:p>
+              <a:p>
+                <a:endParaRPr lang="en-AU" b="1" dirty="0">
+                  <a:solidFill>
+                    <a:srgbClr val="FF0000"/>
+                  </a:solidFill>
+                </a:endParaRPr>
+              </a:p>
+              <a:p>
+                <a:pPr marL="0" indent="0">
+                  <a:buNone/>
+                </a:pPr>
+                <a:r>
+                  <a:rPr lang="en-AU" b="1" dirty="0">
+                    <a:solidFill>
+                      <a:schemeClr val="accent4"/>
+                    </a:solidFill>
+                  </a:rPr>
+                  <a:t>3. Literature Review (Chapter 2 on </a:t>
+                </a:r>
+                <a:r>
+                  <a:rPr lang="en-AU" b="1" dirty="0" err="1">
+                    <a:solidFill>
+                      <a:schemeClr val="accent4"/>
+                    </a:solidFill>
+                  </a:rPr>
+                  <a:t>LHCb</a:t>
+                </a:r>
+                <a:r>
+                  <a:rPr lang="en-AU" b="1" dirty="0">
+                    <a:solidFill>
+                      <a:schemeClr val="accent4"/>
+                    </a:solidFill>
+                  </a:rPr>
+                  <a:t> Detector) (in progress)</a:t>
                 </a:r>
               </a:p>
               <a:p>
@@ -8570,7 +8622,7 @@
               <a:blipFill>
                 <a:blip r:embed="rId2"/>
                 <a:stretch>
-                  <a:fillRect l="-1101" t="-3501" b="-420"/>
+                  <a:fillRect l="-638" t="-2521" r="-1101"/>
                 </a:stretch>
               </a:blipFill>
             </p:spPr>

</xml_diff>

<commit_message>
Added Coursework II Files
</commit_message>
<xml_diff>
--- a/Research_Project/LHCb Starterkit/MSc Research Project Progress 31 Aug 2022 [Autosaved].pptx
+++ b/Research_Project/LHCb Starterkit/MSc Research Project Progress 31 Aug 2022 [Autosaved].pptx
@@ -210,7 +210,7 @@
           <a:p>
             <a:fld id="{FC50BE67-3C8E-4570-A99E-8EC5CD30FB7F}" type="datetimeFigureOut">
               <a:rPr lang="en-AU" smtClean="0"/>
-              <a:t>1/12/2022</a:t>
+              <a:t>27/03/2023</a:t>
             </a:fld>
             <a:endParaRPr lang="en-AU"/>
           </a:p>
@@ -711,7 +711,7 @@
           <a:p>
             <a:fld id="{6D79F432-8B29-4E94-9828-C190BA0C460D}" type="datetimeFigureOut">
               <a:rPr lang="en-AU" smtClean="0"/>
-              <a:t>1/12/2022</a:t>
+              <a:t>27/03/2023</a:t>
             </a:fld>
             <a:endParaRPr lang="en-AU"/>
           </a:p>
@@ -911,7 +911,7 @@
           <a:p>
             <a:fld id="{6D79F432-8B29-4E94-9828-C190BA0C460D}" type="datetimeFigureOut">
               <a:rPr lang="en-AU" smtClean="0"/>
-              <a:t>1/12/2022</a:t>
+              <a:t>27/03/2023</a:t>
             </a:fld>
             <a:endParaRPr lang="en-AU"/>
           </a:p>
@@ -1121,7 +1121,7 @@
           <a:p>
             <a:fld id="{6D79F432-8B29-4E94-9828-C190BA0C460D}" type="datetimeFigureOut">
               <a:rPr lang="en-AU" smtClean="0"/>
-              <a:t>1/12/2022</a:t>
+              <a:t>27/03/2023</a:t>
             </a:fld>
             <a:endParaRPr lang="en-AU"/>
           </a:p>
@@ -1321,7 +1321,7 @@
           <a:p>
             <a:fld id="{6D79F432-8B29-4E94-9828-C190BA0C460D}" type="datetimeFigureOut">
               <a:rPr lang="en-AU" smtClean="0"/>
-              <a:t>1/12/2022</a:t>
+              <a:t>27/03/2023</a:t>
             </a:fld>
             <a:endParaRPr lang="en-AU"/>
           </a:p>
@@ -1597,7 +1597,7 @@
           <a:p>
             <a:fld id="{6D79F432-8B29-4E94-9828-C190BA0C460D}" type="datetimeFigureOut">
               <a:rPr lang="en-AU" smtClean="0"/>
-              <a:t>1/12/2022</a:t>
+              <a:t>27/03/2023</a:t>
             </a:fld>
             <a:endParaRPr lang="en-AU"/>
           </a:p>
@@ -1865,7 +1865,7 @@
           <a:p>
             <a:fld id="{6D79F432-8B29-4E94-9828-C190BA0C460D}" type="datetimeFigureOut">
               <a:rPr lang="en-AU" smtClean="0"/>
-              <a:t>1/12/2022</a:t>
+              <a:t>27/03/2023</a:t>
             </a:fld>
             <a:endParaRPr lang="en-AU"/>
           </a:p>
@@ -2280,7 +2280,7 @@
           <a:p>
             <a:fld id="{6D79F432-8B29-4E94-9828-C190BA0C460D}" type="datetimeFigureOut">
               <a:rPr lang="en-AU" smtClean="0"/>
-              <a:t>1/12/2022</a:t>
+              <a:t>27/03/2023</a:t>
             </a:fld>
             <a:endParaRPr lang="en-AU"/>
           </a:p>
@@ -2422,7 +2422,7 @@
           <a:p>
             <a:fld id="{6D79F432-8B29-4E94-9828-C190BA0C460D}" type="datetimeFigureOut">
               <a:rPr lang="en-AU" smtClean="0"/>
-              <a:t>1/12/2022</a:t>
+              <a:t>27/03/2023</a:t>
             </a:fld>
             <a:endParaRPr lang="en-AU"/>
           </a:p>
@@ -2535,7 +2535,7 @@
           <a:p>
             <a:fld id="{6D79F432-8B29-4E94-9828-C190BA0C460D}" type="datetimeFigureOut">
               <a:rPr lang="en-AU" smtClean="0"/>
-              <a:t>1/12/2022</a:t>
+              <a:t>27/03/2023</a:t>
             </a:fld>
             <a:endParaRPr lang="en-AU"/>
           </a:p>
@@ -2848,7 +2848,7 @@
           <a:p>
             <a:fld id="{6D79F432-8B29-4E94-9828-C190BA0C460D}" type="datetimeFigureOut">
               <a:rPr lang="en-AU" smtClean="0"/>
-              <a:t>1/12/2022</a:t>
+              <a:t>27/03/2023</a:t>
             </a:fld>
             <a:endParaRPr lang="en-AU"/>
           </a:p>
@@ -3137,7 +3137,7 @@
           <a:p>
             <a:fld id="{6D79F432-8B29-4E94-9828-C190BA0C460D}" type="datetimeFigureOut">
               <a:rPr lang="en-AU" smtClean="0"/>
-              <a:t>1/12/2022</a:t>
+              <a:t>27/03/2023</a:t>
             </a:fld>
             <a:endParaRPr lang="en-AU"/>
           </a:p>
@@ -3380,7 +3380,7 @@
           <a:p>
             <a:fld id="{6D79F432-8B29-4E94-9828-C190BA0C460D}" type="datetimeFigureOut">
               <a:rPr lang="en-AU" smtClean="0"/>
-              <a:t>1/12/2022</a:t>
+              <a:t>27/03/2023</a:t>
             </a:fld>
             <a:endParaRPr lang="en-AU"/>
           </a:p>
@@ -8240,8 +8240,8 @@
           </a:p>
         </p:txBody>
       </p:sp>
-      <mc:AlternateContent xmlns:mc="http://schemas.openxmlformats.org/markup-compatibility/2006">
-        <mc:Choice xmlns:a14="http://schemas.microsoft.com/office/drawing/2010/main" Requires="a14">
+      <mc:AlternateContent xmlns:mc="http://schemas.openxmlformats.org/markup-compatibility/2006" xmlns:a14="http://schemas.microsoft.com/office/drawing/2010/main">
+        <mc:Choice Requires="a14">
           <p:sp>
             <p:nvSpPr>
               <p:cNvPr id="3" name="Content Placeholder 2">
@@ -8617,7 +8617,7 @@
             </p:txBody>
           </p:sp>
         </mc:Choice>
-        <mc:Fallback>
+        <mc:Fallback xmlns="">
           <p:sp>
             <p:nvSpPr>
               <p:cNvPr id="3" name="Content Placeholder 2">

</xml_diff>